<commit_message>
AAVAiL Revenue Prediction - Data Investigation Summary.pptx
</commit_message>
<xml_diff>
--- a/Part 1 Data Investigation/AAVAiL Revenue Prediction - Data Investigation Summary.pptx
+++ b/Part 1 Data Investigation/AAVAiL Revenue Prediction - Data Investigation Summary.pptx
@@ -2,10 +2,16 @@
 <file path=ppt/presentation.xml><?xml version="1.0" encoding="utf-8"?>
 <p:presentation xmlns:a="http://schemas.openxmlformats.org/drawingml/2006/main" xmlns:r="http://schemas.openxmlformats.org/officeDocument/2006/relationships" xmlns:p="http://schemas.openxmlformats.org/presentationml/2006/main" saveSubsetFonts="1" autoCompressPictures="0">
   <p:sldMasterIdLst>
-    <p:sldMasterId id="2147483648" r:id="rId1"/>
+    <p:sldMasterId id="2147483660" r:id="rId1"/>
   </p:sldMasterIdLst>
   <p:sldIdLst>
     <p:sldId id="256" r:id="rId2"/>
+    <p:sldId id="257" r:id="rId3"/>
+    <p:sldId id="258" r:id="rId4"/>
+    <p:sldId id="259" r:id="rId5"/>
+    <p:sldId id="260" r:id="rId6"/>
+    <p:sldId id="261" r:id="rId7"/>
+    <p:sldId id="262" r:id="rId8"/>
   </p:sldIdLst>
   <p:sldSz cx="12192000" cy="6858000"/>
   <p:notesSz cx="6858000" cy="9144000"/>
@@ -13,7 +19,7 @@
     <a:defPPr>
       <a:defRPr lang="en-US"/>
     </a:defPPr>
-    <a:lvl1pPr marL="0" algn="l" defTabSz="914400" rtl="0" eaLnBrk="1" latinLnBrk="0" hangingPunct="1">
+    <a:lvl1pPr marL="0" algn="l" defTabSz="457200" rtl="0" eaLnBrk="1" latinLnBrk="0" hangingPunct="1">
       <a:defRPr sz="1800" kern="1200">
         <a:solidFill>
           <a:schemeClr val="tx1"/>
@@ -23,7 +29,7 @@
         <a:cs typeface="+mn-cs"/>
       </a:defRPr>
     </a:lvl1pPr>
-    <a:lvl2pPr marL="457200" algn="l" defTabSz="914400" rtl="0" eaLnBrk="1" latinLnBrk="0" hangingPunct="1">
+    <a:lvl2pPr marL="457200" algn="l" defTabSz="457200" rtl="0" eaLnBrk="1" latinLnBrk="0" hangingPunct="1">
       <a:defRPr sz="1800" kern="1200">
         <a:solidFill>
           <a:schemeClr val="tx1"/>
@@ -33,7 +39,7 @@
         <a:cs typeface="+mn-cs"/>
       </a:defRPr>
     </a:lvl2pPr>
-    <a:lvl3pPr marL="914400" algn="l" defTabSz="914400" rtl="0" eaLnBrk="1" latinLnBrk="0" hangingPunct="1">
+    <a:lvl3pPr marL="914400" algn="l" defTabSz="457200" rtl="0" eaLnBrk="1" latinLnBrk="0" hangingPunct="1">
       <a:defRPr sz="1800" kern="1200">
         <a:solidFill>
           <a:schemeClr val="tx1"/>
@@ -43,7 +49,7 @@
         <a:cs typeface="+mn-cs"/>
       </a:defRPr>
     </a:lvl3pPr>
-    <a:lvl4pPr marL="1371600" algn="l" defTabSz="914400" rtl="0" eaLnBrk="1" latinLnBrk="0" hangingPunct="1">
+    <a:lvl4pPr marL="1371600" algn="l" defTabSz="457200" rtl="0" eaLnBrk="1" latinLnBrk="0" hangingPunct="1">
       <a:defRPr sz="1800" kern="1200">
         <a:solidFill>
           <a:schemeClr val="tx1"/>
@@ -53,7 +59,7 @@
         <a:cs typeface="+mn-cs"/>
       </a:defRPr>
     </a:lvl4pPr>
-    <a:lvl5pPr marL="1828800" algn="l" defTabSz="914400" rtl="0" eaLnBrk="1" latinLnBrk="0" hangingPunct="1">
+    <a:lvl5pPr marL="1828800" algn="l" defTabSz="457200" rtl="0" eaLnBrk="1" latinLnBrk="0" hangingPunct="1">
       <a:defRPr sz="1800" kern="1200">
         <a:solidFill>
           <a:schemeClr val="tx1"/>
@@ -63,7 +69,7 @@
         <a:cs typeface="+mn-cs"/>
       </a:defRPr>
     </a:lvl5pPr>
-    <a:lvl6pPr marL="2286000" algn="l" defTabSz="914400" rtl="0" eaLnBrk="1" latinLnBrk="0" hangingPunct="1">
+    <a:lvl6pPr marL="2286000" algn="l" defTabSz="457200" rtl="0" eaLnBrk="1" latinLnBrk="0" hangingPunct="1">
       <a:defRPr sz="1800" kern="1200">
         <a:solidFill>
           <a:schemeClr val="tx1"/>
@@ -73,7 +79,7 @@
         <a:cs typeface="+mn-cs"/>
       </a:defRPr>
     </a:lvl6pPr>
-    <a:lvl7pPr marL="2743200" algn="l" defTabSz="914400" rtl="0" eaLnBrk="1" latinLnBrk="0" hangingPunct="1">
+    <a:lvl7pPr marL="2743200" algn="l" defTabSz="457200" rtl="0" eaLnBrk="1" latinLnBrk="0" hangingPunct="1">
       <a:defRPr sz="1800" kern="1200">
         <a:solidFill>
           <a:schemeClr val="tx1"/>
@@ -83,7 +89,7 @@
         <a:cs typeface="+mn-cs"/>
       </a:defRPr>
     </a:lvl7pPr>
-    <a:lvl8pPr marL="3200400" algn="l" defTabSz="914400" rtl="0" eaLnBrk="1" latinLnBrk="0" hangingPunct="1">
+    <a:lvl8pPr marL="3200400" algn="l" defTabSz="457200" rtl="0" eaLnBrk="1" latinLnBrk="0" hangingPunct="1">
       <a:defRPr sz="1800" kern="1200">
         <a:solidFill>
           <a:schemeClr val="tx1"/>
@@ -93,7 +99,7 @@
         <a:cs typeface="+mn-cs"/>
       </a:defRPr>
     </a:lvl8pPr>
-    <a:lvl9pPr marL="3657600" algn="l" defTabSz="914400" rtl="0" eaLnBrk="1" latinLnBrk="0" hangingPunct="1">
+    <a:lvl9pPr marL="3657600" algn="l" defTabSz="457200" rtl="0" eaLnBrk="1" latinLnBrk="0" hangingPunct="1">
       <a:defRPr sz="1800" kern="1200">
         <a:solidFill>
           <a:schemeClr val="tx1"/>
@@ -110,6 +116,14 @@
 <file path=ppt/slideLayouts/slideLayout1.xml><?xml version="1.0" encoding="utf-8"?>
 <p:sldLayout xmlns:a="http://schemas.openxmlformats.org/drawingml/2006/main" xmlns:r="http://schemas.openxmlformats.org/officeDocument/2006/relationships" xmlns:p="http://schemas.openxmlformats.org/presentationml/2006/main" type="title" preserve="1">
   <p:cSld name="Title Slide">
+    <p:bg>
+      <p:bgPr>
+        <a:solidFill>
+          <a:schemeClr val="accent2"/>
+        </a:solidFill>
+        <a:effectLst/>
+      </p:bgPr>
+    </p:bg>
     <p:spTree>
       <p:nvGrpSpPr>
         <p:cNvPr id="1" name=""/>
@@ -126,70 +140,82 @@
       </p:grpSpPr>
       <p:sp>
         <p:nvSpPr>
-          <p:cNvPr id="2" name="Title 1">
-            <a:extLst>
-              <a:ext uri="{FF2B5EF4-FFF2-40B4-BE49-F238E27FC236}">
-                <a16:creationId xmlns:a16="http://schemas.microsoft.com/office/drawing/2014/main" id="{F25B8B78-105B-7249-A675-3D98C2EF3EB0}"/>
-              </a:ext>
-            </a:extLst>
-          </p:cNvPr>
+          <p:cNvPr id="2" name="Title 1"/>
           <p:cNvSpPr>
             <a:spLocks noGrp="1"/>
           </p:cNvSpPr>
           <p:nvPr>
             <p:ph type="ctrTitle"/>
+          </p:nvPr>
+        </p:nvSpPr>
+        <p:spPr bwMode="blackWhite">
+          <a:xfrm>
+            <a:off x="1600200" y="2386744"/>
+            <a:ext cx="8991600" cy="1645920"/>
+          </a:xfrm>
+          <a:solidFill>
+            <a:srgbClr val="FFFFFF"/>
+          </a:solidFill>
+          <a:ln w="38100">
+            <a:solidFill>
+              <a:srgbClr val="404040"/>
+            </a:solidFill>
+          </a:ln>
+        </p:spPr>
+        <p:txBody>
+          <a:bodyPr lIns="274320" rIns="274320" anchor="ctr" anchorCtr="1">
+            <a:normAutofit/>
+          </a:bodyPr>
+          <a:lstStyle>
+            <a:lvl1pPr algn="ctr">
+              <a:defRPr sz="3800">
+                <a:solidFill>
+                  <a:srgbClr val="262626"/>
+                </a:solidFill>
+              </a:defRPr>
+            </a:lvl1pPr>
+          </a:lstStyle>
+          <a:p>
+            <a:r>
+              <a:rPr lang="en-GB"/>
+              <a:t>Click to edit Master title style</a:t>
+            </a:r>
+            <a:endParaRPr lang="en-US" dirty="0"/>
+          </a:p>
+        </p:txBody>
+      </p:sp>
+      <p:sp>
+        <p:nvSpPr>
+          <p:cNvPr id="3" name="Subtitle 2"/>
+          <p:cNvSpPr>
+            <a:spLocks noGrp="1"/>
+          </p:cNvSpPr>
+          <p:nvPr>
+            <p:ph type="subTitle" idx="1"/>
           </p:nvPr>
         </p:nvSpPr>
         <p:spPr>
           <a:xfrm>
-            <a:off x="1524000" y="1122363"/>
-            <a:ext cx="9144000" cy="2387600"/>
+            <a:off x="2695194" y="4352544"/>
+            <a:ext cx="6801612" cy="1239894"/>
           </a:xfrm>
+          <a:noFill/>
         </p:spPr>
         <p:txBody>
-          <a:bodyPr anchor="b"/>
-          <a:lstStyle>
-            <a:lvl1pPr algn="ctr">
-              <a:defRPr sz="6000"/>
-            </a:lvl1pPr>
-          </a:lstStyle>
-          <a:p>
-            <a:r>
-              <a:rPr lang="en-GB"/>
-              <a:t>Click to edit Master title style</a:t>
-            </a:r>
-            <a:endParaRPr lang="en-US"/>
-          </a:p>
-        </p:txBody>
-      </p:sp>
-      <p:sp>
-        <p:nvSpPr>
-          <p:cNvPr id="3" name="Subtitle 2">
-            <a:extLst>
-              <a:ext uri="{FF2B5EF4-FFF2-40B4-BE49-F238E27FC236}">
-                <a16:creationId xmlns:a16="http://schemas.microsoft.com/office/drawing/2014/main" id="{D94E4F05-173E-4749-99C0-004D6394F332}"/>
-              </a:ext>
-            </a:extLst>
-          </p:cNvPr>
-          <p:cNvSpPr>
-            <a:spLocks noGrp="1"/>
-          </p:cNvSpPr>
-          <p:nvPr>
-            <p:ph type="subTitle" idx="1"/>
-          </p:nvPr>
-        </p:nvSpPr>
-        <p:spPr>
-          <a:xfrm>
-            <a:off x="1524000" y="3602038"/>
-            <a:ext cx="9144000" cy="1655762"/>
-          </a:xfrm>
-        </p:spPr>
-        <p:txBody>
-          <a:bodyPr/>
+          <a:bodyPr>
+            <a:normAutofit/>
+          </a:bodyPr>
           <a:lstStyle>
             <a:lvl1pPr marL="0" indent="0" algn="ctr">
               <a:buNone/>
-              <a:defRPr sz="2400"/>
+              <a:defRPr sz="2000">
+                <a:solidFill>
+                  <a:schemeClr val="tx1">
+                    <a:lumMod val="75000"/>
+                    <a:lumOff val="25000"/>
+                  </a:schemeClr>
+                </a:solidFill>
+              </a:defRPr>
             </a:lvl1pPr>
             <a:lvl2pPr marL="457200" indent="0" algn="ctr">
               <a:buNone/>
@@ -229,19 +255,13 @@
               <a:rPr lang="en-GB"/>
               <a:t>Click to edit Master subtitle style</a:t>
             </a:r>
-            <a:endParaRPr lang="en-US"/>
-          </a:p>
-        </p:txBody>
-      </p:sp>
-      <p:sp>
-        <p:nvSpPr>
-          <p:cNvPr id="4" name="Date Placeholder 3">
-            <a:extLst>
-              <a:ext uri="{FF2B5EF4-FFF2-40B4-BE49-F238E27FC236}">
-                <a16:creationId xmlns:a16="http://schemas.microsoft.com/office/drawing/2014/main" id="{598865F2-4881-A243-A44C-513EA1DE7698}"/>
-              </a:ext>
-            </a:extLst>
-          </p:cNvPr>
+            <a:endParaRPr lang="en-US" dirty="0"/>
+          </a:p>
+        </p:txBody>
+      </p:sp>
+      <p:sp>
+        <p:nvSpPr>
+          <p:cNvPr id="7" name="Date Placeholder 6"/>
           <p:cNvSpPr>
             <a:spLocks noGrp="1"/>
           </p:cNvSpPr>
@@ -264,13 +284,7 @@
       </p:sp>
       <p:sp>
         <p:nvSpPr>
-          <p:cNvPr id="5" name="Footer Placeholder 4">
-            <a:extLst>
-              <a:ext uri="{FF2B5EF4-FFF2-40B4-BE49-F238E27FC236}">
-                <a16:creationId xmlns:a16="http://schemas.microsoft.com/office/drawing/2014/main" id="{555CD18F-5307-734F-BFA2-4133825BC37D}"/>
-              </a:ext>
-            </a:extLst>
-          </p:cNvPr>
+          <p:cNvPr id="8" name="Footer Placeholder 7"/>
           <p:cNvSpPr>
             <a:spLocks noGrp="1"/>
           </p:cNvSpPr>
@@ -289,13 +303,7 @@
       </p:sp>
       <p:sp>
         <p:nvSpPr>
-          <p:cNvPr id="6" name="Slide Number Placeholder 5">
-            <a:extLst>
-              <a:ext uri="{FF2B5EF4-FFF2-40B4-BE49-F238E27FC236}">
-                <a16:creationId xmlns:a16="http://schemas.microsoft.com/office/drawing/2014/main" id="{8DD32FC7-4E55-B941-AFA8-D9CE7A30DAE8}"/>
-              </a:ext>
-            </a:extLst>
-          </p:cNvPr>
+          <p:cNvPr id="9" name="Slide Number Placeholder 8"/>
           <p:cNvSpPr>
             <a:spLocks noGrp="1"/>
           </p:cNvSpPr>
@@ -319,12 +327,12 @@
     </p:spTree>
     <p:extLst>
       <p:ext uri="{BB962C8B-B14F-4D97-AF65-F5344CB8AC3E}">
-        <p14:creationId xmlns:p14="http://schemas.microsoft.com/office/powerpoint/2010/main" val="3971194665"/>
+        <p14:creationId xmlns:p14="http://schemas.microsoft.com/office/powerpoint/2010/main" val="3881893302"/>
       </p:ext>
     </p:extLst>
   </p:cSld>
   <p:clrMapOvr>
-    <a:masterClrMapping/>
+    <a:overrideClrMapping bg1="dk1" tx1="lt1" bg2="dk2" tx2="lt2" accent1="accent1" accent2="accent2" accent3="accent3" accent4="accent4" accent5="accent5" accent6="accent6" hlink="hlink" folHlink="folHlink"/>
   </p:clrMapOvr>
 </p:sldLayout>
 </file>
@@ -348,13 +356,7 @@
       </p:grpSpPr>
       <p:sp>
         <p:nvSpPr>
-          <p:cNvPr id="2" name="Title 1">
-            <a:extLst>
-              <a:ext uri="{FF2B5EF4-FFF2-40B4-BE49-F238E27FC236}">
-                <a16:creationId xmlns:a16="http://schemas.microsoft.com/office/drawing/2014/main" id="{843127C4-D31A-9045-930D-9BA29730901E}"/>
-              </a:ext>
-            </a:extLst>
-          </p:cNvPr>
+          <p:cNvPr id="2" name="Title 1"/>
           <p:cNvSpPr>
             <a:spLocks noGrp="1"/>
           </p:cNvSpPr>
@@ -371,19 +373,13 @@
               <a:rPr lang="en-GB"/>
               <a:t>Click to edit Master title style</a:t>
             </a:r>
-            <a:endParaRPr lang="en-US"/>
-          </a:p>
-        </p:txBody>
-      </p:sp>
-      <p:sp>
-        <p:nvSpPr>
-          <p:cNvPr id="3" name="Vertical Text Placeholder 2">
-            <a:extLst>
-              <a:ext uri="{FF2B5EF4-FFF2-40B4-BE49-F238E27FC236}">
-                <a16:creationId xmlns:a16="http://schemas.microsoft.com/office/drawing/2014/main" id="{78D57BF5-D05D-FC4F-B0DA-BECF02B9A7C5}"/>
-              </a:ext>
-            </a:extLst>
-          </p:cNvPr>
+            <a:endParaRPr lang="en-US" dirty="0"/>
+          </a:p>
+        </p:txBody>
+      </p:sp>
+      <p:sp>
+        <p:nvSpPr>
+          <p:cNvPr id="3" name="Vertical Text Placeholder 2"/>
           <p:cNvSpPr>
             <a:spLocks noGrp="1"/>
           </p:cNvSpPr>
@@ -429,19 +425,13 @@
               <a:rPr lang="en-GB"/>
               <a:t>Fifth level</a:t>
             </a:r>
-            <a:endParaRPr lang="en-US"/>
-          </a:p>
-        </p:txBody>
-      </p:sp>
-      <p:sp>
-        <p:nvSpPr>
-          <p:cNvPr id="4" name="Date Placeholder 3">
-            <a:extLst>
-              <a:ext uri="{FF2B5EF4-FFF2-40B4-BE49-F238E27FC236}">
-                <a16:creationId xmlns:a16="http://schemas.microsoft.com/office/drawing/2014/main" id="{EADFD690-5555-5A46-B7BD-0EEBE370DF2E}"/>
-              </a:ext>
-            </a:extLst>
-          </p:cNvPr>
+            <a:endParaRPr lang="en-US" dirty="0"/>
+          </a:p>
+        </p:txBody>
+      </p:sp>
+      <p:sp>
+        <p:nvSpPr>
+          <p:cNvPr id="4" name="Date Placeholder 3"/>
           <p:cNvSpPr>
             <a:spLocks noGrp="1"/>
           </p:cNvSpPr>
@@ -464,13 +454,7 @@
       </p:sp>
       <p:sp>
         <p:nvSpPr>
-          <p:cNvPr id="5" name="Footer Placeholder 4">
-            <a:extLst>
-              <a:ext uri="{FF2B5EF4-FFF2-40B4-BE49-F238E27FC236}">
-                <a16:creationId xmlns:a16="http://schemas.microsoft.com/office/drawing/2014/main" id="{25396A3C-A83C-B045-9E1B-BA4457899DE2}"/>
-              </a:ext>
-            </a:extLst>
-          </p:cNvPr>
+          <p:cNvPr id="5" name="Footer Placeholder 4"/>
           <p:cNvSpPr>
             <a:spLocks noGrp="1"/>
           </p:cNvSpPr>
@@ -489,13 +473,7 @@
       </p:sp>
       <p:sp>
         <p:nvSpPr>
-          <p:cNvPr id="6" name="Slide Number Placeholder 5">
-            <a:extLst>
-              <a:ext uri="{FF2B5EF4-FFF2-40B4-BE49-F238E27FC236}">
-                <a16:creationId xmlns:a16="http://schemas.microsoft.com/office/drawing/2014/main" id="{9DDB3A30-B8CD-1C43-9BAE-70A126C154FA}"/>
-              </a:ext>
-            </a:extLst>
-          </p:cNvPr>
+          <p:cNvPr id="6" name="Slide Number Placeholder 5"/>
           <p:cNvSpPr>
             <a:spLocks noGrp="1"/>
           </p:cNvSpPr>
@@ -519,7 +497,7 @@
     </p:spTree>
     <p:extLst>
       <p:ext uri="{BB962C8B-B14F-4D97-AF65-F5344CB8AC3E}">
-        <p14:creationId xmlns:p14="http://schemas.microsoft.com/office/powerpoint/2010/main" val="673462716"/>
+        <p14:creationId xmlns:p14="http://schemas.microsoft.com/office/powerpoint/2010/main" val="3399604312"/>
       </p:ext>
     </p:extLst>
   </p:cSld>
@@ -548,13 +526,7 @@
       </p:grpSpPr>
       <p:sp>
         <p:nvSpPr>
-          <p:cNvPr id="2" name="Vertical Title 1">
-            <a:extLst>
-              <a:ext uri="{FF2B5EF4-FFF2-40B4-BE49-F238E27FC236}">
-                <a16:creationId xmlns:a16="http://schemas.microsoft.com/office/drawing/2014/main" id="{11C1E09B-6D34-594C-9190-AFF64E854570}"/>
-              </a:ext>
-            </a:extLst>
-          </p:cNvPr>
+          <p:cNvPr id="2" name="Vertical Title 1"/>
           <p:cNvSpPr>
             <a:spLocks noGrp="1"/>
           </p:cNvSpPr>
@@ -564,8 +536,8 @@
         </p:nvSpPr>
         <p:spPr>
           <a:xfrm>
-            <a:off x="8724900" y="365125"/>
-            <a:ext cx="2628900" cy="5811838"/>
+            <a:off x="8653112" y="937260"/>
+            <a:ext cx="1298608" cy="4983480"/>
           </a:xfrm>
         </p:spPr>
         <p:txBody>
@@ -576,19 +548,13 @@
               <a:rPr lang="en-GB"/>
               <a:t>Click to edit Master title style</a:t>
             </a:r>
-            <a:endParaRPr lang="en-US"/>
-          </a:p>
-        </p:txBody>
-      </p:sp>
-      <p:sp>
-        <p:nvSpPr>
-          <p:cNvPr id="3" name="Vertical Text Placeholder 2">
-            <a:extLst>
-              <a:ext uri="{FF2B5EF4-FFF2-40B4-BE49-F238E27FC236}">
-                <a16:creationId xmlns:a16="http://schemas.microsoft.com/office/drawing/2014/main" id="{DEDC4A81-9C2B-DD45-91F9-9B5865F285AE}"/>
-              </a:ext>
-            </a:extLst>
-          </p:cNvPr>
+            <a:endParaRPr lang="en-US" dirty="0"/>
+          </a:p>
+        </p:txBody>
+      </p:sp>
+      <p:sp>
+        <p:nvSpPr>
+          <p:cNvPr id="3" name="Vertical Text Placeholder 2"/>
           <p:cNvSpPr>
             <a:spLocks noGrp="1"/>
           </p:cNvSpPr>
@@ -598,8 +564,8 @@
         </p:nvSpPr>
         <p:spPr>
           <a:xfrm>
-            <a:off x="838200" y="365125"/>
-            <a:ext cx="7734300" cy="5811838"/>
+            <a:off x="2231136" y="937260"/>
+            <a:ext cx="6198489" cy="4983480"/>
           </a:xfrm>
         </p:spPr>
         <p:txBody>
@@ -639,19 +605,13 @@
               <a:rPr lang="en-GB"/>
               <a:t>Fifth level</a:t>
             </a:r>
-            <a:endParaRPr lang="en-US"/>
-          </a:p>
-        </p:txBody>
-      </p:sp>
-      <p:sp>
-        <p:nvSpPr>
-          <p:cNvPr id="4" name="Date Placeholder 3">
-            <a:extLst>
-              <a:ext uri="{FF2B5EF4-FFF2-40B4-BE49-F238E27FC236}">
-                <a16:creationId xmlns:a16="http://schemas.microsoft.com/office/drawing/2014/main" id="{9B01CA75-C311-594B-861C-77AEAAFD8F16}"/>
-              </a:ext>
-            </a:extLst>
-          </p:cNvPr>
+            <a:endParaRPr lang="en-US" dirty="0"/>
+          </a:p>
+        </p:txBody>
+      </p:sp>
+      <p:sp>
+        <p:nvSpPr>
+          <p:cNvPr id="4" name="Date Placeholder 3"/>
           <p:cNvSpPr>
             <a:spLocks noGrp="1"/>
           </p:cNvSpPr>
@@ -674,13 +634,7 @@
       </p:sp>
       <p:sp>
         <p:nvSpPr>
-          <p:cNvPr id="5" name="Footer Placeholder 4">
-            <a:extLst>
-              <a:ext uri="{FF2B5EF4-FFF2-40B4-BE49-F238E27FC236}">
-                <a16:creationId xmlns:a16="http://schemas.microsoft.com/office/drawing/2014/main" id="{E4008AA2-53B7-BC41-A331-E431F79AC42F}"/>
-              </a:ext>
-            </a:extLst>
-          </p:cNvPr>
+          <p:cNvPr id="5" name="Footer Placeholder 4"/>
           <p:cNvSpPr>
             <a:spLocks noGrp="1"/>
           </p:cNvSpPr>
@@ -699,13 +653,7 @@
       </p:sp>
       <p:sp>
         <p:nvSpPr>
-          <p:cNvPr id="6" name="Slide Number Placeholder 5">
-            <a:extLst>
-              <a:ext uri="{FF2B5EF4-FFF2-40B4-BE49-F238E27FC236}">
-                <a16:creationId xmlns:a16="http://schemas.microsoft.com/office/drawing/2014/main" id="{B974BD0C-555B-0148-B241-811299402249}"/>
-              </a:ext>
-            </a:extLst>
-          </p:cNvPr>
+          <p:cNvPr id="6" name="Slide Number Placeholder 5"/>
           <p:cNvSpPr>
             <a:spLocks noGrp="1"/>
           </p:cNvSpPr>
@@ -729,7 +677,7 @@
     </p:spTree>
     <p:extLst>
       <p:ext uri="{BB962C8B-B14F-4D97-AF65-F5344CB8AC3E}">
-        <p14:creationId xmlns:p14="http://schemas.microsoft.com/office/powerpoint/2010/main" val="716302563"/>
+        <p14:creationId xmlns:p14="http://schemas.microsoft.com/office/powerpoint/2010/main" val="714695332"/>
       </p:ext>
     </p:extLst>
   </p:cSld>
@@ -758,13 +706,7 @@
       </p:grpSpPr>
       <p:sp>
         <p:nvSpPr>
-          <p:cNvPr id="2" name="Title 1">
-            <a:extLst>
-              <a:ext uri="{FF2B5EF4-FFF2-40B4-BE49-F238E27FC236}">
-                <a16:creationId xmlns:a16="http://schemas.microsoft.com/office/drawing/2014/main" id="{DDF61195-224C-5145-9A26-A86E33CA3AD3}"/>
-              </a:ext>
-            </a:extLst>
-          </p:cNvPr>
+          <p:cNvPr id="2" name="Title 1"/>
           <p:cNvSpPr>
             <a:spLocks noGrp="1"/>
           </p:cNvSpPr>
@@ -781,19 +723,13 @@
               <a:rPr lang="en-GB"/>
               <a:t>Click to edit Master title style</a:t>
             </a:r>
-            <a:endParaRPr lang="en-US"/>
-          </a:p>
-        </p:txBody>
-      </p:sp>
-      <p:sp>
-        <p:nvSpPr>
-          <p:cNvPr id="3" name="Content Placeholder 2">
-            <a:extLst>
-              <a:ext uri="{FF2B5EF4-FFF2-40B4-BE49-F238E27FC236}">
-                <a16:creationId xmlns:a16="http://schemas.microsoft.com/office/drawing/2014/main" id="{EAE6F2C6-0272-BF41-B32C-2632163D827D}"/>
-              </a:ext>
-            </a:extLst>
-          </p:cNvPr>
+            <a:endParaRPr lang="en-US" dirty="0"/>
+          </a:p>
+        </p:txBody>
+      </p:sp>
+      <p:sp>
+        <p:nvSpPr>
+          <p:cNvPr id="3" name="Content Placeholder 2"/>
           <p:cNvSpPr>
             <a:spLocks noGrp="1"/>
           </p:cNvSpPr>
@@ -839,19 +775,13 @@
               <a:rPr lang="en-GB"/>
               <a:t>Fifth level</a:t>
             </a:r>
-            <a:endParaRPr lang="en-US"/>
-          </a:p>
-        </p:txBody>
-      </p:sp>
-      <p:sp>
-        <p:nvSpPr>
-          <p:cNvPr id="4" name="Date Placeholder 3">
-            <a:extLst>
-              <a:ext uri="{FF2B5EF4-FFF2-40B4-BE49-F238E27FC236}">
-                <a16:creationId xmlns:a16="http://schemas.microsoft.com/office/drawing/2014/main" id="{0E1BF11B-5C5A-CF4D-AA84-6D0BA14853B5}"/>
-              </a:ext>
-            </a:extLst>
-          </p:cNvPr>
+            <a:endParaRPr lang="en-US" dirty="0"/>
+          </a:p>
+        </p:txBody>
+      </p:sp>
+      <p:sp>
+        <p:nvSpPr>
+          <p:cNvPr id="7" name="Date Placeholder 6"/>
           <p:cNvSpPr>
             <a:spLocks noGrp="1"/>
           </p:cNvSpPr>
@@ -874,13 +804,7 @@
       </p:sp>
       <p:sp>
         <p:nvSpPr>
-          <p:cNvPr id="5" name="Footer Placeholder 4">
-            <a:extLst>
-              <a:ext uri="{FF2B5EF4-FFF2-40B4-BE49-F238E27FC236}">
-                <a16:creationId xmlns:a16="http://schemas.microsoft.com/office/drawing/2014/main" id="{743DB7E6-BA0B-064B-9259-01A02AF92D44}"/>
-              </a:ext>
-            </a:extLst>
-          </p:cNvPr>
+          <p:cNvPr id="8" name="Footer Placeholder 7"/>
           <p:cNvSpPr>
             <a:spLocks noGrp="1"/>
           </p:cNvSpPr>
@@ -899,13 +823,7 @@
       </p:sp>
       <p:sp>
         <p:nvSpPr>
-          <p:cNvPr id="6" name="Slide Number Placeholder 5">
-            <a:extLst>
-              <a:ext uri="{FF2B5EF4-FFF2-40B4-BE49-F238E27FC236}">
-                <a16:creationId xmlns:a16="http://schemas.microsoft.com/office/drawing/2014/main" id="{E48CFF5B-3744-CB45-B20E-A68FEEFFEE65}"/>
-              </a:ext>
-            </a:extLst>
-          </p:cNvPr>
+          <p:cNvPr id="9" name="Slide Number Placeholder 8"/>
           <p:cNvSpPr>
             <a:spLocks noGrp="1"/>
           </p:cNvSpPr>
@@ -929,7 +847,7 @@
     </p:spTree>
     <p:extLst>
       <p:ext uri="{BB962C8B-B14F-4D97-AF65-F5344CB8AC3E}">
-        <p14:creationId xmlns:p14="http://schemas.microsoft.com/office/powerpoint/2010/main" val="2963817107"/>
+        <p14:creationId xmlns:p14="http://schemas.microsoft.com/office/powerpoint/2010/main" val="3110633740"/>
       </p:ext>
     </p:extLst>
   </p:cSld>
@@ -942,6 +860,14 @@
 <file path=ppt/slideLayouts/slideLayout3.xml><?xml version="1.0" encoding="utf-8"?>
 <p:sldLayout xmlns:a="http://schemas.openxmlformats.org/drawingml/2006/main" xmlns:r="http://schemas.openxmlformats.org/officeDocument/2006/relationships" xmlns:p="http://schemas.openxmlformats.org/presentationml/2006/main" type="secHead" preserve="1">
   <p:cSld name="Section Header">
+    <p:bg>
+      <p:bgPr>
+        <a:solidFill>
+          <a:schemeClr val="accent1"/>
+        </a:solidFill>
+        <a:effectLst/>
+      </p:bgPr>
+    </p:bg>
     <p:spTree>
       <p:nvGrpSpPr>
         <p:cNvPr id="1" name=""/>
@@ -958,74 +884,76 @@
       </p:grpSpPr>
       <p:sp>
         <p:nvSpPr>
-          <p:cNvPr id="2" name="Title 1">
-            <a:extLst>
-              <a:ext uri="{FF2B5EF4-FFF2-40B4-BE49-F238E27FC236}">
-                <a16:creationId xmlns:a16="http://schemas.microsoft.com/office/drawing/2014/main" id="{4F7DF87F-E3D5-C44A-8B60-2D882F4C50B7}"/>
-              </a:ext>
-            </a:extLst>
-          </p:cNvPr>
+          <p:cNvPr id="2" name="Title 1"/>
           <p:cNvSpPr>
             <a:spLocks noGrp="1"/>
           </p:cNvSpPr>
           <p:nvPr>
             <p:ph type="title"/>
+          </p:nvPr>
+        </p:nvSpPr>
+        <p:spPr bwMode="blackWhite">
+          <a:xfrm>
+            <a:off x="1600200" y="2386744"/>
+            <a:ext cx="8991600" cy="1645920"/>
+          </a:xfrm>
+          <a:solidFill>
+            <a:srgbClr val="FFFFFF"/>
+          </a:solidFill>
+          <a:ln w="38100">
+            <a:solidFill>
+              <a:srgbClr val="404040"/>
+            </a:solidFill>
+          </a:ln>
+        </p:spPr>
+        <p:txBody>
+          <a:bodyPr lIns="274320" rIns="274320" anchor="ctr" anchorCtr="1">
+            <a:normAutofit/>
+          </a:bodyPr>
+          <a:lstStyle>
+            <a:lvl1pPr>
+              <a:defRPr sz="3800">
+                <a:solidFill>
+                  <a:srgbClr val="262626"/>
+                </a:solidFill>
+              </a:defRPr>
+            </a:lvl1pPr>
+          </a:lstStyle>
+          <a:p>
+            <a:r>
+              <a:rPr lang="en-GB"/>
+              <a:t>Click to edit Master title style</a:t>
+            </a:r>
+            <a:endParaRPr lang="en-US" dirty="0"/>
+          </a:p>
+        </p:txBody>
+      </p:sp>
+      <p:sp>
+        <p:nvSpPr>
+          <p:cNvPr id="3" name="Text Placeholder 2"/>
+          <p:cNvSpPr>
+            <a:spLocks noGrp="1"/>
+          </p:cNvSpPr>
+          <p:nvPr>
+            <p:ph type="body" idx="1"/>
           </p:nvPr>
         </p:nvSpPr>
         <p:spPr>
           <a:xfrm>
-            <a:off x="831850" y="1709738"/>
-            <a:ext cx="10515600" cy="2852737"/>
+            <a:off x="2695194" y="4352465"/>
+            <a:ext cx="6801612" cy="1265082"/>
           </a:xfrm>
         </p:spPr>
         <p:txBody>
-          <a:bodyPr anchor="b"/>
-          <a:lstStyle>
-            <a:lvl1pPr>
-              <a:defRPr sz="6000"/>
-            </a:lvl1pPr>
-          </a:lstStyle>
-          <a:p>
-            <a:r>
-              <a:rPr lang="en-GB"/>
-              <a:t>Click to edit Master title style</a:t>
-            </a:r>
-            <a:endParaRPr lang="en-US"/>
-          </a:p>
-        </p:txBody>
-      </p:sp>
-      <p:sp>
-        <p:nvSpPr>
-          <p:cNvPr id="3" name="Text Placeholder 2">
-            <a:extLst>
-              <a:ext uri="{FF2B5EF4-FFF2-40B4-BE49-F238E27FC236}">
-                <a16:creationId xmlns:a16="http://schemas.microsoft.com/office/drawing/2014/main" id="{542EBFD2-5164-E346-B1B8-F2DFD88924F1}"/>
-              </a:ext>
-            </a:extLst>
-          </p:cNvPr>
-          <p:cNvSpPr>
-            <a:spLocks noGrp="1"/>
-          </p:cNvSpPr>
-          <p:nvPr>
-            <p:ph type="body" idx="1"/>
-          </p:nvPr>
-        </p:nvSpPr>
-        <p:spPr>
-          <a:xfrm>
-            <a:off x="831850" y="4589463"/>
-            <a:ext cx="10515600" cy="1500187"/>
-          </a:xfrm>
-        </p:spPr>
-        <p:txBody>
-          <a:bodyPr/>
+          <a:bodyPr anchor="t" anchorCtr="1">
+            <a:normAutofit/>
+          </a:bodyPr>
           <a:lstStyle>
             <a:lvl1pPr marL="0" indent="0">
               <a:buNone/>
-              <a:defRPr sz="2400">
+              <a:defRPr sz="2000">
                 <a:solidFill>
-                  <a:schemeClr val="tx1">
-                    <a:tint val="75000"/>
-                  </a:schemeClr>
+                  <a:schemeClr val="tx1"/>
                 </a:solidFill>
               </a:defRPr>
             </a:lvl1pPr>
@@ -1121,13 +1049,7 @@
       </p:sp>
       <p:sp>
         <p:nvSpPr>
-          <p:cNvPr id="4" name="Date Placeholder 3">
-            <a:extLst>
-              <a:ext uri="{FF2B5EF4-FFF2-40B4-BE49-F238E27FC236}">
-                <a16:creationId xmlns:a16="http://schemas.microsoft.com/office/drawing/2014/main" id="{A3DEE536-00D1-5147-B91A-85BB58588126}"/>
-              </a:ext>
-            </a:extLst>
-          </p:cNvPr>
+          <p:cNvPr id="7" name="Date Placeholder 6"/>
           <p:cNvSpPr>
             <a:spLocks noGrp="1"/>
           </p:cNvSpPr>
@@ -1150,13 +1072,7 @@
       </p:sp>
       <p:sp>
         <p:nvSpPr>
-          <p:cNvPr id="5" name="Footer Placeholder 4">
-            <a:extLst>
-              <a:ext uri="{FF2B5EF4-FFF2-40B4-BE49-F238E27FC236}">
-                <a16:creationId xmlns:a16="http://schemas.microsoft.com/office/drawing/2014/main" id="{76FB4D5F-D666-6345-BAA5-ADB75C0DC765}"/>
-              </a:ext>
-            </a:extLst>
-          </p:cNvPr>
+          <p:cNvPr id="8" name="Footer Placeholder 7"/>
           <p:cNvSpPr>
             <a:spLocks noGrp="1"/>
           </p:cNvSpPr>
@@ -1175,13 +1091,7 @@
       </p:sp>
       <p:sp>
         <p:nvSpPr>
-          <p:cNvPr id="6" name="Slide Number Placeholder 5">
-            <a:extLst>
-              <a:ext uri="{FF2B5EF4-FFF2-40B4-BE49-F238E27FC236}">
-                <a16:creationId xmlns:a16="http://schemas.microsoft.com/office/drawing/2014/main" id="{B61AFE4C-322E-0F4F-9DB1-DFD7E1EDFCDB}"/>
-              </a:ext>
-            </a:extLst>
-          </p:cNvPr>
+          <p:cNvPr id="9" name="Slide Number Placeholder 8"/>
           <p:cNvSpPr>
             <a:spLocks noGrp="1"/>
           </p:cNvSpPr>
@@ -1205,12 +1115,12 @@
     </p:spTree>
     <p:extLst>
       <p:ext uri="{BB962C8B-B14F-4D97-AF65-F5344CB8AC3E}">
-        <p14:creationId xmlns:p14="http://schemas.microsoft.com/office/powerpoint/2010/main" val="2115215411"/>
+        <p14:creationId xmlns:p14="http://schemas.microsoft.com/office/powerpoint/2010/main" val="3091249342"/>
       </p:ext>
     </p:extLst>
   </p:cSld>
   <p:clrMapOvr>
-    <a:masterClrMapping/>
+    <a:overrideClrMapping bg1="dk1" tx1="lt1" bg2="dk2" tx2="lt2" accent1="accent1" accent2="accent2" accent3="accent3" accent4="accent4" accent5="accent5" accent6="accent6" hlink="hlink" folHlink="folHlink"/>
   </p:clrMapOvr>
 </p:sldLayout>
 </file>
@@ -1234,13 +1144,7 @@
       </p:grpSpPr>
       <p:sp>
         <p:nvSpPr>
-          <p:cNvPr id="2" name="Title 1">
-            <a:extLst>
-              <a:ext uri="{FF2B5EF4-FFF2-40B4-BE49-F238E27FC236}">
-                <a16:creationId xmlns:a16="http://schemas.microsoft.com/office/drawing/2014/main" id="{DA83D0BF-8E28-F846-A4B2-6A4388AF2F9E}"/>
-              </a:ext>
-            </a:extLst>
-          </p:cNvPr>
+          <p:cNvPr id="2" name="Title 1"/>
           <p:cNvSpPr>
             <a:spLocks noGrp="1"/>
           </p:cNvSpPr>
@@ -1257,19 +1161,13 @@
               <a:rPr lang="en-GB"/>
               <a:t>Click to edit Master title style</a:t>
             </a:r>
-            <a:endParaRPr lang="en-US"/>
-          </a:p>
-        </p:txBody>
-      </p:sp>
-      <p:sp>
-        <p:nvSpPr>
-          <p:cNvPr id="3" name="Content Placeholder 2">
-            <a:extLst>
-              <a:ext uri="{FF2B5EF4-FFF2-40B4-BE49-F238E27FC236}">
-                <a16:creationId xmlns:a16="http://schemas.microsoft.com/office/drawing/2014/main" id="{9AE5B6EC-CA4C-C243-AD17-4588914BB8ED}"/>
-              </a:ext>
-            </a:extLst>
-          </p:cNvPr>
+            <a:endParaRPr lang="en-US" dirty="0"/>
+          </a:p>
+        </p:txBody>
+      </p:sp>
+      <p:sp>
+        <p:nvSpPr>
+          <p:cNvPr id="3" name="Content Placeholder 2"/>
           <p:cNvSpPr>
             <a:spLocks noGrp="1"/>
           </p:cNvSpPr>
@@ -1279,8 +1177,8 @@
         </p:nvSpPr>
         <p:spPr>
           <a:xfrm>
-            <a:off x="838200" y="1825625"/>
-            <a:ext cx="5181600" cy="4351338"/>
+            <a:off x="1581912" y="2638044"/>
+            <a:ext cx="4271771" cy="3101982"/>
           </a:xfrm>
         </p:spPr>
         <p:txBody>
@@ -1320,19 +1218,13 @@
               <a:rPr lang="en-GB"/>
               <a:t>Fifth level</a:t>
             </a:r>
-            <a:endParaRPr lang="en-US"/>
-          </a:p>
-        </p:txBody>
-      </p:sp>
-      <p:sp>
-        <p:nvSpPr>
-          <p:cNvPr id="4" name="Content Placeholder 3">
-            <a:extLst>
-              <a:ext uri="{FF2B5EF4-FFF2-40B4-BE49-F238E27FC236}">
-                <a16:creationId xmlns:a16="http://schemas.microsoft.com/office/drawing/2014/main" id="{96E1C8FD-65E4-3F49-B006-A19390669373}"/>
-              </a:ext>
-            </a:extLst>
-          </p:cNvPr>
+            <a:endParaRPr lang="en-US" dirty="0"/>
+          </a:p>
+        </p:txBody>
+      </p:sp>
+      <p:sp>
+        <p:nvSpPr>
+          <p:cNvPr id="4" name="Content Placeholder 3"/>
           <p:cNvSpPr>
             <a:spLocks noGrp="1"/>
           </p:cNvSpPr>
@@ -1342,8 +1234,8 @@
         </p:nvSpPr>
         <p:spPr>
           <a:xfrm>
-            <a:off x="6172200" y="1825625"/>
-            <a:ext cx="5181600" cy="4351338"/>
+            <a:off x="6338315" y="2638044"/>
+            <a:ext cx="4270247" cy="3101982"/>
           </a:xfrm>
         </p:spPr>
         <p:txBody>
@@ -1383,19 +1275,13 @@
               <a:rPr lang="en-GB"/>
               <a:t>Fifth level</a:t>
             </a:r>
-            <a:endParaRPr lang="en-US"/>
-          </a:p>
-        </p:txBody>
-      </p:sp>
-      <p:sp>
-        <p:nvSpPr>
-          <p:cNvPr id="5" name="Date Placeholder 4">
-            <a:extLst>
-              <a:ext uri="{FF2B5EF4-FFF2-40B4-BE49-F238E27FC236}">
-                <a16:creationId xmlns:a16="http://schemas.microsoft.com/office/drawing/2014/main" id="{D5642ECD-B774-6144-AA21-6BB6A590BCF5}"/>
-              </a:ext>
-            </a:extLst>
-          </p:cNvPr>
+            <a:endParaRPr lang="en-US" dirty="0"/>
+          </a:p>
+        </p:txBody>
+      </p:sp>
+      <p:sp>
+        <p:nvSpPr>
+          <p:cNvPr id="8" name="Date Placeholder 7"/>
           <p:cNvSpPr>
             <a:spLocks noGrp="1"/>
           </p:cNvSpPr>
@@ -1418,13 +1304,7 @@
       </p:sp>
       <p:sp>
         <p:nvSpPr>
-          <p:cNvPr id="6" name="Footer Placeholder 5">
-            <a:extLst>
-              <a:ext uri="{FF2B5EF4-FFF2-40B4-BE49-F238E27FC236}">
-                <a16:creationId xmlns:a16="http://schemas.microsoft.com/office/drawing/2014/main" id="{C8B68915-8102-044A-A7A3-5489AF8C472E}"/>
-              </a:ext>
-            </a:extLst>
-          </p:cNvPr>
+          <p:cNvPr id="9" name="Footer Placeholder 8"/>
           <p:cNvSpPr>
             <a:spLocks noGrp="1"/>
           </p:cNvSpPr>
@@ -1443,13 +1323,7 @@
       </p:sp>
       <p:sp>
         <p:nvSpPr>
-          <p:cNvPr id="7" name="Slide Number Placeholder 6">
-            <a:extLst>
-              <a:ext uri="{FF2B5EF4-FFF2-40B4-BE49-F238E27FC236}">
-                <a16:creationId xmlns:a16="http://schemas.microsoft.com/office/drawing/2014/main" id="{D49C5E1E-27D0-6A4F-8233-09507877B44C}"/>
-              </a:ext>
-            </a:extLst>
-          </p:cNvPr>
+          <p:cNvPr id="10" name="Slide Number Placeholder 9"/>
           <p:cNvSpPr>
             <a:spLocks noGrp="1"/>
           </p:cNvSpPr>
@@ -1473,7 +1347,7 @@
     </p:spTree>
     <p:extLst>
       <p:ext uri="{BB962C8B-B14F-4D97-AF65-F5344CB8AC3E}">
-        <p14:creationId xmlns:p14="http://schemas.microsoft.com/office/powerpoint/2010/main" val="1707658557"/>
+        <p14:creationId xmlns:p14="http://schemas.microsoft.com/office/powerpoint/2010/main" val="3508820362"/>
       </p:ext>
     </p:extLst>
   </p:cSld>
@@ -1502,70 +1376,38 @@
       </p:grpSpPr>
       <p:sp>
         <p:nvSpPr>
-          <p:cNvPr id="2" name="Title 1">
-            <a:extLst>
-              <a:ext uri="{FF2B5EF4-FFF2-40B4-BE49-F238E27FC236}">
-                <a16:creationId xmlns:a16="http://schemas.microsoft.com/office/drawing/2014/main" id="{746444F9-CCF6-6B49-8B19-14F300AD466B}"/>
-              </a:ext>
-            </a:extLst>
-          </p:cNvPr>
-          <p:cNvSpPr>
-            <a:spLocks noGrp="1"/>
-          </p:cNvSpPr>
-          <p:nvPr>
-            <p:ph type="title"/>
+          <p:cNvPr id="3" name="Text Placeholder 2"/>
+          <p:cNvSpPr>
+            <a:spLocks noGrp="1"/>
+          </p:cNvSpPr>
+          <p:nvPr>
+            <p:ph type="body" idx="1"/>
           </p:nvPr>
         </p:nvSpPr>
         <p:spPr>
           <a:xfrm>
-            <a:off x="839788" y="365125"/>
-            <a:ext cx="10515600" cy="1325563"/>
+            <a:off x="1583436" y="2313433"/>
+            <a:ext cx="4270248" cy="704087"/>
           </a:xfrm>
         </p:spPr>
         <p:txBody>
-          <a:bodyPr/>
-          <a:lstStyle/>
-          <a:p>
-            <a:r>
-              <a:rPr lang="en-GB"/>
-              <a:t>Click to edit Master title style</a:t>
-            </a:r>
-            <a:endParaRPr lang="en-US"/>
-          </a:p>
-        </p:txBody>
-      </p:sp>
-      <p:sp>
-        <p:nvSpPr>
-          <p:cNvPr id="3" name="Text Placeholder 2">
-            <a:extLst>
-              <a:ext uri="{FF2B5EF4-FFF2-40B4-BE49-F238E27FC236}">
-                <a16:creationId xmlns:a16="http://schemas.microsoft.com/office/drawing/2014/main" id="{CE32BE30-4943-184E-A5B8-E95FD1FD4413}"/>
-              </a:ext>
-            </a:extLst>
-          </p:cNvPr>
-          <p:cNvSpPr>
-            <a:spLocks noGrp="1"/>
-          </p:cNvSpPr>
-          <p:nvPr>
-            <p:ph type="body" idx="1"/>
-          </p:nvPr>
-        </p:nvSpPr>
-        <p:spPr>
-          <a:xfrm>
-            <a:off x="839788" y="1681163"/>
-            <a:ext cx="5157787" cy="823912"/>
-          </a:xfrm>
-        </p:spPr>
-        <p:txBody>
-          <a:bodyPr anchor="b"/>
+          <a:bodyPr anchor="b" anchorCtr="1">
+            <a:normAutofit/>
+          </a:bodyPr>
           <a:lstStyle>
-            <a:lvl1pPr marL="0" indent="0">
-              <a:buNone/>
-              <a:defRPr sz="2400" b="1"/>
+            <a:lvl1pPr marL="0" indent="0" algn="ctr">
+              <a:buNone/>
+              <a:defRPr sz="1900" b="0" cap="all" spc="100" baseline="0">
+                <a:solidFill>
+                  <a:schemeClr val="accent2">
+                    <a:lumMod val="75000"/>
+                  </a:schemeClr>
+                </a:solidFill>
+              </a:defRPr>
             </a:lvl1pPr>
             <a:lvl2pPr marL="457200" indent="0">
               <a:buNone/>
-              <a:defRPr sz="2000" b="1"/>
+              <a:defRPr sz="1900" b="1"/>
             </a:lvl2pPr>
             <a:lvl3pPr marL="914400" indent="0">
               <a:buNone/>
@@ -1607,13 +1449,7 @@
       </p:sp>
       <p:sp>
         <p:nvSpPr>
-          <p:cNvPr id="4" name="Content Placeholder 3">
-            <a:extLst>
-              <a:ext uri="{FF2B5EF4-FFF2-40B4-BE49-F238E27FC236}">
-                <a16:creationId xmlns:a16="http://schemas.microsoft.com/office/drawing/2014/main" id="{8DA82911-8B1B-F645-9C82-DEEB8BE0DF02}"/>
-              </a:ext>
-            </a:extLst>
-          </p:cNvPr>
+          <p:cNvPr id="4" name="Content Placeholder 3"/>
           <p:cNvSpPr>
             <a:spLocks noGrp="1"/>
           </p:cNvSpPr>
@@ -1623,8 +1459,8 @@
         </p:nvSpPr>
         <p:spPr>
           <a:xfrm>
-            <a:off x="839788" y="2505075"/>
-            <a:ext cx="5157787" cy="3684588"/>
+            <a:off x="1583436" y="3143250"/>
+            <a:ext cx="4270248" cy="2596776"/>
           </a:xfrm>
         </p:spPr>
         <p:txBody>
@@ -1664,42 +1500,105 @@
               <a:rPr lang="en-GB"/>
               <a:t>Fifth level</a:t>
             </a:r>
-            <a:endParaRPr lang="en-US"/>
-          </a:p>
-        </p:txBody>
-      </p:sp>
-      <p:sp>
-        <p:nvSpPr>
-          <p:cNvPr id="5" name="Text Placeholder 4">
-            <a:extLst>
-              <a:ext uri="{FF2B5EF4-FFF2-40B4-BE49-F238E27FC236}">
-                <a16:creationId xmlns:a16="http://schemas.microsoft.com/office/drawing/2014/main" id="{E1A5CA82-3146-DF47-9920-7FEEEC68697A}"/>
-              </a:ext>
-            </a:extLst>
-          </p:cNvPr>
-          <p:cNvSpPr>
-            <a:spLocks noGrp="1"/>
-          </p:cNvSpPr>
-          <p:nvPr>
-            <p:ph type="body" sz="quarter" idx="3"/>
+            <a:endParaRPr lang="en-US" dirty="0"/>
+          </a:p>
+        </p:txBody>
+      </p:sp>
+      <p:sp>
+        <p:nvSpPr>
+          <p:cNvPr id="6" name="Content Placeholder 5"/>
+          <p:cNvSpPr>
+            <a:spLocks noGrp="1"/>
+          </p:cNvSpPr>
+          <p:nvPr>
+            <p:ph sz="quarter" idx="4"/>
           </p:nvPr>
         </p:nvSpPr>
         <p:spPr>
           <a:xfrm>
-            <a:off x="6172200" y="1681163"/>
-            <a:ext cx="5183188" cy="823912"/>
+            <a:off x="6338316" y="3143250"/>
+            <a:ext cx="4253484" cy="2596776"/>
           </a:xfrm>
         </p:spPr>
         <p:txBody>
-          <a:bodyPr anchor="b"/>
+          <a:bodyPr/>
           <a:lstStyle>
-            <a:lvl1pPr marL="0" indent="0">
-              <a:buNone/>
-              <a:defRPr sz="2400" b="1"/>
+            <a:lvl5pPr>
+              <a:defRPr/>
+            </a:lvl5pPr>
+          </a:lstStyle>
+          <a:p>
+            <a:pPr lvl="0"/>
+            <a:r>
+              <a:rPr lang="en-GB"/>
+              <a:t>Click to edit Master text styles</a:t>
+            </a:r>
+          </a:p>
+          <a:p>
+            <a:pPr lvl="1"/>
+            <a:r>
+              <a:rPr lang="en-GB"/>
+              <a:t>Second level</a:t>
+            </a:r>
+          </a:p>
+          <a:p>
+            <a:pPr lvl="2"/>
+            <a:r>
+              <a:rPr lang="en-GB"/>
+              <a:t>Third level</a:t>
+            </a:r>
+          </a:p>
+          <a:p>
+            <a:pPr lvl="3"/>
+            <a:r>
+              <a:rPr lang="en-GB"/>
+              <a:t>Fourth level</a:t>
+            </a:r>
+          </a:p>
+          <a:p>
+            <a:pPr lvl="4"/>
+            <a:r>
+              <a:rPr lang="en-GB"/>
+              <a:t>Fifth level</a:t>
+            </a:r>
+            <a:endParaRPr lang="en-US" dirty="0"/>
+          </a:p>
+        </p:txBody>
+      </p:sp>
+      <p:sp>
+        <p:nvSpPr>
+          <p:cNvPr id="11" name="Text Placeholder 4"/>
+          <p:cNvSpPr>
+            <a:spLocks noGrp="1"/>
+          </p:cNvSpPr>
+          <p:nvPr>
+            <p:ph type="body" sz="quarter" idx="13"/>
+          </p:nvPr>
+        </p:nvSpPr>
+        <p:spPr>
+          <a:xfrm>
+            <a:off x="6338316" y="2313433"/>
+            <a:ext cx="4270248" cy="704087"/>
+          </a:xfrm>
+        </p:spPr>
+        <p:txBody>
+          <a:bodyPr anchor="b" anchorCtr="1">
+            <a:normAutofit/>
+          </a:bodyPr>
+          <a:lstStyle>
+            <a:lvl1pPr marL="0" indent="0" algn="ctr">
+              <a:buNone/>
+              <a:defRPr sz="1900" b="0" cap="all" spc="100" baseline="0">
+                <a:solidFill>
+                  <a:schemeClr val="accent2">
+                    <a:lumMod val="75000"/>
+                  </a:schemeClr>
+                </a:solidFill>
+              </a:defRPr>
             </a:lvl1pPr>
             <a:lvl2pPr marL="457200" indent="0">
               <a:buNone/>
-              <a:defRPr sz="2000" b="1"/>
+              <a:defRPr sz="1900" b="1"/>
             </a:lvl2pPr>
             <a:lvl3pPr marL="914400" indent="0">
               <a:buNone/>
@@ -1741,76 +1640,7 @@
       </p:sp>
       <p:sp>
         <p:nvSpPr>
-          <p:cNvPr id="6" name="Content Placeholder 5">
-            <a:extLst>
-              <a:ext uri="{FF2B5EF4-FFF2-40B4-BE49-F238E27FC236}">
-                <a16:creationId xmlns:a16="http://schemas.microsoft.com/office/drawing/2014/main" id="{FC5D732B-6303-794B-8B11-66FE4AE1092D}"/>
-              </a:ext>
-            </a:extLst>
-          </p:cNvPr>
-          <p:cNvSpPr>
-            <a:spLocks noGrp="1"/>
-          </p:cNvSpPr>
-          <p:nvPr>
-            <p:ph sz="quarter" idx="4"/>
-          </p:nvPr>
-        </p:nvSpPr>
-        <p:spPr>
-          <a:xfrm>
-            <a:off x="6172200" y="2505075"/>
-            <a:ext cx="5183188" cy="3684588"/>
-          </a:xfrm>
-        </p:spPr>
-        <p:txBody>
-          <a:bodyPr/>
-          <a:lstStyle/>
-          <a:p>
-            <a:pPr lvl="0"/>
-            <a:r>
-              <a:rPr lang="en-GB"/>
-              <a:t>Click to edit Master text styles</a:t>
-            </a:r>
-          </a:p>
-          <a:p>
-            <a:pPr lvl="1"/>
-            <a:r>
-              <a:rPr lang="en-GB"/>
-              <a:t>Second level</a:t>
-            </a:r>
-          </a:p>
-          <a:p>
-            <a:pPr lvl="2"/>
-            <a:r>
-              <a:rPr lang="en-GB"/>
-              <a:t>Third level</a:t>
-            </a:r>
-          </a:p>
-          <a:p>
-            <a:pPr lvl="3"/>
-            <a:r>
-              <a:rPr lang="en-GB"/>
-              <a:t>Fourth level</a:t>
-            </a:r>
-          </a:p>
-          <a:p>
-            <a:pPr lvl="4"/>
-            <a:r>
-              <a:rPr lang="en-GB"/>
-              <a:t>Fifth level</a:t>
-            </a:r>
-            <a:endParaRPr lang="en-US"/>
-          </a:p>
-        </p:txBody>
-      </p:sp>
-      <p:sp>
-        <p:nvSpPr>
-          <p:cNvPr id="7" name="Date Placeholder 6">
-            <a:extLst>
-              <a:ext uri="{FF2B5EF4-FFF2-40B4-BE49-F238E27FC236}">
-                <a16:creationId xmlns:a16="http://schemas.microsoft.com/office/drawing/2014/main" id="{68AA5495-E239-9F4C-AE3C-9D56745FDAED}"/>
-              </a:ext>
-            </a:extLst>
-          </p:cNvPr>
+          <p:cNvPr id="7" name="Date Placeholder 6"/>
           <p:cNvSpPr>
             <a:spLocks noGrp="1"/>
           </p:cNvSpPr>
@@ -1833,13 +1663,7 @@
       </p:sp>
       <p:sp>
         <p:nvSpPr>
-          <p:cNvPr id="8" name="Footer Placeholder 7">
-            <a:extLst>
-              <a:ext uri="{FF2B5EF4-FFF2-40B4-BE49-F238E27FC236}">
-                <a16:creationId xmlns:a16="http://schemas.microsoft.com/office/drawing/2014/main" id="{297C2458-4E64-2648-BB96-8A76F02B22F4}"/>
-              </a:ext>
-            </a:extLst>
-          </p:cNvPr>
+          <p:cNvPr id="8" name="Footer Placeholder 7"/>
           <p:cNvSpPr>
             <a:spLocks noGrp="1"/>
           </p:cNvSpPr>
@@ -1858,13 +1682,7 @@
       </p:sp>
       <p:sp>
         <p:nvSpPr>
-          <p:cNvPr id="9" name="Slide Number Placeholder 8">
-            <a:extLst>
-              <a:ext uri="{FF2B5EF4-FFF2-40B4-BE49-F238E27FC236}">
-                <a16:creationId xmlns:a16="http://schemas.microsoft.com/office/drawing/2014/main" id="{23C11405-B3D4-BF48-BF10-A7A8A429495E}"/>
-              </a:ext>
-            </a:extLst>
-          </p:cNvPr>
+          <p:cNvPr id="9" name="Slide Number Placeholder 8"/>
           <p:cNvSpPr>
             <a:spLocks noGrp="1"/>
           </p:cNvSpPr>
@@ -1885,10 +1703,33 @@
           </a:p>
         </p:txBody>
       </p:sp>
+      <p:sp>
+        <p:nvSpPr>
+          <p:cNvPr id="10" name="Title 9"/>
+          <p:cNvSpPr>
+            <a:spLocks noGrp="1"/>
+          </p:cNvSpPr>
+          <p:nvPr>
+            <p:ph type="title"/>
+          </p:nvPr>
+        </p:nvSpPr>
+        <p:spPr/>
+        <p:txBody>
+          <a:bodyPr/>
+          <a:lstStyle/>
+          <a:p>
+            <a:r>
+              <a:rPr lang="en-GB"/>
+              <a:t>Click to edit Master title style</a:t>
+            </a:r>
+            <a:endParaRPr lang="en-US" dirty="0"/>
+          </a:p>
+        </p:txBody>
+      </p:sp>
     </p:spTree>
     <p:extLst>
       <p:ext uri="{BB962C8B-B14F-4D97-AF65-F5344CB8AC3E}">
-        <p14:creationId xmlns:p14="http://schemas.microsoft.com/office/powerpoint/2010/main" val="3292632616"/>
+        <p14:creationId xmlns:p14="http://schemas.microsoft.com/office/powerpoint/2010/main" val="1952903076"/>
       </p:ext>
     </p:extLst>
   </p:cSld>
@@ -1917,13 +1758,7 @@
       </p:grpSpPr>
       <p:sp>
         <p:nvSpPr>
-          <p:cNvPr id="2" name="Title 1">
-            <a:extLst>
-              <a:ext uri="{FF2B5EF4-FFF2-40B4-BE49-F238E27FC236}">
-                <a16:creationId xmlns:a16="http://schemas.microsoft.com/office/drawing/2014/main" id="{C8A8156E-003A-AC44-A76E-D22D815229A7}"/>
-              </a:ext>
-            </a:extLst>
-          </p:cNvPr>
+          <p:cNvPr id="2" name="Title 1"/>
           <p:cNvSpPr>
             <a:spLocks noGrp="1"/>
           </p:cNvSpPr>
@@ -1940,19 +1775,13 @@
               <a:rPr lang="en-GB"/>
               <a:t>Click to edit Master title style</a:t>
             </a:r>
-            <a:endParaRPr lang="en-US"/>
-          </a:p>
-        </p:txBody>
-      </p:sp>
-      <p:sp>
-        <p:nvSpPr>
-          <p:cNvPr id="3" name="Date Placeholder 2">
-            <a:extLst>
-              <a:ext uri="{FF2B5EF4-FFF2-40B4-BE49-F238E27FC236}">
-                <a16:creationId xmlns:a16="http://schemas.microsoft.com/office/drawing/2014/main" id="{B794A10F-9244-B345-A2A4-4AF2334E37D1}"/>
-              </a:ext>
-            </a:extLst>
-          </p:cNvPr>
+            <a:endParaRPr lang="en-US" dirty="0"/>
+          </a:p>
+        </p:txBody>
+      </p:sp>
+      <p:sp>
+        <p:nvSpPr>
+          <p:cNvPr id="3" name="Date Placeholder 2"/>
           <p:cNvSpPr>
             <a:spLocks noGrp="1"/>
           </p:cNvSpPr>
@@ -1975,13 +1804,7 @@
       </p:sp>
       <p:sp>
         <p:nvSpPr>
-          <p:cNvPr id="4" name="Footer Placeholder 3">
-            <a:extLst>
-              <a:ext uri="{FF2B5EF4-FFF2-40B4-BE49-F238E27FC236}">
-                <a16:creationId xmlns:a16="http://schemas.microsoft.com/office/drawing/2014/main" id="{19EDD1E9-CCE4-2948-9902-18D08D9F35A5}"/>
-              </a:ext>
-            </a:extLst>
-          </p:cNvPr>
+          <p:cNvPr id="4" name="Footer Placeholder 3"/>
           <p:cNvSpPr>
             <a:spLocks noGrp="1"/>
           </p:cNvSpPr>
@@ -2000,13 +1823,7 @@
       </p:sp>
       <p:sp>
         <p:nvSpPr>
-          <p:cNvPr id="5" name="Slide Number Placeholder 4">
-            <a:extLst>
-              <a:ext uri="{FF2B5EF4-FFF2-40B4-BE49-F238E27FC236}">
-                <a16:creationId xmlns:a16="http://schemas.microsoft.com/office/drawing/2014/main" id="{A6C0816C-20AF-F04C-867F-7077E722DFD9}"/>
-              </a:ext>
-            </a:extLst>
-          </p:cNvPr>
+          <p:cNvPr id="5" name="Slide Number Placeholder 4"/>
           <p:cNvSpPr>
             <a:spLocks noGrp="1"/>
           </p:cNvSpPr>
@@ -2030,7 +1847,7 @@
     </p:spTree>
     <p:extLst>
       <p:ext uri="{BB962C8B-B14F-4D97-AF65-F5344CB8AC3E}">
-        <p14:creationId xmlns:p14="http://schemas.microsoft.com/office/powerpoint/2010/main" val="916093223"/>
+        <p14:creationId xmlns:p14="http://schemas.microsoft.com/office/powerpoint/2010/main" val="1330420799"/>
       </p:ext>
     </p:extLst>
   </p:cSld>
@@ -2059,13 +1876,7 @@
       </p:grpSpPr>
       <p:sp>
         <p:nvSpPr>
-          <p:cNvPr id="2" name="Date Placeholder 1">
-            <a:extLst>
-              <a:ext uri="{FF2B5EF4-FFF2-40B4-BE49-F238E27FC236}">
-                <a16:creationId xmlns:a16="http://schemas.microsoft.com/office/drawing/2014/main" id="{0D733932-29B0-7049-AB89-0E9FD57E9157}"/>
-              </a:ext>
-            </a:extLst>
-          </p:cNvPr>
+          <p:cNvPr id="2" name="Date Placeholder 1"/>
           <p:cNvSpPr>
             <a:spLocks noGrp="1"/>
           </p:cNvSpPr>
@@ -2088,13 +1899,7 @@
       </p:sp>
       <p:sp>
         <p:nvSpPr>
-          <p:cNvPr id="3" name="Footer Placeholder 2">
-            <a:extLst>
-              <a:ext uri="{FF2B5EF4-FFF2-40B4-BE49-F238E27FC236}">
-                <a16:creationId xmlns:a16="http://schemas.microsoft.com/office/drawing/2014/main" id="{ADD9689B-7F83-4944-8986-08827BD2B9B5}"/>
-              </a:ext>
-            </a:extLst>
-          </p:cNvPr>
+          <p:cNvPr id="3" name="Footer Placeholder 2"/>
           <p:cNvSpPr>
             <a:spLocks noGrp="1"/>
           </p:cNvSpPr>
@@ -2113,13 +1918,7 @@
       </p:sp>
       <p:sp>
         <p:nvSpPr>
-          <p:cNvPr id="4" name="Slide Number Placeholder 3">
-            <a:extLst>
-              <a:ext uri="{FF2B5EF4-FFF2-40B4-BE49-F238E27FC236}">
-                <a16:creationId xmlns:a16="http://schemas.microsoft.com/office/drawing/2014/main" id="{92EB11BE-D4DD-2048-B714-054FD6FE8BBE}"/>
-              </a:ext>
-            </a:extLst>
-          </p:cNvPr>
+          <p:cNvPr id="4" name="Slide Number Placeholder 3"/>
           <p:cNvSpPr>
             <a:spLocks noGrp="1"/>
           </p:cNvSpPr>
@@ -2143,7 +1942,7 @@
     </p:spTree>
     <p:extLst>
       <p:ext uri="{BB962C8B-B14F-4D97-AF65-F5344CB8AC3E}">
-        <p14:creationId xmlns:p14="http://schemas.microsoft.com/office/powerpoint/2010/main" val="589176684"/>
+        <p14:creationId xmlns:p14="http://schemas.microsoft.com/office/powerpoint/2010/main" val="663930657"/>
       </p:ext>
     </p:extLst>
   </p:cSld>
@@ -2172,161 +1971,223 @@
       </p:grpSpPr>
       <p:sp>
         <p:nvSpPr>
-          <p:cNvPr id="2" name="Title 1">
-            <a:extLst>
-              <a:ext uri="{FF2B5EF4-FFF2-40B4-BE49-F238E27FC236}">
-                <a16:creationId xmlns:a16="http://schemas.microsoft.com/office/drawing/2014/main" id="{C022B372-0380-C548-B01A-E9E5F81B15DC}"/>
-              </a:ext>
-            </a:extLst>
-          </p:cNvPr>
-          <p:cNvSpPr>
-            <a:spLocks noGrp="1"/>
-          </p:cNvSpPr>
-          <p:nvPr>
-            <p:ph type="title"/>
-          </p:nvPr>
+          <p:cNvPr id="26" name="Rectangle 25"/>
+          <p:cNvSpPr/>
+          <p:nvPr/>
         </p:nvSpPr>
         <p:spPr>
           <a:xfrm>
-            <a:off x="839788" y="457200"/>
-            <a:ext cx="3932237" cy="1600200"/>
+            <a:off x="0" y="0"/>
+            <a:ext cx="6096000" cy="6858000"/>
+          </a:xfrm>
+          <a:prstGeom prst="rect">
+            <a:avLst/>
+          </a:prstGeom>
+          <a:solidFill>
+            <a:schemeClr val="accent2"/>
+          </a:solidFill>
+          <a:ln>
+            <a:noFill/>
+          </a:ln>
+        </p:spPr>
+        <p:style>
+          <a:lnRef idx="2">
+            <a:schemeClr val="accent1">
+              <a:shade val="50000"/>
+            </a:schemeClr>
+          </a:lnRef>
+          <a:fillRef idx="1">
+            <a:schemeClr val="accent1"/>
+          </a:fillRef>
+          <a:effectRef idx="0">
+            <a:schemeClr val="accent1"/>
+          </a:effectRef>
+          <a:fontRef idx="minor">
+            <a:schemeClr val="lt1"/>
+          </a:fontRef>
+        </p:style>
+      </p:sp>
+      <p:sp>
+        <p:nvSpPr>
+          <p:cNvPr id="2" name="Title 1"/>
+          <p:cNvSpPr>
+            <a:spLocks noGrp="1"/>
+          </p:cNvSpPr>
+          <p:nvPr>
+            <p:ph type="title"/>
+          </p:nvPr>
+        </p:nvSpPr>
+        <p:spPr bwMode="blackWhite">
+          <a:xfrm>
+            <a:off x="804672" y="2243828"/>
+            <a:ext cx="4486656" cy="1141497"/>
+          </a:xfrm>
+          <a:solidFill>
+            <a:srgbClr val="FFFFFF"/>
+          </a:solidFill>
+          <a:ln>
+            <a:solidFill>
+              <a:srgbClr val="404040"/>
+            </a:solidFill>
+          </a:ln>
+        </p:spPr>
+        <p:txBody>
+          <a:bodyPr anchor="ctr" anchorCtr="1">
+            <a:normAutofit/>
+          </a:bodyPr>
+          <a:lstStyle>
+            <a:lvl1pPr>
+              <a:defRPr sz="2200">
+                <a:solidFill>
+                  <a:srgbClr val="262626"/>
+                </a:solidFill>
+              </a:defRPr>
+            </a:lvl1pPr>
+          </a:lstStyle>
+          <a:p>
+            <a:r>
+              <a:rPr lang="en-GB"/>
+              <a:t>Click to edit Master title style</a:t>
+            </a:r>
+            <a:endParaRPr lang="en-US" dirty="0"/>
+          </a:p>
+        </p:txBody>
+      </p:sp>
+      <p:sp>
+        <p:nvSpPr>
+          <p:cNvPr id="3" name="Content Placeholder 2"/>
+          <p:cNvSpPr>
+            <a:spLocks noGrp="1"/>
+          </p:cNvSpPr>
+          <p:nvPr>
+            <p:ph idx="1"/>
+          </p:nvPr>
+        </p:nvSpPr>
+        <p:spPr>
+          <a:xfrm>
+            <a:off x="6736080" y="804672"/>
+            <a:ext cx="4815840" cy="5248656"/>
           </a:xfrm>
         </p:spPr>
         <p:txBody>
-          <a:bodyPr anchor="b"/>
+          <a:bodyPr>
+            <a:normAutofit/>
+          </a:bodyPr>
           <a:lstStyle>
             <a:lvl1pPr>
-              <a:defRPr sz="3200"/>
+              <a:defRPr sz="1900">
+                <a:solidFill>
+                  <a:schemeClr val="tx1"/>
+                </a:solidFill>
+              </a:defRPr>
             </a:lvl1pPr>
+            <a:lvl2pPr>
+              <a:defRPr sz="1600">
+                <a:solidFill>
+                  <a:schemeClr val="tx1"/>
+                </a:solidFill>
+              </a:defRPr>
+            </a:lvl2pPr>
+            <a:lvl3pPr>
+              <a:defRPr sz="1600">
+                <a:solidFill>
+                  <a:schemeClr val="tx1"/>
+                </a:solidFill>
+              </a:defRPr>
+            </a:lvl3pPr>
+            <a:lvl4pPr>
+              <a:defRPr sz="1600">
+                <a:solidFill>
+                  <a:schemeClr val="tx1"/>
+                </a:solidFill>
+              </a:defRPr>
+            </a:lvl4pPr>
+            <a:lvl5pPr>
+              <a:defRPr sz="1600">
+                <a:solidFill>
+                  <a:schemeClr val="tx1"/>
+                </a:solidFill>
+              </a:defRPr>
+            </a:lvl5pPr>
+            <a:lvl6pPr>
+              <a:defRPr sz="1600"/>
+            </a:lvl6pPr>
+            <a:lvl7pPr>
+              <a:defRPr sz="1600"/>
+            </a:lvl7pPr>
+            <a:lvl8pPr>
+              <a:defRPr sz="1600"/>
+            </a:lvl8pPr>
+            <a:lvl9pPr>
+              <a:defRPr sz="1600"/>
+            </a:lvl9pPr>
           </a:lstStyle>
           <a:p>
-            <a:r>
-              <a:rPr lang="en-GB"/>
-              <a:t>Click to edit Master title style</a:t>
-            </a:r>
-            <a:endParaRPr lang="en-US"/>
-          </a:p>
-        </p:txBody>
-      </p:sp>
-      <p:sp>
-        <p:nvSpPr>
-          <p:cNvPr id="3" name="Content Placeholder 2">
-            <a:extLst>
-              <a:ext uri="{FF2B5EF4-FFF2-40B4-BE49-F238E27FC236}">
-                <a16:creationId xmlns:a16="http://schemas.microsoft.com/office/drawing/2014/main" id="{92CF6D7D-C564-0C41-A9FA-9394C7876053}"/>
-              </a:ext>
-            </a:extLst>
-          </p:cNvPr>
-          <p:cNvSpPr>
-            <a:spLocks noGrp="1"/>
-          </p:cNvSpPr>
-          <p:nvPr>
-            <p:ph idx="1"/>
+            <a:pPr lvl="0"/>
+            <a:r>
+              <a:rPr lang="en-GB"/>
+              <a:t>Click to edit Master text styles</a:t>
+            </a:r>
+          </a:p>
+          <a:p>
+            <a:pPr lvl="1"/>
+            <a:r>
+              <a:rPr lang="en-GB"/>
+              <a:t>Second level</a:t>
+            </a:r>
+          </a:p>
+          <a:p>
+            <a:pPr lvl="2"/>
+            <a:r>
+              <a:rPr lang="en-GB"/>
+              <a:t>Third level</a:t>
+            </a:r>
+          </a:p>
+          <a:p>
+            <a:pPr lvl="3"/>
+            <a:r>
+              <a:rPr lang="en-GB"/>
+              <a:t>Fourth level</a:t>
+            </a:r>
+          </a:p>
+          <a:p>
+            <a:pPr lvl="4"/>
+            <a:r>
+              <a:rPr lang="en-GB"/>
+              <a:t>Fifth level</a:t>
+            </a:r>
+            <a:endParaRPr lang="en-US" dirty="0"/>
+          </a:p>
+        </p:txBody>
+      </p:sp>
+      <p:sp>
+        <p:nvSpPr>
+          <p:cNvPr id="4" name="Text Placeholder 3"/>
+          <p:cNvSpPr>
+            <a:spLocks noGrp="1"/>
+          </p:cNvSpPr>
+          <p:nvPr>
+            <p:ph type="body" sz="half" idx="2"/>
           </p:nvPr>
         </p:nvSpPr>
         <p:spPr>
           <a:xfrm>
-            <a:off x="5183188" y="987425"/>
-            <a:ext cx="6172200" cy="4873625"/>
+            <a:off x="1115568" y="3549918"/>
+            <a:ext cx="3794760" cy="2194036"/>
           </a:xfrm>
         </p:spPr>
         <p:txBody>
-          <a:bodyPr/>
+          <a:bodyPr anchor="t" anchorCtr="1">
+            <a:normAutofit/>
+          </a:bodyPr>
           <a:lstStyle>
-            <a:lvl1pPr>
-              <a:defRPr sz="3200"/>
-            </a:lvl1pPr>
-            <a:lvl2pPr>
-              <a:defRPr sz="2800"/>
-            </a:lvl2pPr>
-            <a:lvl3pPr>
-              <a:defRPr sz="2400"/>
-            </a:lvl3pPr>
-            <a:lvl4pPr>
-              <a:defRPr sz="2000"/>
-            </a:lvl4pPr>
-            <a:lvl5pPr>
-              <a:defRPr sz="2000"/>
-            </a:lvl5pPr>
-            <a:lvl6pPr>
-              <a:defRPr sz="2000"/>
-            </a:lvl6pPr>
-            <a:lvl7pPr>
-              <a:defRPr sz="2000"/>
-            </a:lvl7pPr>
-            <a:lvl8pPr>
-              <a:defRPr sz="2000"/>
-            </a:lvl8pPr>
-            <a:lvl9pPr>
-              <a:defRPr sz="2000"/>
-            </a:lvl9pPr>
-          </a:lstStyle>
-          <a:p>
-            <a:pPr lvl="0"/>
-            <a:r>
-              <a:rPr lang="en-GB"/>
-              <a:t>Click to edit Master text styles</a:t>
-            </a:r>
-          </a:p>
-          <a:p>
-            <a:pPr lvl="1"/>
-            <a:r>
-              <a:rPr lang="en-GB"/>
-              <a:t>Second level</a:t>
-            </a:r>
-          </a:p>
-          <a:p>
-            <a:pPr lvl="2"/>
-            <a:r>
-              <a:rPr lang="en-GB"/>
-              <a:t>Third level</a:t>
-            </a:r>
-          </a:p>
-          <a:p>
-            <a:pPr lvl="3"/>
-            <a:r>
-              <a:rPr lang="en-GB"/>
-              <a:t>Fourth level</a:t>
-            </a:r>
-          </a:p>
-          <a:p>
-            <a:pPr lvl="4"/>
-            <a:r>
-              <a:rPr lang="en-GB"/>
-              <a:t>Fifth level</a:t>
-            </a:r>
-            <a:endParaRPr lang="en-US"/>
-          </a:p>
-        </p:txBody>
-      </p:sp>
-      <p:sp>
-        <p:nvSpPr>
-          <p:cNvPr id="4" name="Text Placeholder 3">
-            <a:extLst>
-              <a:ext uri="{FF2B5EF4-FFF2-40B4-BE49-F238E27FC236}">
-                <a16:creationId xmlns:a16="http://schemas.microsoft.com/office/drawing/2014/main" id="{8D2C2A24-67C1-0A40-98FE-CA2EC3423655}"/>
-              </a:ext>
-            </a:extLst>
-          </p:cNvPr>
-          <p:cNvSpPr>
-            <a:spLocks noGrp="1"/>
-          </p:cNvSpPr>
-          <p:nvPr>
-            <p:ph type="body" sz="half" idx="2"/>
-          </p:nvPr>
-        </p:nvSpPr>
-        <p:spPr>
-          <a:xfrm>
-            <a:off x="839788" y="2057400"/>
-            <a:ext cx="3932237" cy="3811588"/>
-          </a:xfrm>
-        </p:spPr>
-        <p:txBody>
-          <a:bodyPr/>
-          <a:lstStyle>
-            <a:lvl1pPr marL="0" indent="0">
-              <a:buNone/>
-              <a:defRPr sz="1600"/>
+            <a:lvl1pPr marL="0" indent="0" algn="ctr">
+              <a:buNone/>
+              <a:defRPr sz="1500">
+                <a:solidFill>
+                  <a:srgbClr val="FFFFFF"/>
+                </a:solidFill>
+              </a:defRPr>
             </a:lvl1pPr>
             <a:lvl2pPr marL="457200" indent="0">
               <a:buNone/>
@@ -2372,13 +2233,7 @@
       </p:sp>
       <p:sp>
         <p:nvSpPr>
-          <p:cNvPr id="5" name="Date Placeholder 4">
-            <a:extLst>
-              <a:ext uri="{FF2B5EF4-FFF2-40B4-BE49-F238E27FC236}">
-                <a16:creationId xmlns:a16="http://schemas.microsoft.com/office/drawing/2014/main" id="{52B00CC3-60E8-E64B-9732-504D87ACE956}"/>
-              </a:ext>
-            </a:extLst>
-          </p:cNvPr>
+          <p:cNvPr id="9" name="Date Placeholder 8"/>
           <p:cNvSpPr>
             <a:spLocks noGrp="1"/>
           </p:cNvSpPr>
@@ -2401,13 +2256,7 @@
       </p:sp>
       <p:sp>
         <p:nvSpPr>
-          <p:cNvPr id="6" name="Footer Placeholder 5">
-            <a:extLst>
-              <a:ext uri="{FF2B5EF4-FFF2-40B4-BE49-F238E27FC236}">
-                <a16:creationId xmlns:a16="http://schemas.microsoft.com/office/drawing/2014/main" id="{996789A9-5349-1D43-9E30-475E5C431966}"/>
-              </a:ext>
-            </a:extLst>
-          </p:cNvPr>
+          <p:cNvPr id="10" name="Footer Placeholder 9"/>
           <p:cNvSpPr>
             <a:spLocks noGrp="1"/>
           </p:cNvSpPr>
@@ -2415,10 +2264,25 @@
             <p:ph type="ftr" sz="quarter" idx="11"/>
           </p:nvPr>
         </p:nvSpPr>
-        <p:spPr/>
-        <p:txBody>
-          <a:bodyPr/>
-          <a:lstStyle/>
+        <p:spPr>
+          <a:xfrm>
+            <a:off x="804672" y="6236208"/>
+            <a:ext cx="5124797" cy="320040"/>
+          </a:xfrm>
+        </p:spPr>
+        <p:txBody>
+          <a:bodyPr/>
+          <a:lstStyle>
+            <a:lvl1pPr>
+              <a:defRPr>
+                <a:solidFill>
+                  <a:srgbClr val="FFFFFF">
+                    <a:alpha val="70000"/>
+                  </a:srgbClr>
+                </a:solidFill>
+              </a:defRPr>
+            </a:lvl1pPr>
+          </a:lstStyle>
           <a:p>
             <a:endParaRPr lang="en-US"/>
           </a:p>
@@ -2426,13 +2290,7 @@
       </p:sp>
       <p:sp>
         <p:nvSpPr>
-          <p:cNvPr id="7" name="Slide Number Placeholder 6">
-            <a:extLst>
-              <a:ext uri="{FF2B5EF4-FFF2-40B4-BE49-F238E27FC236}">
-                <a16:creationId xmlns:a16="http://schemas.microsoft.com/office/drawing/2014/main" id="{77C18B42-9C94-504F-B528-18BBCD917423}"/>
-              </a:ext>
-            </a:extLst>
-          </p:cNvPr>
+          <p:cNvPr id="11" name="Slide Number Placeholder 10"/>
           <p:cNvSpPr>
             <a:spLocks noGrp="1"/>
           </p:cNvSpPr>
@@ -2456,7 +2314,7 @@
     </p:spTree>
     <p:extLst>
       <p:ext uri="{BB962C8B-B14F-4D97-AF65-F5344CB8AC3E}">
-        <p14:creationId xmlns:p14="http://schemas.microsoft.com/office/powerpoint/2010/main" val="3736959583"/>
+        <p14:creationId xmlns:p14="http://schemas.microsoft.com/office/powerpoint/2010/main" val="552412839"/>
       </p:ext>
     </p:extLst>
   </p:cSld>
@@ -2485,31 +2343,77 @@
       </p:grpSpPr>
       <p:sp>
         <p:nvSpPr>
-          <p:cNvPr id="2" name="Title 1">
-            <a:extLst>
-              <a:ext uri="{FF2B5EF4-FFF2-40B4-BE49-F238E27FC236}">
-                <a16:creationId xmlns:a16="http://schemas.microsoft.com/office/drawing/2014/main" id="{CA21B67F-A63C-014F-93C8-186120644E19}"/>
-              </a:ext>
-            </a:extLst>
-          </p:cNvPr>
-          <p:cNvSpPr>
-            <a:spLocks noGrp="1"/>
-          </p:cNvSpPr>
-          <p:nvPr>
-            <p:ph type="title"/>
-          </p:nvPr>
+          <p:cNvPr id="18" name="Rectangle 17"/>
+          <p:cNvSpPr/>
+          <p:nvPr/>
         </p:nvSpPr>
         <p:spPr>
           <a:xfrm>
-            <a:off x="839788" y="457200"/>
-            <a:ext cx="3932237" cy="1600200"/>
+            <a:off x="0" y="0"/>
+            <a:ext cx="6095999" cy="6858000"/>
           </a:xfrm>
+          <a:prstGeom prst="rect">
+            <a:avLst/>
+          </a:prstGeom>
+          <a:solidFill>
+            <a:schemeClr val="accent2"/>
+          </a:solidFill>
+          <a:ln>
+            <a:noFill/>
+          </a:ln>
         </p:spPr>
-        <p:txBody>
-          <a:bodyPr anchor="b"/>
+        <p:style>
+          <a:lnRef idx="2">
+            <a:schemeClr val="accent1">
+              <a:shade val="50000"/>
+            </a:schemeClr>
+          </a:lnRef>
+          <a:fillRef idx="1">
+            <a:schemeClr val="accent1"/>
+          </a:fillRef>
+          <a:effectRef idx="0">
+            <a:schemeClr val="accent1"/>
+          </a:effectRef>
+          <a:fontRef idx="minor">
+            <a:schemeClr val="lt1"/>
+          </a:fontRef>
+        </p:style>
+      </p:sp>
+      <p:sp>
+        <p:nvSpPr>
+          <p:cNvPr id="2" name="Title 1"/>
+          <p:cNvSpPr>
+            <a:spLocks noGrp="1"/>
+          </p:cNvSpPr>
+          <p:nvPr>
+            <p:ph type="title"/>
+          </p:nvPr>
+        </p:nvSpPr>
+        <p:spPr bwMode="blackWhite">
+          <a:xfrm>
+            <a:off x="808523" y="2243828"/>
+            <a:ext cx="4494998" cy="1134640"/>
+          </a:xfrm>
+          <a:solidFill>
+            <a:srgbClr val="FFFFFF"/>
+          </a:solidFill>
+          <a:ln>
+            <a:solidFill>
+              <a:srgbClr val="404040"/>
+            </a:solidFill>
+          </a:ln>
+        </p:spPr>
+        <p:txBody>
+          <a:bodyPr anchor="ctr" anchorCtr="1">
+            <a:noAutofit/>
+          </a:bodyPr>
           <a:lstStyle>
             <a:lvl1pPr>
-              <a:defRPr sz="3200"/>
+              <a:defRPr sz="2200">
+                <a:solidFill>
+                  <a:srgbClr val="262626"/>
+                </a:solidFill>
+              </a:defRPr>
             </a:lvl1pPr>
           </a:lstStyle>
           <a:p>
@@ -2517,21 +2421,15 @@
               <a:rPr lang="en-GB"/>
               <a:t>Click to edit Master title style</a:t>
             </a:r>
-            <a:endParaRPr lang="en-US"/>
-          </a:p>
-        </p:txBody>
-      </p:sp>
-      <p:sp>
-        <p:nvSpPr>
-          <p:cNvPr id="3" name="Picture Placeholder 2">
-            <a:extLst>
-              <a:ext uri="{FF2B5EF4-FFF2-40B4-BE49-F238E27FC236}">
-                <a16:creationId xmlns:a16="http://schemas.microsoft.com/office/drawing/2014/main" id="{75170229-E1BA-4440-8F49-50674A87B821}"/>
-              </a:ext>
-            </a:extLst>
-          </p:cNvPr>
-          <p:cNvSpPr>
-            <a:spLocks noGrp="1"/>
+            <a:endParaRPr lang="en-US" dirty="0"/>
+          </a:p>
+        </p:txBody>
+      </p:sp>
+      <p:sp>
+        <p:nvSpPr>
+          <p:cNvPr id="3" name="Picture Placeholder 2"/>
+          <p:cNvSpPr>
+            <a:spLocks noGrp="1" noChangeAspect="1"/>
           </p:cNvSpPr>
           <p:nvPr>
             <p:ph type="pic" idx="1"/>
@@ -2539,16 +2437,28 @@
         </p:nvSpPr>
         <p:spPr>
           <a:xfrm>
-            <a:off x="5183188" y="987425"/>
-            <a:ext cx="6172200" cy="4873625"/>
+            <a:off x="6095999" y="0"/>
+            <a:ext cx="6102097" cy="6858000"/>
           </a:xfrm>
+          <a:solidFill>
+            <a:schemeClr val="bg1">
+              <a:lumMod val="75000"/>
+            </a:schemeClr>
+          </a:solidFill>
         </p:spPr>
         <p:txBody>
-          <a:bodyPr/>
+          <a:bodyPr anchor="t"/>
           <a:lstStyle>
             <a:lvl1pPr marL="0" indent="0">
               <a:buNone/>
-              <a:defRPr sz="3200"/>
+              <a:defRPr sz="3200">
+                <a:solidFill>
+                  <a:schemeClr val="bg1">
+                    <a:lumMod val="85000"/>
+                    <a:lumOff val="15000"/>
+                  </a:schemeClr>
+                </a:solidFill>
+              </a:defRPr>
             </a:lvl1pPr>
             <a:lvl2pPr marL="457200" indent="0">
               <a:buNone/>
@@ -2584,19 +2494,17 @@
             </a:lvl9pPr>
           </a:lstStyle>
           <a:p>
-            <a:endParaRPr lang="en-US"/>
-          </a:p>
-        </p:txBody>
-      </p:sp>
-      <p:sp>
-        <p:nvSpPr>
-          <p:cNvPr id="4" name="Text Placeholder 3">
-            <a:extLst>
-              <a:ext uri="{FF2B5EF4-FFF2-40B4-BE49-F238E27FC236}">
-                <a16:creationId xmlns:a16="http://schemas.microsoft.com/office/drawing/2014/main" id="{EEBCE615-CD94-BC4F-A095-BF8B98C60DC4}"/>
-              </a:ext>
-            </a:extLst>
-          </p:cNvPr>
+            <a:r>
+              <a:rPr lang="en-GB"/>
+              <a:t>Click icon to add picture</a:t>
+            </a:r>
+            <a:endParaRPr lang="en-US" dirty="0"/>
+          </a:p>
+        </p:txBody>
+      </p:sp>
+      <p:sp>
+        <p:nvSpPr>
+          <p:cNvPr id="4" name="Text Placeholder 3"/>
           <p:cNvSpPr>
             <a:spLocks noGrp="1"/>
           </p:cNvSpPr>
@@ -2606,16 +2514,22 @@
         </p:nvSpPr>
         <p:spPr>
           <a:xfrm>
-            <a:off x="839788" y="2057400"/>
-            <a:ext cx="3932237" cy="3811588"/>
+            <a:off x="1115568" y="3549918"/>
+            <a:ext cx="3794760" cy="2194037"/>
           </a:xfrm>
         </p:spPr>
         <p:txBody>
-          <a:bodyPr/>
+          <a:bodyPr anchor="t" anchorCtr="1">
+            <a:normAutofit/>
+          </a:bodyPr>
           <a:lstStyle>
-            <a:lvl1pPr marL="0" indent="0">
-              <a:buNone/>
-              <a:defRPr sz="1600"/>
+            <a:lvl1pPr marL="0" indent="0" algn="ctr">
+              <a:buNone/>
+              <a:defRPr sz="1500">
+                <a:solidFill>
+                  <a:srgbClr val="FFFFFF"/>
+                </a:solidFill>
+              </a:defRPr>
             </a:lvl1pPr>
             <a:lvl2pPr marL="457200" indent="0">
               <a:buNone/>
@@ -2661,13 +2575,7 @@
       </p:sp>
       <p:sp>
         <p:nvSpPr>
-          <p:cNvPr id="5" name="Date Placeholder 4">
-            <a:extLst>
-              <a:ext uri="{FF2B5EF4-FFF2-40B4-BE49-F238E27FC236}">
-                <a16:creationId xmlns:a16="http://schemas.microsoft.com/office/drawing/2014/main" id="{B5BCF975-A1AA-4D4F-B3FA-7284E18BCEA2}"/>
-              </a:ext>
-            </a:extLst>
-          </p:cNvPr>
+          <p:cNvPr id="8" name="Date Placeholder 7"/>
           <p:cNvSpPr>
             <a:spLocks noGrp="1"/>
           </p:cNvSpPr>
@@ -2678,7 +2586,22 @@
         <p:spPr/>
         <p:txBody>
           <a:bodyPr/>
-          <a:lstStyle/>
+          <a:lstStyle>
+            <a:lvl1pPr>
+              <a:defRPr>
+                <a:solidFill>
+                  <a:srgbClr val="FFFFFF"/>
+                </a:solidFill>
+                <a:effectLst>
+                  <a:outerShdw blurRad="50800" dist="38100" dir="2700000" algn="tl" rotWithShape="0">
+                    <a:prstClr val="black">
+                      <a:alpha val="43000"/>
+                    </a:prstClr>
+                  </a:outerShdw>
+                </a:effectLst>
+              </a:defRPr>
+            </a:lvl1pPr>
+          </a:lstStyle>
           <a:p>
             <a:fld id="{494076E2-43EB-7D4D-9539-7B25001E7176}" type="datetimeFigureOut">
               <a:rPr lang="en-US" smtClean="0"/>
@@ -2690,13 +2613,7 @@
       </p:sp>
       <p:sp>
         <p:nvSpPr>
-          <p:cNvPr id="6" name="Footer Placeholder 5">
-            <a:extLst>
-              <a:ext uri="{FF2B5EF4-FFF2-40B4-BE49-F238E27FC236}">
-                <a16:creationId xmlns:a16="http://schemas.microsoft.com/office/drawing/2014/main" id="{6542EEBA-E53C-3240-9621-43C9EAB53AE5}"/>
-              </a:ext>
-            </a:extLst>
-          </p:cNvPr>
+          <p:cNvPr id="9" name="Footer Placeholder 8"/>
           <p:cNvSpPr>
             <a:spLocks noGrp="1"/>
           </p:cNvSpPr>
@@ -2704,10 +2621,25 @@
             <p:ph type="ftr" sz="quarter" idx="11"/>
           </p:nvPr>
         </p:nvSpPr>
-        <p:spPr/>
-        <p:txBody>
-          <a:bodyPr/>
-          <a:lstStyle/>
+        <p:spPr>
+          <a:xfrm>
+            <a:off x="804672" y="6236208"/>
+            <a:ext cx="5124797" cy="320040"/>
+          </a:xfrm>
+        </p:spPr>
+        <p:txBody>
+          <a:bodyPr/>
+          <a:lstStyle>
+            <a:lvl1pPr>
+              <a:defRPr>
+                <a:solidFill>
+                  <a:srgbClr val="FFFFFF">
+                    <a:alpha val="70000"/>
+                  </a:srgbClr>
+                </a:solidFill>
+              </a:defRPr>
+            </a:lvl1pPr>
+          </a:lstStyle>
           <a:p>
             <a:endParaRPr lang="en-US"/>
           </a:p>
@@ -2715,13 +2647,7 @@
       </p:sp>
       <p:sp>
         <p:nvSpPr>
-          <p:cNvPr id="7" name="Slide Number Placeholder 6">
-            <a:extLst>
-              <a:ext uri="{FF2B5EF4-FFF2-40B4-BE49-F238E27FC236}">
-                <a16:creationId xmlns:a16="http://schemas.microsoft.com/office/drawing/2014/main" id="{AB9E75CD-3498-D240-988B-CCC2CFFC6221}"/>
-              </a:ext>
-            </a:extLst>
-          </p:cNvPr>
+          <p:cNvPr id="10" name="Slide Number Placeholder 9"/>
           <p:cNvSpPr>
             <a:spLocks noGrp="1"/>
           </p:cNvSpPr>
@@ -2745,7 +2671,7 @@
     </p:spTree>
     <p:extLst>
       <p:ext uri="{BB962C8B-B14F-4D97-AF65-F5344CB8AC3E}">
-        <p14:creationId xmlns:p14="http://schemas.microsoft.com/office/powerpoint/2010/main" val="4286346548"/>
+        <p14:creationId xmlns:p14="http://schemas.microsoft.com/office/powerpoint/2010/main" val="3245966565"/>
       </p:ext>
     </p:extLst>
   </p:cSld>
@@ -2759,9 +2685,14 @@
 <p:sldMaster xmlns:a="http://schemas.openxmlformats.org/drawingml/2006/main" xmlns:r="http://schemas.openxmlformats.org/officeDocument/2006/relationships" xmlns:p="http://schemas.openxmlformats.org/presentationml/2006/main">
   <p:cSld>
     <p:bg>
-      <p:bgRef idx="1001">
-        <a:schemeClr val="bg1"/>
-      </p:bgRef>
+      <p:bgPr>
+        <a:solidFill>
+          <a:schemeClr val="bg1">
+            <a:lumMod val="95000"/>
+          </a:schemeClr>
+        </a:solidFill>
+        <a:effectLst/>
+      </p:bgPr>
     </p:bg>
     <p:spTree>
       <p:nvGrpSpPr>
@@ -2779,131 +2710,163 @@
       </p:grpSpPr>
       <p:sp>
         <p:nvSpPr>
-          <p:cNvPr id="2" name="Title Placeholder 1">
-            <a:extLst>
-              <a:ext uri="{FF2B5EF4-FFF2-40B4-BE49-F238E27FC236}">
-                <a16:creationId xmlns:a16="http://schemas.microsoft.com/office/drawing/2014/main" id="{7910BF8C-243E-104B-98F8-DF0BDA51FA2B}"/>
-              </a:ext>
-            </a:extLst>
-          </p:cNvPr>
+          <p:cNvPr id="2" name="Title Placeholder 1"/>
           <p:cNvSpPr>
             <a:spLocks noGrp="1"/>
           </p:cNvSpPr>
           <p:nvPr>
             <p:ph type="title"/>
+          </p:nvPr>
+        </p:nvSpPr>
+        <p:spPr bwMode="black">
+          <a:xfrm>
+            <a:off x="2231136" y="964692"/>
+            <a:ext cx="7729728" cy="1188720"/>
+          </a:xfrm>
+          <a:prstGeom prst="rect">
+            <a:avLst/>
+          </a:prstGeom>
+          <a:solidFill>
+            <a:srgbClr val="FFFFFF"/>
+          </a:solidFill>
+          <a:ln w="31750" cap="sq">
+            <a:solidFill>
+              <a:srgbClr val="404040"/>
+            </a:solidFill>
+            <a:miter lim="800000"/>
+          </a:ln>
+        </p:spPr>
+        <p:txBody>
+          <a:bodyPr vert="horz" lIns="182880" tIns="182880" rIns="182880" bIns="182880" rtlCol="0" anchor="ctr">
+            <a:normAutofit/>
+          </a:bodyPr>
+          <a:lstStyle/>
+          <a:p>
+            <a:r>
+              <a:rPr lang="en-GB"/>
+              <a:t>Click to edit Master title style</a:t>
+            </a:r>
+            <a:endParaRPr lang="en-US" dirty="0"/>
+          </a:p>
+        </p:txBody>
+      </p:sp>
+      <p:sp>
+        <p:nvSpPr>
+          <p:cNvPr id="3" name="Text Placeholder 2"/>
+          <p:cNvSpPr>
+            <a:spLocks noGrp="1"/>
+          </p:cNvSpPr>
+          <p:nvPr>
+            <p:ph type="body" idx="1"/>
           </p:nvPr>
         </p:nvSpPr>
         <p:spPr>
           <a:xfrm>
-            <a:off x="838200" y="365125"/>
-            <a:ext cx="10515600" cy="1325563"/>
+            <a:off x="2231136" y="2638044"/>
+            <a:ext cx="7729728" cy="3101983"/>
           </a:xfrm>
           <a:prstGeom prst="rect">
             <a:avLst/>
           </a:prstGeom>
         </p:spPr>
         <p:txBody>
-          <a:bodyPr vert="horz" lIns="91440" tIns="45720" rIns="91440" bIns="45720" rtlCol="0" anchor="ctr">
+          <a:bodyPr vert="horz" lIns="91440" tIns="45720" rIns="91440" bIns="45720" rtlCol="0">
             <a:normAutofit/>
           </a:bodyPr>
           <a:lstStyle/>
           <a:p>
-            <a:r>
-              <a:rPr lang="en-GB"/>
-              <a:t>Click to edit Master title style</a:t>
-            </a:r>
-            <a:endParaRPr lang="en-US"/>
-          </a:p>
-        </p:txBody>
-      </p:sp>
-      <p:sp>
-        <p:nvSpPr>
-          <p:cNvPr id="3" name="Text Placeholder 2">
-            <a:extLst>
-              <a:ext uri="{FF2B5EF4-FFF2-40B4-BE49-F238E27FC236}">
-                <a16:creationId xmlns:a16="http://schemas.microsoft.com/office/drawing/2014/main" id="{CDD66FCA-BE7F-6F49-B062-648133FF0527}"/>
-              </a:ext>
-            </a:extLst>
-          </p:cNvPr>
-          <p:cNvSpPr>
-            <a:spLocks noGrp="1"/>
-          </p:cNvSpPr>
-          <p:nvPr>
-            <p:ph type="body" idx="1"/>
+            <a:pPr lvl="0"/>
+            <a:r>
+              <a:rPr lang="en-GB"/>
+              <a:t>Click to edit Master text styles</a:t>
+            </a:r>
+          </a:p>
+          <a:p>
+            <a:pPr lvl="1"/>
+            <a:r>
+              <a:rPr lang="en-GB"/>
+              <a:t>Second level</a:t>
+            </a:r>
+          </a:p>
+          <a:p>
+            <a:pPr lvl="2"/>
+            <a:r>
+              <a:rPr lang="en-GB"/>
+              <a:t>Third level</a:t>
+            </a:r>
+          </a:p>
+          <a:p>
+            <a:pPr lvl="3"/>
+            <a:r>
+              <a:rPr lang="en-GB"/>
+              <a:t>Fourth level</a:t>
+            </a:r>
+          </a:p>
+          <a:p>
+            <a:pPr lvl="4"/>
+            <a:r>
+              <a:rPr lang="en-GB"/>
+              <a:t>Fifth level</a:t>
+            </a:r>
+            <a:endParaRPr lang="en-US" dirty="0"/>
+          </a:p>
+        </p:txBody>
+      </p:sp>
+      <p:sp>
+        <p:nvSpPr>
+          <p:cNvPr id="4" name="Date Placeholder 3"/>
+          <p:cNvSpPr>
+            <a:spLocks noGrp="1"/>
+          </p:cNvSpPr>
+          <p:nvPr>
+            <p:ph type="dt" sz="half" idx="2"/>
           </p:nvPr>
         </p:nvSpPr>
         <p:spPr>
           <a:xfrm>
-            <a:off x="838200" y="1825625"/>
-            <a:ext cx="10515600" cy="4351338"/>
+            <a:off x="7821429" y="6238816"/>
+            <a:ext cx="2753746" cy="323968"/>
           </a:xfrm>
           <a:prstGeom prst="rect">
             <a:avLst/>
           </a:prstGeom>
         </p:spPr>
         <p:txBody>
-          <a:bodyPr vert="horz" lIns="91440" tIns="45720" rIns="91440" bIns="45720" rtlCol="0">
-            <a:normAutofit/>
-          </a:bodyPr>
-          <a:lstStyle/>
-          <a:p>
-            <a:pPr lvl="0"/>
-            <a:r>
-              <a:rPr lang="en-GB"/>
-              <a:t>Click to edit Master text styles</a:t>
-            </a:r>
-          </a:p>
-          <a:p>
-            <a:pPr lvl="1"/>
-            <a:r>
-              <a:rPr lang="en-GB"/>
-              <a:t>Second level</a:t>
-            </a:r>
-          </a:p>
-          <a:p>
-            <a:pPr lvl="2"/>
-            <a:r>
-              <a:rPr lang="en-GB"/>
-              <a:t>Third level</a:t>
-            </a:r>
-          </a:p>
-          <a:p>
-            <a:pPr lvl="3"/>
-            <a:r>
-              <a:rPr lang="en-GB"/>
-              <a:t>Fourth level</a:t>
-            </a:r>
-          </a:p>
-          <a:p>
-            <a:pPr lvl="4"/>
-            <a:r>
-              <a:rPr lang="en-GB"/>
-              <a:t>Fifth level</a:t>
-            </a:r>
+          <a:bodyPr vert="horz" lIns="91440" tIns="45720" rIns="91440" bIns="45720" rtlCol="0" anchor="ctr"/>
+          <a:lstStyle>
+            <a:lvl1pPr algn="r">
+              <a:defRPr sz="1050">
+                <a:solidFill>
+                  <a:schemeClr val="tx1">
+                    <a:alpha val="70000"/>
+                  </a:schemeClr>
+                </a:solidFill>
+              </a:defRPr>
+            </a:lvl1pPr>
+          </a:lstStyle>
+          <a:p>
+            <a:fld id="{494076E2-43EB-7D4D-9539-7B25001E7176}" type="datetimeFigureOut">
+              <a:rPr lang="en-US" smtClean="0"/>
+              <a:t>3/12/21</a:t>
+            </a:fld>
             <a:endParaRPr lang="en-US"/>
           </a:p>
         </p:txBody>
       </p:sp>
       <p:sp>
         <p:nvSpPr>
-          <p:cNvPr id="4" name="Date Placeholder 3">
-            <a:extLst>
-              <a:ext uri="{FF2B5EF4-FFF2-40B4-BE49-F238E27FC236}">
-                <a16:creationId xmlns:a16="http://schemas.microsoft.com/office/drawing/2014/main" id="{A02FD684-5CE7-C649-A2A8-55103BD7357C}"/>
-              </a:ext>
-            </a:extLst>
-          </p:cNvPr>
-          <p:cNvSpPr>
-            <a:spLocks noGrp="1"/>
-          </p:cNvSpPr>
-          <p:nvPr>
-            <p:ph type="dt" sz="half" idx="2"/>
+          <p:cNvPr id="5" name="Footer Placeholder 4"/>
+          <p:cNvSpPr>
+            <a:spLocks noGrp="1"/>
+          </p:cNvSpPr>
+          <p:nvPr>
+            <p:ph type="ftr" sz="quarter" idx="3"/>
           </p:nvPr>
         </p:nvSpPr>
         <p:spPr>
           <a:xfrm>
-            <a:off x="838200" y="6356350"/>
-            <a:ext cx="2743200" cy="365125"/>
+            <a:off x="1600200" y="6236208"/>
+            <a:ext cx="5901189" cy="320040"/>
           </a:xfrm>
           <a:prstGeom prst="rect">
             <a:avLst/>
@@ -2913,101 +2876,53 @@
           <a:bodyPr vert="horz" lIns="91440" tIns="45720" rIns="91440" bIns="45720" rtlCol="0" anchor="ctr"/>
           <a:lstStyle>
             <a:lvl1pPr algn="l">
-              <a:defRPr sz="1200">
+              <a:defRPr sz="1050">
                 <a:solidFill>
                   <a:schemeClr val="tx1">
-                    <a:tint val="75000"/>
+                    <a:alpha val="70000"/>
                   </a:schemeClr>
                 </a:solidFill>
               </a:defRPr>
             </a:lvl1pPr>
           </a:lstStyle>
           <a:p>
-            <a:fld id="{494076E2-43EB-7D4D-9539-7B25001E7176}" type="datetimeFigureOut">
-              <a:rPr lang="en-US" smtClean="0"/>
-              <a:t>3/12/21</a:t>
-            </a:fld>
             <a:endParaRPr lang="en-US"/>
           </a:p>
         </p:txBody>
       </p:sp>
       <p:sp>
         <p:nvSpPr>
-          <p:cNvPr id="5" name="Footer Placeholder 4">
-            <a:extLst>
-              <a:ext uri="{FF2B5EF4-FFF2-40B4-BE49-F238E27FC236}">
-                <a16:creationId xmlns:a16="http://schemas.microsoft.com/office/drawing/2014/main" id="{35960F1E-E600-9848-BA68-450AD7843758}"/>
-              </a:ext>
-            </a:extLst>
-          </p:cNvPr>
-          <p:cNvSpPr>
-            <a:spLocks noGrp="1"/>
-          </p:cNvSpPr>
-          <p:nvPr>
-            <p:ph type="ftr" sz="quarter" idx="3"/>
+          <p:cNvPr id="6" name="Slide Number Placeholder 5"/>
+          <p:cNvSpPr>
+            <a:spLocks noGrp="1"/>
+          </p:cNvSpPr>
+          <p:nvPr>
+            <p:ph type="sldNum" sz="quarter" idx="4"/>
           </p:nvPr>
         </p:nvSpPr>
         <p:spPr>
           <a:xfrm>
-            <a:off x="4038600" y="6356350"/>
-            <a:ext cx="4114800" cy="365125"/>
+            <a:off x="10758922" y="6217920"/>
+            <a:ext cx="365760" cy="365760"/>
           </a:xfrm>
-          <a:prstGeom prst="rect">
+          <a:prstGeom prst="ellipse">
             <a:avLst/>
           </a:prstGeom>
+          <a:solidFill>
+            <a:srgbClr val="1D1D1D">
+              <a:alpha val="70000"/>
+            </a:srgbClr>
+          </a:solidFill>
         </p:spPr>
         <p:txBody>
-          <a:bodyPr vert="horz" lIns="91440" tIns="45720" rIns="91440" bIns="45720" rtlCol="0" anchor="ctr"/>
+          <a:bodyPr vert="horz" lIns="18288" tIns="45720" rIns="18288" bIns="45720" rtlCol="0" anchor="ctr">
+            <a:noAutofit/>
+          </a:bodyPr>
           <a:lstStyle>
             <a:lvl1pPr algn="ctr">
-              <a:defRPr sz="1200">
+              <a:defRPr sz="1100" spc="0" baseline="0">
                 <a:solidFill>
-                  <a:schemeClr val="tx1">
-                    <a:tint val="75000"/>
-                  </a:schemeClr>
-                </a:solidFill>
-              </a:defRPr>
-            </a:lvl1pPr>
-          </a:lstStyle>
-          <a:p>
-            <a:endParaRPr lang="en-US"/>
-          </a:p>
-        </p:txBody>
-      </p:sp>
-      <p:sp>
-        <p:nvSpPr>
-          <p:cNvPr id="6" name="Slide Number Placeholder 5">
-            <a:extLst>
-              <a:ext uri="{FF2B5EF4-FFF2-40B4-BE49-F238E27FC236}">
-                <a16:creationId xmlns:a16="http://schemas.microsoft.com/office/drawing/2014/main" id="{D43409A7-72CA-554A-B837-7DE643879F96}"/>
-              </a:ext>
-            </a:extLst>
-          </p:cNvPr>
-          <p:cNvSpPr>
-            <a:spLocks noGrp="1"/>
-          </p:cNvSpPr>
-          <p:nvPr>
-            <p:ph type="sldNum" sz="quarter" idx="4"/>
-          </p:nvPr>
-        </p:nvSpPr>
-        <p:spPr>
-          <a:xfrm>
-            <a:off x="8610600" y="6356350"/>
-            <a:ext cx="2743200" cy="365125"/>
-          </a:xfrm>
-          <a:prstGeom prst="rect">
-            <a:avLst/>
-          </a:prstGeom>
-        </p:spPr>
-        <p:txBody>
-          <a:bodyPr vert="horz" lIns="91440" tIns="45720" rIns="91440" bIns="45720" rtlCol="0" anchor="ctr"/>
-          <a:lstStyle>
-            <a:lvl1pPr algn="r">
-              <a:defRPr sz="1200">
-                <a:solidFill>
-                  <a:schemeClr val="tx1">
-                    <a:tint val="75000"/>
-                  </a:schemeClr>
+                  <a:srgbClr val="FFFFFF"/>
                 </a:solidFill>
               </a:defRPr>
             </a:lvl1pPr>
@@ -3024,27 +2939,27 @@
     </p:spTree>
     <p:extLst>
       <p:ext uri="{BB962C8B-B14F-4D97-AF65-F5344CB8AC3E}">
-        <p14:creationId xmlns:p14="http://schemas.microsoft.com/office/powerpoint/2010/main" val="807897844"/>
+        <p14:creationId xmlns:p14="http://schemas.microsoft.com/office/powerpoint/2010/main" val="1033385244"/>
       </p:ext>
     </p:extLst>
   </p:cSld>
   <p:clrMap bg1="lt1" tx1="dk1" bg2="lt2" tx2="dk2" accent1="accent1" accent2="accent2" accent3="accent3" accent4="accent4" accent5="accent5" accent6="accent6" hlink="hlink" folHlink="folHlink"/>
   <p:sldLayoutIdLst>
-    <p:sldLayoutId id="2147483649" r:id="rId1"/>
-    <p:sldLayoutId id="2147483650" r:id="rId2"/>
-    <p:sldLayoutId id="2147483651" r:id="rId3"/>
-    <p:sldLayoutId id="2147483652" r:id="rId4"/>
-    <p:sldLayoutId id="2147483653" r:id="rId5"/>
-    <p:sldLayoutId id="2147483654" r:id="rId6"/>
-    <p:sldLayoutId id="2147483655" r:id="rId7"/>
-    <p:sldLayoutId id="2147483656" r:id="rId8"/>
-    <p:sldLayoutId id="2147483657" r:id="rId9"/>
-    <p:sldLayoutId id="2147483658" r:id="rId10"/>
-    <p:sldLayoutId id="2147483659" r:id="rId11"/>
+    <p:sldLayoutId id="2147483661" r:id="rId1"/>
+    <p:sldLayoutId id="2147483662" r:id="rId2"/>
+    <p:sldLayoutId id="2147483663" r:id="rId3"/>
+    <p:sldLayoutId id="2147483664" r:id="rId4"/>
+    <p:sldLayoutId id="2147483665" r:id="rId5"/>
+    <p:sldLayoutId id="2147483666" r:id="rId6"/>
+    <p:sldLayoutId id="2147483667" r:id="rId7"/>
+    <p:sldLayoutId id="2147483668" r:id="rId8"/>
+    <p:sldLayoutId id="2147483669" r:id="rId9"/>
+    <p:sldLayoutId id="2147483670" r:id="rId10"/>
+    <p:sldLayoutId id="2147483671" r:id="rId11"/>
   </p:sldLayoutIdLst>
   <p:txStyles>
     <p:titleStyle>
-      <a:lvl1pPr algn="l" defTabSz="914400" rtl="0" eaLnBrk="1" latinLnBrk="0" hangingPunct="1">
+      <a:lvl1pPr algn="ctr" defTabSz="914400" rtl="0" eaLnBrk="1" latinLnBrk="0" hangingPunct="1">
         <a:lnSpc>
           <a:spcPct val="90000"/>
         </a:lnSpc>
@@ -3052,9 +2967,9 @@
           <a:spcPct val="0"/>
         </a:spcBef>
         <a:buNone/>
-        <a:defRPr sz="4400" kern="1200">
+        <a:defRPr sz="2800" kern="1200" cap="all" spc="200" baseline="0">
           <a:solidFill>
-            <a:schemeClr val="tx1"/>
+            <a:srgbClr val="262626"/>
           </a:solidFill>
           <a:latin typeface="+mj-lt"/>
           <a:ea typeface="+mj-ea"/>
@@ -3065,104 +2980,137 @@
     <p:bodyStyle>
       <a:lvl1pPr marL="228600" indent="-228600" algn="l" defTabSz="914400" rtl="0" eaLnBrk="1" latinLnBrk="0" hangingPunct="1">
         <a:lnSpc>
-          <a:spcPct val="90000"/>
+          <a:spcPct val="100000"/>
         </a:lnSpc>
         <a:spcBef>
           <a:spcPts val="1000"/>
         </a:spcBef>
+        <a:buClr>
+          <a:schemeClr val="accent2"/>
+        </a:buClr>
         <a:buFont typeface="Arial" panose="020B0604020202020204" pitchFamily="34" charset="0"/>
         <a:buChar char="•"/>
-        <a:defRPr sz="2800" kern="1200">
+        <a:defRPr sz="1800" kern="1200">
           <a:solidFill>
-            <a:schemeClr val="tx1"/>
+            <a:schemeClr val="tx1">
+              <a:lumMod val="85000"/>
+              <a:lumOff val="15000"/>
+            </a:schemeClr>
           </a:solidFill>
           <a:latin typeface="+mn-lt"/>
           <a:ea typeface="+mn-ea"/>
           <a:cs typeface="+mn-cs"/>
         </a:defRPr>
       </a:lvl1pPr>
-      <a:lvl2pPr marL="685800" indent="-228600" algn="l" defTabSz="914400" rtl="0" eaLnBrk="1" latinLnBrk="0" hangingPunct="1">
+      <a:lvl2pPr marL="457200" indent="-228600" algn="l" defTabSz="914400" rtl="0" eaLnBrk="1" latinLnBrk="0" hangingPunct="1">
         <a:lnSpc>
-          <a:spcPct val="90000"/>
+          <a:spcPct val="100000"/>
         </a:lnSpc>
         <a:spcBef>
-          <a:spcPts val="500"/>
+          <a:spcPts val="1000"/>
         </a:spcBef>
+        <a:buClr>
+          <a:schemeClr val="accent2"/>
+        </a:buClr>
         <a:buFont typeface="Arial" panose="020B0604020202020204" pitchFamily="34" charset="0"/>
         <a:buChar char="•"/>
-        <a:defRPr sz="2400" kern="1200">
+        <a:defRPr sz="1600" kern="1200">
           <a:solidFill>
-            <a:schemeClr val="tx1"/>
+            <a:schemeClr val="tx1">
+              <a:lumMod val="85000"/>
+              <a:lumOff val="15000"/>
+            </a:schemeClr>
           </a:solidFill>
           <a:latin typeface="+mn-lt"/>
           <a:ea typeface="+mn-ea"/>
           <a:cs typeface="+mn-cs"/>
         </a:defRPr>
       </a:lvl2pPr>
-      <a:lvl3pPr marL="1143000" indent="-228600" algn="l" defTabSz="914400" rtl="0" eaLnBrk="1" latinLnBrk="0" hangingPunct="1">
+      <a:lvl3pPr marL="685800" indent="-228600" algn="l" defTabSz="914400" rtl="0" eaLnBrk="1" latinLnBrk="0" hangingPunct="1">
         <a:lnSpc>
-          <a:spcPct val="90000"/>
+          <a:spcPct val="100000"/>
         </a:lnSpc>
         <a:spcBef>
-          <a:spcPts val="500"/>
+          <a:spcPts val="1000"/>
         </a:spcBef>
+        <a:buClr>
+          <a:schemeClr val="accent2"/>
+        </a:buClr>
         <a:buFont typeface="Arial" panose="020B0604020202020204" pitchFamily="34" charset="0"/>
         <a:buChar char="•"/>
-        <a:defRPr sz="2000" kern="1200">
+        <a:defRPr sz="1600" kern="1200">
           <a:solidFill>
-            <a:schemeClr val="tx1"/>
+            <a:schemeClr val="tx1">
+              <a:lumMod val="85000"/>
+              <a:lumOff val="15000"/>
+            </a:schemeClr>
           </a:solidFill>
           <a:latin typeface="+mn-lt"/>
           <a:ea typeface="+mn-ea"/>
           <a:cs typeface="+mn-cs"/>
         </a:defRPr>
       </a:lvl3pPr>
-      <a:lvl4pPr marL="1600200" indent="-228600" algn="l" defTabSz="914400" rtl="0" eaLnBrk="1" latinLnBrk="0" hangingPunct="1">
+      <a:lvl4pPr marL="914400" indent="-228600" algn="l" defTabSz="914400" rtl="0" eaLnBrk="1" latinLnBrk="0" hangingPunct="1">
         <a:lnSpc>
-          <a:spcPct val="90000"/>
+          <a:spcPct val="100000"/>
         </a:lnSpc>
         <a:spcBef>
-          <a:spcPts val="500"/>
+          <a:spcPts val="1000"/>
         </a:spcBef>
+        <a:buClr>
+          <a:schemeClr val="accent2"/>
+        </a:buClr>
         <a:buFont typeface="Arial" panose="020B0604020202020204" pitchFamily="34" charset="0"/>
         <a:buChar char="•"/>
-        <a:defRPr sz="1800" kern="1200">
+        <a:defRPr sz="1600" kern="1200">
           <a:solidFill>
-            <a:schemeClr val="tx1"/>
+            <a:schemeClr val="tx1">
+              <a:lumMod val="85000"/>
+              <a:lumOff val="15000"/>
+            </a:schemeClr>
           </a:solidFill>
           <a:latin typeface="+mn-lt"/>
           <a:ea typeface="+mn-ea"/>
           <a:cs typeface="+mn-cs"/>
         </a:defRPr>
       </a:lvl4pPr>
-      <a:lvl5pPr marL="2057400" indent="-228600" algn="l" defTabSz="914400" rtl="0" eaLnBrk="1" latinLnBrk="0" hangingPunct="1">
+      <a:lvl5pPr marL="1143000" indent="-228600" algn="l" defTabSz="914400" rtl="0" eaLnBrk="1" latinLnBrk="0" hangingPunct="1">
         <a:lnSpc>
-          <a:spcPct val="90000"/>
+          <a:spcPct val="100000"/>
         </a:lnSpc>
         <a:spcBef>
-          <a:spcPts val="500"/>
+          <a:spcPts val="1000"/>
         </a:spcBef>
+        <a:buClr>
+          <a:schemeClr val="accent2"/>
+        </a:buClr>
         <a:buFont typeface="Arial" panose="020B0604020202020204" pitchFamily="34" charset="0"/>
         <a:buChar char="•"/>
-        <a:defRPr sz="1800" kern="1200">
+        <a:defRPr sz="1600" kern="1200">
           <a:solidFill>
-            <a:schemeClr val="tx1"/>
+            <a:schemeClr val="tx1">
+              <a:lumMod val="85000"/>
+              <a:lumOff val="15000"/>
+            </a:schemeClr>
           </a:solidFill>
           <a:latin typeface="+mn-lt"/>
           <a:ea typeface="+mn-ea"/>
           <a:cs typeface="+mn-cs"/>
         </a:defRPr>
       </a:lvl5pPr>
-      <a:lvl6pPr marL="2514600" indent="-228600" algn="l" defTabSz="914400" rtl="0" eaLnBrk="1" latinLnBrk="0" hangingPunct="1">
+      <a:lvl6pPr marL="1312863" indent="-228600" algn="l" defTabSz="914400" rtl="0" eaLnBrk="1" latinLnBrk="0" hangingPunct="1">
         <a:lnSpc>
-          <a:spcPct val="90000"/>
+          <a:spcPct val="100000"/>
         </a:lnSpc>
         <a:spcBef>
-          <a:spcPts val="500"/>
+          <a:spcPts val="1000"/>
         </a:spcBef>
+        <a:buClr>
+          <a:schemeClr val="accent2"/>
+        </a:buClr>
         <a:buFont typeface="Arial" panose="020B0604020202020204" pitchFamily="34" charset="0"/>
         <a:buChar char="•"/>
-        <a:defRPr sz="1800" kern="1200">
+        <a:defRPr sz="1600" kern="1200">
           <a:solidFill>
             <a:schemeClr val="tx1"/>
           </a:solidFill>
@@ -3171,16 +3119,19 @@
           <a:cs typeface="+mn-cs"/>
         </a:defRPr>
       </a:lvl6pPr>
-      <a:lvl7pPr marL="2971800" indent="-228600" algn="l" defTabSz="914400" rtl="0" eaLnBrk="1" latinLnBrk="0" hangingPunct="1">
+      <a:lvl7pPr marL="1484313" indent="-228600" algn="l" defTabSz="914400" rtl="0" eaLnBrk="1" latinLnBrk="0" hangingPunct="1">
         <a:lnSpc>
-          <a:spcPct val="90000"/>
+          <a:spcPct val="100000"/>
         </a:lnSpc>
         <a:spcBef>
-          <a:spcPts val="500"/>
+          <a:spcPts val="1000"/>
         </a:spcBef>
+        <a:buClr>
+          <a:schemeClr val="accent2"/>
+        </a:buClr>
         <a:buFont typeface="Arial" panose="020B0604020202020204" pitchFamily="34" charset="0"/>
         <a:buChar char="•"/>
-        <a:defRPr sz="1800" kern="1200">
+        <a:defRPr sz="1600" kern="1200">
           <a:solidFill>
             <a:schemeClr val="tx1"/>
           </a:solidFill>
@@ -3189,16 +3140,19 @@
           <a:cs typeface="+mn-cs"/>
         </a:defRPr>
       </a:lvl7pPr>
-      <a:lvl8pPr marL="3429000" indent="-228600" algn="l" defTabSz="914400" rtl="0" eaLnBrk="1" latinLnBrk="0" hangingPunct="1">
+      <a:lvl8pPr marL="1657350" indent="-228600" algn="l" defTabSz="914400" rtl="0" eaLnBrk="1" latinLnBrk="0" hangingPunct="1">
         <a:lnSpc>
-          <a:spcPct val="90000"/>
+          <a:spcPct val="100000"/>
         </a:lnSpc>
         <a:spcBef>
-          <a:spcPts val="500"/>
+          <a:spcPts val="1000"/>
         </a:spcBef>
+        <a:buClr>
+          <a:schemeClr val="accent2"/>
+        </a:buClr>
         <a:buFont typeface="Arial" panose="020B0604020202020204" pitchFamily="34" charset="0"/>
         <a:buChar char="•"/>
-        <a:defRPr sz="1800" kern="1200">
+        <a:defRPr sz="1600" kern="1200" baseline="0">
           <a:solidFill>
             <a:schemeClr val="tx1"/>
           </a:solidFill>
@@ -3207,16 +3161,19 @@
           <a:cs typeface="+mn-cs"/>
         </a:defRPr>
       </a:lvl8pPr>
-      <a:lvl9pPr marL="3886200" indent="-228600" algn="l" defTabSz="914400" rtl="0" eaLnBrk="1" latinLnBrk="0" hangingPunct="1">
+      <a:lvl9pPr marL="1882775" indent="-228600" algn="l" defTabSz="914400" rtl="0" eaLnBrk="1" latinLnBrk="0" hangingPunct="1">
         <a:lnSpc>
-          <a:spcPct val="90000"/>
+          <a:spcPct val="100000"/>
         </a:lnSpc>
         <a:spcBef>
-          <a:spcPts val="500"/>
+          <a:spcPts val="1000"/>
         </a:spcBef>
+        <a:buClr>
+          <a:schemeClr val="accent2"/>
+        </a:buClr>
         <a:buFont typeface="Arial" panose="020B0604020202020204" pitchFamily="34" charset="0"/>
         <a:buChar char="•"/>
-        <a:defRPr sz="1800" kern="1200">
+        <a:defRPr sz="1600" kern="1200" baseline="0">
           <a:solidFill>
             <a:schemeClr val="tx1"/>
           </a:solidFill>
@@ -3360,10 +3317,19 @@
         </p:nvSpPr>
         <p:spPr/>
         <p:txBody>
-          <a:bodyPr/>
-          <a:lstStyle/>
-          <a:p>
-            <a:endParaRPr lang="en-US"/>
+          <a:bodyPr>
+            <a:normAutofit fontScale="90000"/>
+          </a:bodyPr>
+          <a:lstStyle/>
+          <a:p>
+            <a:r>
+              <a:rPr lang="en-US" dirty="0" err="1"/>
+              <a:t>AAVAiL</a:t>
+            </a:r>
+            <a:r>
+              <a:rPr lang="en-US" dirty="0"/>
+              <a:t> revenue projection – part 1 data investigation summary</a:t>
+            </a:r>
           </a:p>
         </p:txBody>
       </p:sp>
@@ -3388,7 +3354,16 @@
           <a:bodyPr/>
           <a:lstStyle/>
           <a:p>
-            <a:endParaRPr lang="en-US"/>
+            <a:r>
+              <a:rPr lang="en-US" dirty="0"/>
+              <a:t>RICHARD CURE</a:t>
+            </a:r>
+          </a:p>
+          <a:p>
+            <a:r>
+              <a:rPr lang="en-US" dirty="0"/>
+              <a:t>March-April 2021</a:t>
+            </a:r>
           </a:p>
         </p:txBody>
       </p:sp>
@@ -3405,109 +3380,683 @@
 </p:sld>
 </file>
 
+<file path=ppt/slides/slide2.xml><?xml version="1.0" encoding="utf-8"?>
+<p:sld xmlns:a="http://schemas.openxmlformats.org/drawingml/2006/main" xmlns:r="http://schemas.openxmlformats.org/officeDocument/2006/relationships" xmlns:p="http://schemas.openxmlformats.org/presentationml/2006/main">
+  <p:cSld>
+    <p:spTree>
+      <p:nvGrpSpPr>
+        <p:cNvPr id="1" name=""/>
+        <p:cNvGrpSpPr/>
+        <p:nvPr/>
+      </p:nvGrpSpPr>
+      <p:grpSpPr>
+        <a:xfrm>
+          <a:off x="0" y="0"/>
+          <a:ext cx="0" cy="0"/>
+          <a:chOff x="0" y="0"/>
+          <a:chExt cx="0" cy="0"/>
+        </a:xfrm>
+      </p:grpSpPr>
+      <p:sp>
+        <p:nvSpPr>
+          <p:cNvPr id="2" name="Title 1">
+            <a:extLst>
+              <a:ext uri="{FF2B5EF4-FFF2-40B4-BE49-F238E27FC236}">
+                <a16:creationId xmlns:a16="http://schemas.microsoft.com/office/drawing/2014/main" id="{CD7C3AE7-8979-5040-B63C-286214375805}"/>
+              </a:ext>
+            </a:extLst>
+          </p:cNvPr>
+          <p:cNvSpPr>
+            <a:spLocks noGrp="1"/>
+          </p:cNvSpPr>
+          <p:nvPr>
+            <p:ph type="title"/>
+          </p:nvPr>
+        </p:nvSpPr>
+        <p:spPr/>
+        <p:txBody>
+          <a:bodyPr>
+            <a:normAutofit/>
+          </a:bodyPr>
+          <a:lstStyle/>
+          <a:p>
+            <a:r>
+              <a:rPr lang="en-US" dirty="0"/>
+              <a:t>contents</a:t>
+            </a:r>
+          </a:p>
+        </p:txBody>
+      </p:sp>
+      <p:sp>
+        <p:nvSpPr>
+          <p:cNvPr id="3" name="Content Placeholder 2">
+            <a:extLst>
+              <a:ext uri="{FF2B5EF4-FFF2-40B4-BE49-F238E27FC236}">
+                <a16:creationId xmlns:a16="http://schemas.microsoft.com/office/drawing/2014/main" id="{40DEFFC1-9D06-C14E-BE80-F6254033A258}"/>
+              </a:ext>
+            </a:extLst>
+          </p:cNvPr>
+          <p:cNvSpPr>
+            <a:spLocks noGrp="1"/>
+          </p:cNvSpPr>
+          <p:nvPr>
+            <p:ph idx="1"/>
+          </p:nvPr>
+        </p:nvSpPr>
+        <p:spPr/>
+        <p:txBody>
+          <a:bodyPr/>
+          <a:lstStyle/>
+          <a:p>
+            <a:endParaRPr lang="en-US"/>
+          </a:p>
+        </p:txBody>
+      </p:sp>
+    </p:spTree>
+    <p:extLst>
+      <p:ext uri="{BB962C8B-B14F-4D97-AF65-F5344CB8AC3E}">
+        <p14:creationId xmlns:p14="http://schemas.microsoft.com/office/powerpoint/2010/main" val="1216014420"/>
+      </p:ext>
+    </p:extLst>
+  </p:cSld>
+  <p:clrMapOvr>
+    <a:masterClrMapping/>
+  </p:clrMapOvr>
+</p:sld>
+</file>
+
+<file path=ppt/slides/slide3.xml><?xml version="1.0" encoding="utf-8"?>
+<p:sld xmlns:a="http://schemas.openxmlformats.org/drawingml/2006/main" xmlns:r="http://schemas.openxmlformats.org/officeDocument/2006/relationships" xmlns:p="http://schemas.openxmlformats.org/presentationml/2006/main">
+  <p:cSld>
+    <p:spTree>
+      <p:nvGrpSpPr>
+        <p:cNvPr id="1" name=""/>
+        <p:cNvGrpSpPr/>
+        <p:nvPr/>
+      </p:nvGrpSpPr>
+      <p:grpSpPr>
+        <a:xfrm>
+          <a:off x="0" y="0"/>
+          <a:ext cx="0" cy="0"/>
+          <a:chOff x="0" y="0"/>
+          <a:chExt cx="0" cy="0"/>
+        </a:xfrm>
+      </p:grpSpPr>
+      <p:sp>
+        <p:nvSpPr>
+          <p:cNvPr id="2" name="Title 1">
+            <a:extLst>
+              <a:ext uri="{FF2B5EF4-FFF2-40B4-BE49-F238E27FC236}">
+                <a16:creationId xmlns:a16="http://schemas.microsoft.com/office/drawing/2014/main" id="{B134156B-2147-E245-8A0B-C899BF54647C}"/>
+              </a:ext>
+            </a:extLst>
+          </p:cNvPr>
+          <p:cNvSpPr>
+            <a:spLocks noGrp="1"/>
+          </p:cNvSpPr>
+          <p:nvPr>
+            <p:ph type="title"/>
+          </p:nvPr>
+        </p:nvSpPr>
+        <p:spPr/>
+        <p:txBody>
+          <a:bodyPr>
+            <a:normAutofit fontScale="90000"/>
+          </a:bodyPr>
+          <a:lstStyle/>
+          <a:p>
+            <a:r>
+              <a:rPr lang="en-US" dirty="0"/>
+              <a:t>1. </a:t>
+            </a:r>
+            <a:r>
+              <a:rPr lang="en-GB" dirty="0"/>
+              <a:t>Assimilate the business scenario and articulate testable hypotheses.</a:t>
+            </a:r>
+            <a:br>
+              <a:rPr lang="en-GB" dirty="0"/>
+            </a:br>
+            <a:endParaRPr lang="en-US" dirty="0"/>
+          </a:p>
+        </p:txBody>
+      </p:sp>
+      <p:sp>
+        <p:nvSpPr>
+          <p:cNvPr id="3" name="Content Placeholder 2">
+            <a:extLst>
+              <a:ext uri="{FF2B5EF4-FFF2-40B4-BE49-F238E27FC236}">
+                <a16:creationId xmlns:a16="http://schemas.microsoft.com/office/drawing/2014/main" id="{53A389BB-B66F-084A-AB4D-8AF044A5AA62}"/>
+              </a:ext>
+            </a:extLst>
+          </p:cNvPr>
+          <p:cNvSpPr>
+            <a:spLocks noGrp="1"/>
+          </p:cNvSpPr>
+          <p:nvPr>
+            <p:ph idx="1"/>
+          </p:nvPr>
+        </p:nvSpPr>
+        <p:spPr/>
+        <p:txBody>
+          <a:bodyPr>
+            <a:normAutofit fontScale="70000" lnSpcReduction="20000"/>
+          </a:bodyPr>
+          <a:lstStyle/>
+          <a:p>
+            <a:r>
+              <a:rPr lang="en-US" dirty="0" err="1"/>
+              <a:t>AAVAiL</a:t>
+            </a:r>
+            <a:r>
+              <a:rPr lang="en-US" dirty="0"/>
+              <a:t> customers outside the US have been subscribing to </a:t>
+            </a:r>
+            <a:r>
+              <a:rPr lang="en-US" dirty="0" err="1"/>
+              <a:t>AAVAiL</a:t>
+            </a:r>
+            <a:r>
+              <a:rPr lang="en-US" dirty="0"/>
+              <a:t> services ‘a la carte’ e.g. which is different to the way they have been doing so before.</a:t>
+            </a:r>
+          </a:p>
+          <a:p>
+            <a:r>
+              <a:rPr lang="en-US" dirty="0"/>
+              <a:t>This has created ~ 2 years of transactional data across a few 1000 customers.</a:t>
+            </a:r>
+          </a:p>
+          <a:p>
+            <a:r>
+              <a:rPr lang="en-US" dirty="0"/>
+              <a:t>These customers are dispersed across 38 different countries, and the transactional data comes in batch format, 1 JSON file per month.</a:t>
+            </a:r>
+          </a:p>
+          <a:p>
+            <a:r>
+              <a:rPr lang="en-US" dirty="0" err="1"/>
+              <a:t>AAVAiL</a:t>
+            </a:r>
+            <a:r>
+              <a:rPr lang="en-US" dirty="0"/>
+              <a:t> product mangers have found it difficult to predict monthly revenue.</a:t>
+            </a:r>
+          </a:p>
+          <a:p>
+            <a:r>
+              <a:rPr lang="en-US" dirty="0"/>
+              <a:t>Through a Design Thinking </a:t>
+            </a:r>
+            <a:r>
+              <a:rPr lang="en-US" dirty="0" err="1"/>
+              <a:t>programme</a:t>
+            </a:r>
+            <a:r>
+              <a:rPr lang="en-US" dirty="0"/>
+              <a:t>, a decision was made to start a new project to develop a machine learning model to project revenue for 10 of the 38 countries.</a:t>
+            </a:r>
+          </a:p>
+          <a:p>
+            <a:r>
+              <a:rPr lang="en-US" dirty="0"/>
+              <a:t>Product Manager expectations of the model are that it will save time over the existing revenue projections process, and that model outputs will be more accurate than outputs resulting from the existing process.</a:t>
+            </a:r>
+          </a:p>
+          <a:p>
+            <a:r>
+              <a:rPr lang="en-US" dirty="0"/>
+              <a:t>The possible positive business impacts are that the model will enable </a:t>
+            </a:r>
+            <a:r>
+              <a:rPr lang="en-US" dirty="0" err="1"/>
+              <a:t>AAVAiL</a:t>
+            </a:r>
+            <a:r>
+              <a:rPr lang="en-US" dirty="0"/>
+              <a:t> to </a:t>
+            </a:r>
+            <a:r>
+              <a:rPr lang="en-US" dirty="0" err="1"/>
+              <a:t>stabililse</a:t>
+            </a:r>
+            <a:r>
+              <a:rPr lang="en-US" dirty="0"/>
+              <a:t> </a:t>
+            </a:r>
+            <a:r>
+              <a:rPr lang="en-US" dirty="0" err="1"/>
+              <a:t>stagg</a:t>
+            </a:r>
+            <a:r>
+              <a:rPr lang="en-US" dirty="0"/>
+              <a:t> members, and will generate a ‘ripple effect’ drawn from budget projections.</a:t>
+            </a:r>
+          </a:p>
+          <a:p>
+            <a:r>
+              <a:rPr lang="en-US" b="1" dirty="0"/>
+              <a:t>NEXT – TESTABLE HYPOTHESES</a:t>
+            </a:r>
+          </a:p>
+        </p:txBody>
+      </p:sp>
+    </p:spTree>
+    <p:extLst>
+      <p:ext uri="{BB962C8B-B14F-4D97-AF65-F5344CB8AC3E}">
+        <p14:creationId xmlns:p14="http://schemas.microsoft.com/office/powerpoint/2010/main" val="139363103"/>
+      </p:ext>
+    </p:extLst>
+  </p:cSld>
+  <p:clrMapOvr>
+    <a:masterClrMapping/>
+  </p:clrMapOvr>
+</p:sld>
+</file>
+
+<file path=ppt/slides/slide4.xml><?xml version="1.0" encoding="utf-8"?>
+<p:sld xmlns:a="http://schemas.openxmlformats.org/drawingml/2006/main" xmlns:r="http://schemas.openxmlformats.org/officeDocument/2006/relationships" xmlns:p="http://schemas.openxmlformats.org/presentationml/2006/main">
+  <p:cSld>
+    <p:spTree>
+      <p:nvGrpSpPr>
+        <p:cNvPr id="1" name=""/>
+        <p:cNvGrpSpPr/>
+        <p:nvPr/>
+      </p:nvGrpSpPr>
+      <p:grpSpPr>
+        <a:xfrm>
+          <a:off x="0" y="0"/>
+          <a:ext cx="0" cy="0"/>
+          <a:chOff x="0" y="0"/>
+          <a:chExt cx="0" cy="0"/>
+        </a:xfrm>
+      </p:grpSpPr>
+      <p:sp>
+        <p:nvSpPr>
+          <p:cNvPr id="2" name="Title 1">
+            <a:extLst>
+              <a:ext uri="{FF2B5EF4-FFF2-40B4-BE49-F238E27FC236}">
+                <a16:creationId xmlns:a16="http://schemas.microsoft.com/office/drawing/2014/main" id="{5F09CC06-29E7-5C41-BB00-CBE844139868}"/>
+              </a:ext>
+            </a:extLst>
+          </p:cNvPr>
+          <p:cNvSpPr>
+            <a:spLocks noGrp="1"/>
+          </p:cNvSpPr>
+          <p:nvPr>
+            <p:ph type="title"/>
+          </p:nvPr>
+        </p:nvSpPr>
+        <p:spPr/>
+        <p:txBody>
+          <a:bodyPr>
+            <a:normAutofit fontScale="90000"/>
+          </a:bodyPr>
+          <a:lstStyle/>
+          <a:p>
+            <a:r>
+              <a:rPr lang="en-GB" sz="2200" dirty="0"/>
+              <a:t>2. State the ideal data to address the business opportunity and clarify the rationale for needing specific data.</a:t>
+            </a:r>
+            <a:br>
+              <a:rPr lang="en-GB" dirty="0"/>
+            </a:br>
+            <a:endParaRPr lang="en-US" dirty="0"/>
+          </a:p>
+        </p:txBody>
+      </p:sp>
+      <p:sp>
+        <p:nvSpPr>
+          <p:cNvPr id="3" name="Content Placeholder 2">
+            <a:extLst>
+              <a:ext uri="{FF2B5EF4-FFF2-40B4-BE49-F238E27FC236}">
+                <a16:creationId xmlns:a16="http://schemas.microsoft.com/office/drawing/2014/main" id="{4FE7BEA3-B7AB-1143-B2DE-4C09B8E63AFB}"/>
+              </a:ext>
+            </a:extLst>
+          </p:cNvPr>
+          <p:cNvSpPr>
+            <a:spLocks noGrp="1"/>
+          </p:cNvSpPr>
+          <p:nvPr>
+            <p:ph idx="1"/>
+          </p:nvPr>
+        </p:nvSpPr>
+        <p:spPr/>
+        <p:txBody>
+          <a:bodyPr/>
+          <a:lstStyle/>
+          <a:p>
+            <a:endParaRPr lang="en-US"/>
+          </a:p>
+        </p:txBody>
+      </p:sp>
+    </p:spTree>
+    <p:extLst>
+      <p:ext uri="{BB962C8B-B14F-4D97-AF65-F5344CB8AC3E}">
+        <p14:creationId xmlns:p14="http://schemas.microsoft.com/office/powerpoint/2010/main" val="2197432302"/>
+      </p:ext>
+    </p:extLst>
+  </p:cSld>
+  <p:clrMapOvr>
+    <a:masterClrMapping/>
+  </p:clrMapOvr>
+</p:sld>
+</file>
+
+<file path=ppt/slides/slide5.xml><?xml version="1.0" encoding="utf-8"?>
+<p:sld xmlns:a="http://schemas.openxmlformats.org/drawingml/2006/main" xmlns:r="http://schemas.openxmlformats.org/officeDocument/2006/relationships" xmlns:p="http://schemas.openxmlformats.org/presentationml/2006/main">
+  <p:cSld>
+    <p:spTree>
+      <p:nvGrpSpPr>
+        <p:cNvPr id="1" name=""/>
+        <p:cNvGrpSpPr/>
+        <p:nvPr/>
+      </p:nvGrpSpPr>
+      <p:grpSpPr>
+        <a:xfrm>
+          <a:off x="0" y="0"/>
+          <a:ext cx="0" cy="0"/>
+          <a:chOff x="0" y="0"/>
+          <a:chExt cx="0" cy="0"/>
+        </a:xfrm>
+      </p:grpSpPr>
+      <p:sp>
+        <p:nvSpPr>
+          <p:cNvPr id="2" name="Title 1">
+            <a:extLst>
+              <a:ext uri="{FF2B5EF4-FFF2-40B4-BE49-F238E27FC236}">
+                <a16:creationId xmlns:a16="http://schemas.microsoft.com/office/drawing/2014/main" id="{A3362832-6C7C-B746-85ED-5B2B05C84030}"/>
+              </a:ext>
+            </a:extLst>
+          </p:cNvPr>
+          <p:cNvSpPr>
+            <a:spLocks noGrp="1"/>
+          </p:cNvSpPr>
+          <p:nvPr>
+            <p:ph type="title"/>
+          </p:nvPr>
+        </p:nvSpPr>
+        <p:spPr/>
+        <p:txBody>
+          <a:bodyPr>
+            <a:noAutofit/>
+          </a:bodyPr>
+          <a:lstStyle/>
+          <a:p>
+            <a:r>
+              <a:rPr lang="en-GB" sz="2000" dirty="0"/>
+              <a:t>3. Create a python script to extract relevant data from multiple data sources, automating the process of data ingestion.</a:t>
+            </a:r>
+            <a:br>
+              <a:rPr lang="en-GB" sz="2000" dirty="0"/>
+            </a:br>
+            <a:endParaRPr lang="en-US" sz="2000" dirty="0"/>
+          </a:p>
+        </p:txBody>
+      </p:sp>
+      <p:sp>
+        <p:nvSpPr>
+          <p:cNvPr id="3" name="Content Placeholder 2">
+            <a:extLst>
+              <a:ext uri="{FF2B5EF4-FFF2-40B4-BE49-F238E27FC236}">
+                <a16:creationId xmlns:a16="http://schemas.microsoft.com/office/drawing/2014/main" id="{0DCCB24C-7520-2949-8DAC-DA53413AE5E2}"/>
+              </a:ext>
+            </a:extLst>
+          </p:cNvPr>
+          <p:cNvSpPr>
+            <a:spLocks noGrp="1"/>
+          </p:cNvSpPr>
+          <p:nvPr>
+            <p:ph idx="1"/>
+          </p:nvPr>
+        </p:nvSpPr>
+        <p:spPr/>
+        <p:txBody>
+          <a:bodyPr/>
+          <a:lstStyle/>
+          <a:p>
+            <a:endParaRPr lang="en-US"/>
+          </a:p>
+        </p:txBody>
+      </p:sp>
+    </p:spTree>
+    <p:extLst>
+      <p:ext uri="{BB962C8B-B14F-4D97-AF65-F5344CB8AC3E}">
+        <p14:creationId xmlns:p14="http://schemas.microsoft.com/office/powerpoint/2010/main" val="20232293"/>
+      </p:ext>
+    </p:extLst>
+  </p:cSld>
+  <p:clrMapOvr>
+    <a:masterClrMapping/>
+  </p:clrMapOvr>
+</p:sld>
+</file>
+
+<file path=ppt/slides/slide6.xml><?xml version="1.0" encoding="utf-8"?>
+<p:sld xmlns:a="http://schemas.openxmlformats.org/drawingml/2006/main" xmlns:r="http://schemas.openxmlformats.org/officeDocument/2006/relationships" xmlns:p="http://schemas.openxmlformats.org/presentationml/2006/main">
+  <p:cSld>
+    <p:spTree>
+      <p:nvGrpSpPr>
+        <p:cNvPr id="1" name=""/>
+        <p:cNvGrpSpPr/>
+        <p:nvPr/>
+      </p:nvGrpSpPr>
+      <p:grpSpPr>
+        <a:xfrm>
+          <a:off x="0" y="0"/>
+          <a:ext cx="0" cy="0"/>
+          <a:chOff x="0" y="0"/>
+          <a:chExt cx="0" cy="0"/>
+        </a:xfrm>
+      </p:grpSpPr>
+      <p:sp>
+        <p:nvSpPr>
+          <p:cNvPr id="2" name="Title 1">
+            <a:extLst>
+              <a:ext uri="{FF2B5EF4-FFF2-40B4-BE49-F238E27FC236}">
+                <a16:creationId xmlns:a16="http://schemas.microsoft.com/office/drawing/2014/main" id="{FCA0F290-57A2-FB44-8C1A-729D0387A65D}"/>
+              </a:ext>
+            </a:extLst>
+          </p:cNvPr>
+          <p:cNvSpPr>
+            <a:spLocks noGrp="1"/>
+          </p:cNvSpPr>
+          <p:nvPr>
+            <p:ph type="title"/>
+          </p:nvPr>
+        </p:nvSpPr>
+        <p:spPr/>
+        <p:txBody>
+          <a:bodyPr>
+            <a:noAutofit/>
+          </a:bodyPr>
+          <a:lstStyle/>
+          <a:p>
+            <a:r>
+              <a:rPr lang="en-US" sz="2000" dirty="0"/>
+              <a:t>4. </a:t>
+            </a:r>
+            <a:r>
+              <a:rPr lang="en-GB" sz="2000" dirty="0"/>
+              <a:t>Investigate the relationship between the relevant data, the target and the business metric.</a:t>
+            </a:r>
+            <a:br>
+              <a:rPr lang="en-GB" sz="2000" dirty="0"/>
+            </a:br>
+            <a:endParaRPr lang="en-US" sz="2000" dirty="0"/>
+          </a:p>
+        </p:txBody>
+      </p:sp>
+      <p:sp>
+        <p:nvSpPr>
+          <p:cNvPr id="3" name="Content Placeholder 2">
+            <a:extLst>
+              <a:ext uri="{FF2B5EF4-FFF2-40B4-BE49-F238E27FC236}">
+                <a16:creationId xmlns:a16="http://schemas.microsoft.com/office/drawing/2014/main" id="{85FEA762-7E01-E445-8FB3-87E98CA838D6}"/>
+              </a:ext>
+            </a:extLst>
+          </p:cNvPr>
+          <p:cNvSpPr>
+            <a:spLocks noGrp="1"/>
+          </p:cNvSpPr>
+          <p:nvPr>
+            <p:ph idx="1"/>
+          </p:nvPr>
+        </p:nvSpPr>
+        <p:spPr/>
+        <p:txBody>
+          <a:bodyPr/>
+          <a:lstStyle/>
+          <a:p>
+            <a:endParaRPr lang="en-US"/>
+          </a:p>
+        </p:txBody>
+      </p:sp>
+    </p:spTree>
+    <p:extLst>
+      <p:ext uri="{BB962C8B-B14F-4D97-AF65-F5344CB8AC3E}">
+        <p14:creationId xmlns:p14="http://schemas.microsoft.com/office/powerpoint/2010/main" val="3842734303"/>
+      </p:ext>
+    </p:extLst>
+  </p:cSld>
+  <p:clrMapOvr>
+    <a:masterClrMapping/>
+  </p:clrMapOvr>
+</p:sld>
+</file>
+
+<file path=ppt/slides/slide7.xml><?xml version="1.0" encoding="utf-8"?>
+<p:sld xmlns:a="http://schemas.openxmlformats.org/drawingml/2006/main" xmlns:r="http://schemas.openxmlformats.org/officeDocument/2006/relationships" xmlns:p="http://schemas.openxmlformats.org/presentationml/2006/main">
+  <p:cSld>
+    <p:spTree>
+      <p:nvGrpSpPr>
+        <p:cNvPr id="1" name=""/>
+        <p:cNvGrpSpPr/>
+        <p:nvPr/>
+      </p:nvGrpSpPr>
+      <p:grpSpPr>
+        <a:xfrm>
+          <a:off x="0" y="0"/>
+          <a:ext cx="0" cy="0"/>
+          <a:chOff x="0" y="0"/>
+          <a:chExt cx="0" cy="0"/>
+        </a:xfrm>
+      </p:grpSpPr>
+      <p:sp>
+        <p:nvSpPr>
+          <p:cNvPr id="2" name="Title 1">
+            <a:extLst>
+              <a:ext uri="{FF2B5EF4-FFF2-40B4-BE49-F238E27FC236}">
+                <a16:creationId xmlns:a16="http://schemas.microsoft.com/office/drawing/2014/main" id="{2A5BDA39-49C6-F549-A272-95203EF7EDD7}"/>
+              </a:ext>
+            </a:extLst>
+          </p:cNvPr>
+          <p:cNvSpPr>
+            <a:spLocks noGrp="1"/>
+          </p:cNvSpPr>
+          <p:nvPr>
+            <p:ph type="title"/>
+          </p:nvPr>
+        </p:nvSpPr>
+        <p:spPr/>
+        <p:txBody>
+          <a:bodyPr/>
+          <a:lstStyle/>
+          <a:p>
+            <a:endParaRPr lang="en-US"/>
+          </a:p>
+        </p:txBody>
+      </p:sp>
+      <p:sp>
+        <p:nvSpPr>
+          <p:cNvPr id="3" name="Content Placeholder 2">
+            <a:extLst>
+              <a:ext uri="{FF2B5EF4-FFF2-40B4-BE49-F238E27FC236}">
+                <a16:creationId xmlns:a16="http://schemas.microsoft.com/office/drawing/2014/main" id="{E8FAD146-F2E9-594B-AE3C-47D9FA6D86FC}"/>
+              </a:ext>
+            </a:extLst>
+          </p:cNvPr>
+          <p:cNvSpPr>
+            <a:spLocks noGrp="1"/>
+          </p:cNvSpPr>
+          <p:nvPr>
+            <p:ph idx="1"/>
+          </p:nvPr>
+        </p:nvSpPr>
+        <p:spPr/>
+        <p:txBody>
+          <a:bodyPr/>
+          <a:lstStyle/>
+          <a:p>
+            <a:endParaRPr lang="en-US"/>
+          </a:p>
+        </p:txBody>
+      </p:sp>
+    </p:spTree>
+    <p:extLst>
+      <p:ext uri="{BB962C8B-B14F-4D97-AF65-F5344CB8AC3E}">
+        <p14:creationId xmlns:p14="http://schemas.microsoft.com/office/powerpoint/2010/main" val="3553155479"/>
+      </p:ext>
+    </p:extLst>
+  </p:cSld>
+  <p:clrMapOvr>
+    <a:masterClrMapping/>
+  </p:clrMapOvr>
+</p:sld>
+</file>
+
 <file path=ppt/theme/theme1.xml><?xml version="1.0" encoding="utf-8"?>
-<a:theme xmlns:a="http://schemas.openxmlformats.org/drawingml/2006/main" name="Office Theme">
+<a:theme xmlns:a="http://schemas.openxmlformats.org/drawingml/2006/main" name="Parcel">
   <a:themeElements>
-    <a:clrScheme name="Office">
+    <a:clrScheme name="Parcel">
       <a:dk1>
-        <a:sysClr val="windowText" lastClr="000000"/>
+        <a:srgbClr val="000000"/>
       </a:dk1>
       <a:lt1>
-        <a:sysClr val="window" lastClr="FFFFFF"/>
+        <a:srgbClr val="FFFFFF"/>
       </a:lt1>
       <a:dk2>
-        <a:srgbClr val="44546A"/>
+        <a:srgbClr val="4A5356"/>
       </a:dk2>
       <a:lt2>
-        <a:srgbClr val="E7E6E6"/>
+        <a:srgbClr val="E8E3CE"/>
       </a:lt2>
       <a:accent1>
-        <a:srgbClr val="4472C4"/>
+        <a:srgbClr val="F6A21D"/>
       </a:accent1>
       <a:accent2>
-        <a:srgbClr val="ED7D31"/>
+        <a:srgbClr val="9BAFB5"/>
       </a:accent2>
       <a:accent3>
-        <a:srgbClr val="A5A5A5"/>
+        <a:srgbClr val="C96731"/>
       </a:accent3>
       <a:accent4>
-        <a:srgbClr val="FFC000"/>
+        <a:srgbClr val="9CA383"/>
       </a:accent4>
       <a:accent5>
-        <a:srgbClr val="5B9BD5"/>
+        <a:srgbClr val="87795D"/>
       </a:accent5>
       <a:accent6>
-        <a:srgbClr val="70AD47"/>
+        <a:srgbClr val="A0988C"/>
       </a:accent6>
       <a:hlink>
-        <a:srgbClr val="0563C1"/>
+        <a:srgbClr val="00B0F0"/>
       </a:hlink>
       <a:folHlink>
-        <a:srgbClr val="954F72"/>
+        <a:srgbClr val="738F97"/>
       </a:folHlink>
     </a:clrScheme>
-    <a:fontScheme name="Office">
+    <a:fontScheme name="Parcel">
       <a:majorFont>
-        <a:latin typeface="Calibri Light" panose="020F0302020204030204"/>
+        <a:latin typeface="Gill Sans MT" panose="020B0502020104020203"/>
         <a:ea typeface=""/>
         <a:cs typeface=""/>
-        <a:font script="Jpan" typeface="游ゴシック Light"/>
-        <a:font script="Hang" typeface="맑은 고딕"/>
-        <a:font script="Hans" typeface="等线 Light"/>
-        <a:font script="Hant" typeface="新細明體"/>
-        <a:font script="Arab" typeface="Times New Roman"/>
-        <a:font script="Hebr" typeface="Times New Roman"/>
-        <a:font script="Thai" typeface="Angsana New"/>
-        <a:font script="Ethi" typeface="Nyala"/>
-        <a:font script="Beng" typeface="Vrinda"/>
-        <a:font script="Gujr" typeface="Shruti"/>
-        <a:font script="Khmr" typeface="MoolBoran"/>
-        <a:font script="Knda" typeface="Tunga"/>
-        <a:font script="Guru" typeface="Raavi"/>
-        <a:font script="Cans" typeface="Euphemia"/>
-        <a:font script="Cher" typeface="Plantagenet Cherokee"/>
-        <a:font script="Yiii" typeface="Microsoft Yi Baiti"/>
-        <a:font script="Tibt" typeface="Microsoft Himalaya"/>
-        <a:font script="Thaa" typeface="MV Boli"/>
-        <a:font script="Deva" typeface="Mangal"/>
-        <a:font script="Telu" typeface="Gautami"/>
-        <a:font script="Taml" typeface="Latha"/>
-        <a:font script="Syrc" typeface="Estrangelo Edessa"/>
-        <a:font script="Orya" typeface="Kalinga"/>
-        <a:font script="Mlym" typeface="Kartika"/>
-        <a:font script="Laoo" typeface="DokChampa"/>
-        <a:font script="Sinh" typeface="Iskoola Pota"/>
-        <a:font script="Mong" typeface="Mongolian Baiti"/>
-        <a:font script="Viet" typeface="Times New Roman"/>
-        <a:font script="Uigh" typeface="Microsoft Uighur"/>
-        <a:font script="Geor" typeface="Sylfaen"/>
-        <a:font script="Armn" typeface="Arial"/>
-        <a:font script="Bugi" typeface="Leelawadee UI"/>
-        <a:font script="Bopo" typeface="Microsoft JhengHei"/>
-        <a:font script="Java" typeface="Javanese Text"/>
-        <a:font script="Lisu" typeface="Segoe UI"/>
-        <a:font script="Mymr" typeface="Myanmar Text"/>
-        <a:font script="Nkoo" typeface="Ebrima"/>
-        <a:font script="Olck" typeface="Nirmala UI"/>
-        <a:font script="Osma" typeface="Ebrima"/>
-        <a:font script="Phag" typeface="Phagspa"/>
-        <a:font script="Syrn" typeface="Estrangelo Edessa"/>
-        <a:font script="Syrj" typeface="Estrangelo Edessa"/>
-        <a:font script="Syre" typeface="Estrangelo Edessa"/>
-        <a:font script="Sora" typeface="Nirmala UI"/>
-        <a:font script="Tale" typeface="Microsoft Tai Le"/>
-        <a:font script="Talu" typeface="Microsoft New Tai Lue"/>
-        <a:font script="Tfng" typeface="Ebrima"/>
-      </a:majorFont>
-      <a:minorFont>
-        <a:latin typeface="Calibri" panose="020F0502020204030204"/>
-        <a:ea typeface=""/>
-        <a:cs typeface=""/>
-        <a:font script="Jpan" typeface="游ゴシック"/>
-        <a:font script="Hang" typeface="맑은 고딕"/>
-        <a:font script="Hans" typeface="等线"/>
-        <a:font script="Hant" typeface="新細明體"/>
-        <a:font script="Arab" typeface="Arial"/>
+        <a:font script="Grek" typeface="Corbel"/>
+        <a:font script="Cyrl" typeface="Corbel"/>
+        <a:font script="Jpan" typeface="HGｺﾞｼｯｸE"/>
+        <a:font script="Hang" typeface="휴먼매직체"/>
+        <a:font script="Hans" typeface="华文中宋"/>
+        <a:font script="Hant" typeface="微軟正黑體"/>
+        <a:font script="Arab" typeface="Majalla UI"/>
         <a:font script="Hebr" typeface="Arial"/>
         <a:font script="Thai" typeface="Cordia New"/>
         <a:font script="Ethi" typeface="Nyala"/>
@@ -3530,29 +4079,49 @@
         <a:font script="Laoo" typeface="DokChampa"/>
         <a:font script="Sinh" typeface="Iskoola Pota"/>
         <a:font script="Mong" typeface="Mongolian Baiti"/>
-        <a:font script="Viet" typeface="Arial"/>
+        <a:font script="Viet" typeface="Tahoma"/>
         <a:font script="Uigh" typeface="Microsoft Uighur"/>
         <a:font script="Geor" typeface="Sylfaen"/>
-        <a:font script="Armn" typeface="Arial"/>
-        <a:font script="Bugi" typeface="Leelawadee UI"/>
-        <a:font script="Bopo" typeface="Microsoft JhengHei"/>
-        <a:font script="Java" typeface="Javanese Text"/>
-        <a:font script="Lisu" typeface="Segoe UI"/>
-        <a:font script="Mymr" typeface="Myanmar Text"/>
-        <a:font script="Nkoo" typeface="Ebrima"/>
-        <a:font script="Olck" typeface="Nirmala UI"/>
-        <a:font script="Osma" typeface="Ebrima"/>
-        <a:font script="Phag" typeface="Phagspa"/>
-        <a:font script="Syrn" typeface="Estrangelo Edessa"/>
-        <a:font script="Syrj" typeface="Estrangelo Edessa"/>
-        <a:font script="Syre" typeface="Estrangelo Edessa"/>
-        <a:font script="Sora" typeface="Nirmala UI"/>
-        <a:font script="Tale" typeface="Microsoft Tai Le"/>
-        <a:font script="Talu" typeface="Microsoft New Tai Lue"/>
-        <a:font script="Tfng" typeface="Ebrima"/>
+      </a:majorFont>
+      <a:minorFont>
+        <a:latin typeface="Gill Sans MT" panose="020B0502020104020203"/>
+        <a:ea typeface=""/>
+        <a:cs typeface=""/>
+        <a:font script="Grek" typeface="Corbel"/>
+        <a:font script="Cyrl" typeface="Corbel"/>
+        <a:font script="Jpan" typeface="HGｺﾞｼｯｸE"/>
+        <a:font script="Hang" typeface="휴먼매직체"/>
+        <a:font script="Hans" typeface="华文中宋"/>
+        <a:font script="Hant" typeface="微軟正黑體"/>
+        <a:font script="Arab" typeface="Majalla UI"/>
+        <a:font script="Hebr" typeface="Arial"/>
+        <a:font script="Thai" typeface="Cordia New"/>
+        <a:font script="Ethi" typeface="Nyala"/>
+        <a:font script="Beng" typeface="Vrinda"/>
+        <a:font script="Gujr" typeface="Shruti"/>
+        <a:font script="Khmr" typeface="DaunPenh"/>
+        <a:font script="Knda" typeface="Tunga"/>
+        <a:font script="Guru" typeface="Raavi"/>
+        <a:font script="Cans" typeface="Euphemia"/>
+        <a:font script="Cher" typeface="Plantagenet Cherokee"/>
+        <a:font script="Yiii" typeface="Microsoft Yi Baiti"/>
+        <a:font script="Tibt" typeface="Microsoft Himalaya"/>
+        <a:font script="Thaa" typeface="MV Boli"/>
+        <a:font script="Deva" typeface="Mangal"/>
+        <a:font script="Telu" typeface="Gautami"/>
+        <a:font script="Taml" typeface="Latha"/>
+        <a:font script="Syrc" typeface="Estrangelo Edessa"/>
+        <a:font script="Orya" typeface="Kalinga"/>
+        <a:font script="Mlym" typeface="Kartika"/>
+        <a:font script="Laoo" typeface="DokChampa"/>
+        <a:font script="Sinh" typeface="Iskoola Pota"/>
+        <a:font script="Mong" typeface="Mongolian Baiti"/>
+        <a:font script="Viet" typeface="Tahoma"/>
+        <a:font script="Uigh" typeface="Microsoft Uighur"/>
+        <a:font script="Geor" typeface="Sylfaen"/>
       </a:minorFont>
     </a:fontScheme>
-    <a:fmtScheme name="Office">
+    <a:fmtScheme name="Parcel">
       <a:fillStyleLst>
         <a:solidFill>
           <a:schemeClr val="phClr"/>
@@ -3561,23 +4130,16 @@
           <a:gsLst>
             <a:gs pos="0">
               <a:schemeClr val="phClr">
-                <a:lumMod val="110000"/>
-                <a:satMod val="105000"/>
-                <a:tint val="67000"/>
-              </a:schemeClr>
-            </a:gs>
-            <a:gs pos="50000">
-              <a:schemeClr val="phClr">
-                <a:lumMod val="105000"/>
-                <a:satMod val="103000"/>
-                <a:tint val="73000"/>
+                <a:tint val="80000"/>
+                <a:satMod val="107000"/>
+                <a:lumMod val="103000"/>
               </a:schemeClr>
             </a:gs>
             <a:gs pos="100000">
               <a:schemeClr val="phClr">
-                <a:lumMod val="105000"/>
+                <a:tint val="82000"/>
                 <a:satMod val="109000"/>
-                <a:tint val="81000"/>
+                <a:lumMod val="103000"/>
               </a:schemeClr>
             </a:gs>
           </a:gsLst>
@@ -3587,23 +4149,23 @@
           <a:gsLst>
             <a:gs pos="0">
               <a:schemeClr val="phClr">
-                <a:satMod val="103000"/>
+                <a:tint val="97000"/>
+                <a:satMod val="100000"/>
                 <a:lumMod val="102000"/>
-                <a:tint val="94000"/>
               </a:schemeClr>
             </a:gs>
             <a:gs pos="50000">
               <a:schemeClr val="phClr">
-                <a:satMod val="110000"/>
+                <a:shade val="100000"/>
+                <a:satMod val="103000"/>
                 <a:lumMod val="100000"/>
-                <a:shade val="100000"/>
               </a:schemeClr>
             </a:gs>
             <a:gs pos="100000">
               <a:schemeClr val="phClr">
+                <a:shade val="93000"/>
+                <a:satMod val="110000"/>
                 <a:lumMod val="99000"/>
-                <a:satMod val="120000"/>
-                <a:shade val="78000"/>
               </a:schemeClr>
             </a:gs>
           </a:gsLst>
@@ -3616,21 +4178,18 @@
             <a:schemeClr val="phClr"/>
           </a:solidFill>
           <a:prstDash val="solid"/>
-          <a:miter lim="800000"/>
         </a:ln>
         <a:ln w="12700" cap="flat" cmpd="sng" algn="ctr">
           <a:solidFill>
             <a:schemeClr val="phClr"/>
           </a:solidFill>
           <a:prstDash val="solid"/>
-          <a:miter lim="800000"/>
         </a:ln>
-        <a:ln w="19050" cap="flat" cmpd="sng" algn="ctr">
+        <a:ln w="31750" cap="flat" cmpd="sng" algn="ctr">
           <a:solidFill>
             <a:schemeClr val="phClr"/>
           </a:solidFill>
           <a:prstDash val="solid"/>
-          <a:miter lim="800000"/>
         </a:ln>
       </a:lnStyleLst>
       <a:effectStyleLst>
@@ -3642,12 +4201,21 @@
         </a:effectStyle>
         <a:effectStyle>
           <a:effectLst>
-            <a:outerShdw blurRad="57150" dist="19050" dir="5400000" algn="ctr" rotWithShape="0">
+            <a:outerShdw blurRad="55880" dist="15240" dir="5400000" algn="ctr" rotWithShape="0">
               <a:srgbClr val="000000">
-                <a:alpha val="63000"/>
+                <a:alpha val="45000"/>
               </a:srgbClr>
             </a:outerShdw>
           </a:effectLst>
+          <a:scene3d>
+            <a:camera prst="orthographicFront">
+              <a:rot lat="0" lon="0" rev="0"/>
+            </a:camera>
+            <a:lightRig rig="brightRoom" dir="tl"/>
+          </a:scene3d>
+          <a:sp3d prstMaterial="dkEdge">
+            <a:bevelT w="0" h="0"/>
+          </a:sp3d>
         </a:effectStyle>
       </a:effectStyleLst>
       <a:bgFillStyleLst>
@@ -3664,28 +4232,24 @@
           <a:gsLst>
             <a:gs pos="0">
               <a:schemeClr val="phClr">
-                <a:tint val="93000"/>
-                <a:satMod val="150000"/>
-                <a:shade val="98000"/>
-                <a:lumMod val="102000"/>
-              </a:schemeClr>
-            </a:gs>
-            <a:gs pos="50000">
-              <a:schemeClr val="phClr">
-                <a:tint val="98000"/>
-                <a:satMod val="130000"/>
-                <a:shade val="90000"/>
-                <a:lumMod val="103000"/>
+                <a:tint val="97000"/>
+                <a:shade val="100000"/>
+                <a:satMod val="185000"/>
+                <a:lumMod val="120000"/>
               </a:schemeClr>
             </a:gs>
             <a:gs pos="100000">
               <a:schemeClr val="phClr">
-                <a:shade val="63000"/>
-                <a:satMod val="120000"/>
+                <a:tint val="96000"/>
+                <a:shade val="95000"/>
+                <a:satMod val="215000"/>
+                <a:lumMod val="80000"/>
               </a:schemeClr>
             </a:gs>
           </a:gsLst>
-          <a:lin ang="5400000" scaled="0"/>
+          <a:path path="circle">
+            <a:fillToRect l="50000" t="55000" r="125000" b="100000"/>
+          </a:path>
         </a:gradFill>
       </a:bgFillStyleLst>
     </a:fmtScheme>
@@ -3694,7 +4258,7 @@
   <a:extraClrSchemeLst/>
   <a:extLst>
     <a:ext uri="{05A4C25C-085E-4340-85A3-A5531E510DB2}">
-      <thm15:themeFamily xmlns:thm15="http://schemas.microsoft.com/office/thememl/2012/main" name="Office Theme" id="{62F939B6-93AF-4DB8-9C6B-D6C7DFDC589F}" vid="{4A3C46E8-61CC-4603-A589-7422A47A8E4A}"/>
+      <thm15:themeFamily xmlns:thm15="http://schemas.microsoft.com/office/thememl/2012/main" name="Parcel" id="{8BEC4385-4EB9-4D53-BFB5-0EA123736B6D}" vid="{4DB32801-28C0-48B0-8C1D-A9A58613615A}"/>
     </a:ext>
   </a:extLst>
 </a:theme>

</xml_diff>

<commit_message>
Hypotheses and ideal data added
</commit_message>
<xml_diff>
--- a/Part 1 Data Investigation/AAVAiL Revenue Prediction - Data Investigation Summary.pptx
+++ b/Part 1 Data Investigation/AAVAiL Revenue Prediction - Data Investigation Summary.pptx
@@ -4,11 +4,14 @@
   <p:sldMasterIdLst>
     <p:sldMasterId id="2147483660" r:id="rId1"/>
   </p:sldMasterIdLst>
+  <p:notesMasterIdLst>
+    <p:notesMasterId r:id="rId9"/>
+  </p:notesMasterIdLst>
   <p:sldIdLst>
     <p:sldId id="256" r:id="rId2"/>
     <p:sldId id="257" r:id="rId3"/>
     <p:sldId id="258" r:id="rId4"/>
-    <p:sldId id="259" r:id="rId5"/>
+    <p:sldId id="263" r:id="rId5"/>
     <p:sldId id="260" r:id="rId6"/>
     <p:sldId id="261" r:id="rId7"/>
     <p:sldId id="262" r:id="rId8"/>
@@ -110,7 +113,446 @@
       </a:defRPr>
     </a:lvl9pPr>
   </p:defaultTextStyle>
+  <p:extLst>
+    <p:ext uri="{EFAFB233-063F-42B5-8137-9DF3F51BA10A}">
+      <p15:sldGuideLst xmlns:p15="http://schemas.microsoft.com/office/powerpoint/2012/main"/>
+    </p:ext>
+  </p:extLst>
 </p:presentation>
+</file>
+
+<file path=ppt/notesMasters/notesMaster1.xml><?xml version="1.0" encoding="utf-8"?>
+<p:notesMaster xmlns:a="http://schemas.openxmlformats.org/drawingml/2006/main" xmlns:r="http://schemas.openxmlformats.org/officeDocument/2006/relationships" xmlns:p="http://schemas.openxmlformats.org/presentationml/2006/main">
+  <p:cSld>
+    <p:bg>
+      <p:bgRef idx="1001">
+        <a:schemeClr val="bg1"/>
+      </p:bgRef>
+    </p:bg>
+    <p:spTree>
+      <p:nvGrpSpPr>
+        <p:cNvPr id="1" name=""/>
+        <p:cNvGrpSpPr/>
+        <p:nvPr/>
+      </p:nvGrpSpPr>
+      <p:grpSpPr>
+        <a:xfrm>
+          <a:off x="0" y="0"/>
+          <a:ext cx="0" cy="0"/>
+          <a:chOff x="0" y="0"/>
+          <a:chExt cx="0" cy="0"/>
+        </a:xfrm>
+      </p:grpSpPr>
+      <p:sp>
+        <p:nvSpPr>
+          <p:cNvPr id="2" name="Header Placeholder 1"/>
+          <p:cNvSpPr>
+            <a:spLocks noGrp="1"/>
+          </p:cNvSpPr>
+          <p:nvPr>
+            <p:ph type="hdr" sz="quarter"/>
+          </p:nvPr>
+        </p:nvSpPr>
+        <p:spPr>
+          <a:xfrm>
+            <a:off x="0" y="0"/>
+            <a:ext cx="2971800" cy="458788"/>
+          </a:xfrm>
+          <a:prstGeom prst="rect">
+            <a:avLst/>
+          </a:prstGeom>
+        </p:spPr>
+        <p:txBody>
+          <a:bodyPr vert="horz" lIns="91440" tIns="45720" rIns="91440" bIns="45720" rtlCol="0"/>
+          <a:lstStyle>
+            <a:lvl1pPr algn="l">
+              <a:defRPr sz="1200"/>
+            </a:lvl1pPr>
+          </a:lstStyle>
+          <a:p>
+            <a:endParaRPr lang="en-US"/>
+          </a:p>
+        </p:txBody>
+      </p:sp>
+      <p:sp>
+        <p:nvSpPr>
+          <p:cNvPr id="3" name="Date Placeholder 2"/>
+          <p:cNvSpPr>
+            <a:spLocks noGrp="1"/>
+          </p:cNvSpPr>
+          <p:nvPr>
+            <p:ph type="dt" idx="1"/>
+          </p:nvPr>
+        </p:nvSpPr>
+        <p:spPr>
+          <a:xfrm>
+            <a:off x="3884613" y="0"/>
+            <a:ext cx="2971800" cy="458788"/>
+          </a:xfrm>
+          <a:prstGeom prst="rect">
+            <a:avLst/>
+          </a:prstGeom>
+        </p:spPr>
+        <p:txBody>
+          <a:bodyPr vert="horz" lIns="91440" tIns="45720" rIns="91440" bIns="45720" rtlCol="0"/>
+          <a:lstStyle>
+            <a:lvl1pPr algn="r">
+              <a:defRPr sz="1200"/>
+            </a:lvl1pPr>
+          </a:lstStyle>
+          <a:p>
+            <a:fld id="{6B972669-857D-BB4A-A249-2A6DFC7030D3}" type="datetimeFigureOut">
+              <a:rPr lang="en-US" smtClean="0"/>
+              <a:t>3/14/21</a:t>
+            </a:fld>
+            <a:endParaRPr lang="en-US"/>
+          </a:p>
+        </p:txBody>
+      </p:sp>
+      <p:sp>
+        <p:nvSpPr>
+          <p:cNvPr id="4" name="Slide Image Placeholder 3"/>
+          <p:cNvSpPr>
+            <a:spLocks noGrp="1" noRot="1" noChangeAspect="1"/>
+          </p:cNvSpPr>
+          <p:nvPr>
+            <p:ph type="sldImg" idx="2"/>
+          </p:nvPr>
+        </p:nvSpPr>
+        <p:spPr>
+          <a:xfrm>
+            <a:off x="685800" y="1143000"/>
+            <a:ext cx="5486400" cy="3086100"/>
+          </a:xfrm>
+          <a:prstGeom prst="rect">
+            <a:avLst/>
+          </a:prstGeom>
+          <a:noFill/>
+          <a:ln w="12700">
+            <a:solidFill>
+              <a:prstClr val="black"/>
+            </a:solidFill>
+          </a:ln>
+        </p:spPr>
+        <p:txBody>
+          <a:bodyPr vert="horz" lIns="91440" tIns="45720" rIns="91440" bIns="45720" rtlCol="0" anchor="ctr"/>
+          <a:lstStyle/>
+          <a:p>
+            <a:endParaRPr lang="en-US"/>
+          </a:p>
+        </p:txBody>
+      </p:sp>
+      <p:sp>
+        <p:nvSpPr>
+          <p:cNvPr id="5" name="Notes Placeholder 4"/>
+          <p:cNvSpPr>
+            <a:spLocks noGrp="1"/>
+          </p:cNvSpPr>
+          <p:nvPr>
+            <p:ph type="body" sz="quarter" idx="3"/>
+          </p:nvPr>
+        </p:nvSpPr>
+        <p:spPr>
+          <a:xfrm>
+            <a:off x="685800" y="4400550"/>
+            <a:ext cx="5486400" cy="3600450"/>
+          </a:xfrm>
+          <a:prstGeom prst="rect">
+            <a:avLst/>
+          </a:prstGeom>
+        </p:spPr>
+        <p:txBody>
+          <a:bodyPr vert="horz" lIns="91440" tIns="45720" rIns="91440" bIns="45720" rtlCol="0"/>
+          <a:lstStyle/>
+          <a:p>
+            <a:pPr lvl="0"/>
+            <a:r>
+              <a:rPr lang="en-GB"/>
+              <a:t>Click to edit Master text styles</a:t>
+            </a:r>
+          </a:p>
+          <a:p>
+            <a:pPr lvl="1"/>
+            <a:r>
+              <a:rPr lang="en-GB"/>
+              <a:t>Second level</a:t>
+            </a:r>
+          </a:p>
+          <a:p>
+            <a:pPr lvl="2"/>
+            <a:r>
+              <a:rPr lang="en-GB"/>
+              <a:t>Third level</a:t>
+            </a:r>
+          </a:p>
+          <a:p>
+            <a:pPr lvl="3"/>
+            <a:r>
+              <a:rPr lang="en-GB"/>
+              <a:t>Fourth level</a:t>
+            </a:r>
+          </a:p>
+          <a:p>
+            <a:pPr lvl="4"/>
+            <a:r>
+              <a:rPr lang="en-GB"/>
+              <a:t>Fifth level</a:t>
+            </a:r>
+            <a:endParaRPr lang="en-US"/>
+          </a:p>
+        </p:txBody>
+      </p:sp>
+      <p:sp>
+        <p:nvSpPr>
+          <p:cNvPr id="6" name="Footer Placeholder 5"/>
+          <p:cNvSpPr>
+            <a:spLocks noGrp="1"/>
+          </p:cNvSpPr>
+          <p:nvPr>
+            <p:ph type="ftr" sz="quarter" idx="4"/>
+          </p:nvPr>
+        </p:nvSpPr>
+        <p:spPr>
+          <a:xfrm>
+            <a:off x="0" y="8685213"/>
+            <a:ext cx="2971800" cy="458787"/>
+          </a:xfrm>
+          <a:prstGeom prst="rect">
+            <a:avLst/>
+          </a:prstGeom>
+        </p:spPr>
+        <p:txBody>
+          <a:bodyPr vert="horz" lIns="91440" tIns="45720" rIns="91440" bIns="45720" rtlCol="0" anchor="b"/>
+          <a:lstStyle>
+            <a:lvl1pPr algn="l">
+              <a:defRPr sz="1200"/>
+            </a:lvl1pPr>
+          </a:lstStyle>
+          <a:p>
+            <a:endParaRPr lang="en-US"/>
+          </a:p>
+        </p:txBody>
+      </p:sp>
+      <p:sp>
+        <p:nvSpPr>
+          <p:cNvPr id="7" name="Slide Number Placeholder 6"/>
+          <p:cNvSpPr>
+            <a:spLocks noGrp="1"/>
+          </p:cNvSpPr>
+          <p:nvPr>
+            <p:ph type="sldNum" sz="quarter" idx="5"/>
+          </p:nvPr>
+        </p:nvSpPr>
+        <p:spPr>
+          <a:xfrm>
+            <a:off x="3884613" y="8685213"/>
+            <a:ext cx="2971800" cy="458787"/>
+          </a:xfrm>
+          <a:prstGeom prst="rect">
+            <a:avLst/>
+          </a:prstGeom>
+        </p:spPr>
+        <p:txBody>
+          <a:bodyPr vert="horz" lIns="91440" tIns="45720" rIns="91440" bIns="45720" rtlCol="0" anchor="b"/>
+          <a:lstStyle>
+            <a:lvl1pPr algn="r">
+              <a:defRPr sz="1200"/>
+            </a:lvl1pPr>
+          </a:lstStyle>
+          <a:p>
+            <a:fld id="{DEB76669-CF56-364A-B01E-79F7D7D79FFE}" type="slidenum">
+              <a:rPr lang="en-US" smtClean="0"/>
+              <a:t>‹#›</a:t>
+            </a:fld>
+            <a:endParaRPr lang="en-US"/>
+          </a:p>
+        </p:txBody>
+      </p:sp>
+    </p:spTree>
+    <p:extLst>
+      <p:ext uri="{BB962C8B-B14F-4D97-AF65-F5344CB8AC3E}">
+        <p14:creationId xmlns:p14="http://schemas.microsoft.com/office/powerpoint/2010/main" val="2529094693"/>
+      </p:ext>
+    </p:extLst>
+  </p:cSld>
+  <p:clrMap bg1="lt1" tx1="dk1" bg2="lt2" tx2="dk2" accent1="accent1" accent2="accent2" accent3="accent3" accent4="accent4" accent5="accent5" accent6="accent6" hlink="hlink" folHlink="folHlink"/>
+  <p:notesStyle>
+    <a:lvl1pPr marL="0" algn="l" defTabSz="914400" rtl="0" eaLnBrk="1" latinLnBrk="0" hangingPunct="1">
+      <a:defRPr sz="1200" kern="1200">
+        <a:solidFill>
+          <a:schemeClr val="tx1"/>
+        </a:solidFill>
+        <a:latin typeface="+mn-lt"/>
+        <a:ea typeface="+mn-ea"/>
+        <a:cs typeface="+mn-cs"/>
+      </a:defRPr>
+    </a:lvl1pPr>
+    <a:lvl2pPr marL="457200" algn="l" defTabSz="914400" rtl="0" eaLnBrk="1" latinLnBrk="0" hangingPunct="1">
+      <a:defRPr sz="1200" kern="1200">
+        <a:solidFill>
+          <a:schemeClr val="tx1"/>
+        </a:solidFill>
+        <a:latin typeface="+mn-lt"/>
+        <a:ea typeface="+mn-ea"/>
+        <a:cs typeface="+mn-cs"/>
+      </a:defRPr>
+    </a:lvl2pPr>
+    <a:lvl3pPr marL="914400" algn="l" defTabSz="914400" rtl="0" eaLnBrk="1" latinLnBrk="0" hangingPunct="1">
+      <a:defRPr sz="1200" kern="1200">
+        <a:solidFill>
+          <a:schemeClr val="tx1"/>
+        </a:solidFill>
+        <a:latin typeface="+mn-lt"/>
+        <a:ea typeface="+mn-ea"/>
+        <a:cs typeface="+mn-cs"/>
+      </a:defRPr>
+    </a:lvl3pPr>
+    <a:lvl4pPr marL="1371600" algn="l" defTabSz="914400" rtl="0" eaLnBrk="1" latinLnBrk="0" hangingPunct="1">
+      <a:defRPr sz="1200" kern="1200">
+        <a:solidFill>
+          <a:schemeClr val="tx1"/>
+        </a:solidFill>
+        <a:latin typeface="+mn-lt"/>
+        <a:ea typeface="+mn-ea"/>
+        <a:cs typeface="+mn-cs"/>
+      </a:defRPr>
+    </a:lvl4pPr>
+    <a:lvl5pPr marL="1828800" algn="l" defTabSz="914400" rtl="0" eaLnBrk="1" latinLnBrk="0" hangingPunct="1">
+      <a:defRPr sz="1200" kern="1200">
+        <a:solidFill>
+          <a:schemeClr val="tx1"/>
+        </a:solidFill>
+        <a:latin typeface="+mn-lt"/>
+        <a:ea typeface="+mn-ea"/>
+        <a:cs typeface="+mn-cs"/>
+      </a:defRPr>
+    </a:lvl5pPr>
+    <a:lvl6pPr marL="2286000" algn="l" defTabSz="914400" rtl="0" eaLnBrk="1" latinLnBrk="0" hangingPunct="1">
+      <a:defRPr sz="1200" kern="1200">
+        <a:solidFill>
+          <a:schemeClr val="tx1"/>
+        </a:solidFill>
+        <a:latin typeface="+mn-lt"/>
+        <a:ea typeface="+mn-ea"/>
+        <a:cs typeface="+mn-cs"/>
+      </a:defRPr>
+    </a:lvl6pPr>
+    <a:lvl7pPr marL="2743200" algn="l" defTabSz="914400" rtl="0" eaLnBrk="1" latinLnBrk="0" hangingPunct="1">
+      <a:defRPr sz="1200" kern="1200">
+        <a:solidFill>
+          <a:schemeClr val="tx1"/>
+        </a:solidFill>
+        <a:latin typeface="+mn-lt"/>
+        <a:ea typeface="+mn-ea"/>
+        <a:cs typeface="+mn-cs"/>
+      </a:defRPr>
+    </a:lvl7pPr>
+    <a:lvl8pPr marL="3200400" algn="l" defTabSz="914400" rtl="0" eaLnBrk="1" latinLnBrk="0" hangingPunct="1">
+      <a:defRPr sz="1200" kern="1200">
+        <a:solidFill>
+          <a:schemeClr val="tx1"/>
+        </a:solidFill>
+        <a:latin typeface="+mn-lt"/>
+        <a:ea typeface="+mn-ea"/>
+        <a:cs typeface="+mn-cs"/>
+      </a:defRPr>
+    </a:lvl8pPr>
+    <a:lvl9pPr marL="3657600" algn="l" defTabSz="914400" rtl="0" eaLnBrk="1" latinLnBrk="0" hangingPunct="1">
+      <a:defRPr sz="1200" kern="1200">
+        <a:solidFill>
+          <a:schemeClr val="tx1"/>
+        </a:solidFill>
+        <a:latin typeface="+mn-lt"/>
+        <a:ea typeface="+mn-ea"/>
+        <a:cs typeface="+mn-cs"/>
+      </a:defRPr>
+    </a:lvl9pPr>
+  </p:notesStyle>
+</p:notesMaster>
+</file>
+
+<file path=ppt/notesSlides/notesSlide1.xml><?xml version="1.0" encoding="utf-8"?>
+<p:notes xmlns:a="http://schemas.openxmlformats.org/drawingml/2006/main" xmlns:r="http://schemas.openxmlformats.org/officeDocument/2006/relationships" xmlns:p="http://schemas.openxmlformats.org/presentationml/2006/main">
+  <p:cSld>
+    <p:spTree>
+      <p:nvGrpSpPr>
+        <p:cNvPr id="1" name=""/>
+        <p:cNvGrpSpPr/>
+        <p:nvPr/>
+      </p:nvGrpSpPr>
+      <p:grpSpPr>
+        <a:xfrm>
+          <a:off x="0" y="0"/>
+          <a:ext cx="0" cy="0"/>
+          <a:chOff x="0" y="0"/>
+          <a:chExt cx="0" cy="0"/>
+        </a:xfrm>
+      </p:grpSpPr>
+      <p:sp>
+        <p:nvSpPr>
+          <p:cNvPr id="2" name="Slide Image Placeholder 1"/>
+          <p:cNvSpPr>
+            <a:spLocks noGrp="1" noRot="1" noChangeAspect="1"/>
+          </p:cNvSpPr>
+          <p:nvPr>
+            <p:ph type="sldImg"/>
+          </p:nvPr>
+        </p:nvSpPr>
+        <p:spPr/>
+      </p:sp>
+      <p:sp>
+        <p:nvSpPr>
+          <p:cNvPr id="3" name="Notes Placeholder 2"/>
+          <p:cNvSpPr>
+            <a:spLocks noGrp="1"/>
+          </p:cNvSpPr>
+          <p:nvPr>
+            <p:ph type="body" idx="1"/>
+          </p:nvPr>
+        </p:nvSpPr>
+        <p:spPr/>
+        <p:txBody>
+          <a:bodyPr/>
+          <a:lstStyle/>
+          <a:p>
+            <a:endParaRPr lang="en-US" dirty="0"/>
+          </a:p>
+        </p:txBody>
+      </p:sp>
+      <p:sp>
+        <p:nvSpPr>
+          <p:cNvPr id="4" name="Slide Number Placeholder 3"/>
+          <p:cNvSpPr>
+            <a:spLocks noGrp="1"/>
+          </p:cNvSpPr>
+          <p:nvPr>
+            <p:ph type="sldNum" sz="quarter" idx="5"/>
+          </p:nvPr>
+        </p:nvSpPr>
+        <p:spPr/>
+        <p:txBody>
+          <a:bodyPr/>
+          <a:lstStyle/>
+          <a:p>
+            <a:fld id="{DEB76669-CF56-364A-B01E-79F7D7D79FFE}" type="slidenum">
+              <a:rPr lang="en-US" smtClean="0"/>
+              <a:t>3</a:t>
+            </a:fld>
+            <a:endParaRPr lang="en-US"/>
+          </a:p>
+        </p:txBody>
+      </p:sp>
+    </p:spTree>
+    <p:extLst>
+      <p:ext uri="{BB962C8B-B14F-4D97-AF65-F5344CB8AC3E}">
+        <p14:creationId xmlns:p14="http://schemas.microsoft.com/office/powerpoint/2010/main" val="1732296754"/>
+      </p:ext>
+    </p:extLst>
+  </p:cSld>
+  <p:clrMapOvr>
+    <a:masterClrMapping/>
+  </p:clrMapOvr>
+</p:notes>
 </file>
 
 <file path=ppt/slideLayouts/slideLayout1.xml><?xml version="1.0" encoding="utf-8"?>
@@ -276,7 +718,7 @@
           <a:p>
             <a:fld id="{494076E2-43EB-7D4D-9539-7B25001E7176}" type="datetimeFigureOut">
               <a:rPr lang="en-US" smtClean="0"/>
-              <a:t>3/12/21</a:t>
+              <a:t>3/14/21</a:t>
             </a:fld>
             <a:endParaRPr lang="en-US"/>
           </a:p>
@@ -446,7 +888,7 @@
           <a:p>
             <a:fld id="{494076E2-43EB-7D4D-9539-7B25001E7176}" type="datetimeFigureOut">
               <a:rPr lang="en-US" smtClean="0"/>
-              <a:t>3/12/21</a:t>
+              <a:t>3/14/21</a:t>
             </a:fld>
             <a:endParaRPr lang="en-US"/>
           </a:p>
@@ -626,7 +1068,7 @@
           <a:p>
             <a:fld id="{494076E2-43EB-7D4D-9539-7B25001E7176}" type="datetimeFigureOut">
               <a:rPr lang="en-US" smtClean="0"/>
-              <a:t>3/12/21</a:t>
+              <a:t>3/14/21</a:t>
             </a:fld>
             <a:endParaRPr lang="en-US"/>
           </a:p>
@@ -796,7 +1238,7 @@
           <a:p>
             <a:fld id="{494076E2-43EB-7D4D-9539-7B25001E7176}" type="datetimeFigureOut">
               <a:rPr lang="en-US" smtClean="0"/>
-              <a:t>3/12/21</a:t>
+              <a:t>3/14/21</a:t>
             </a:fld>
             <a:endParaRPr lang="en-US"/>
           </a:p>
@@ -1064,7 +1506,7 @@
           <a:p>
             <a:fld id="{494076E2-43EB-7D4D-9539-7B25001E7176}" type="datetimeFigureOut">
               <a:rPr lang="en-US" smtClean="0"/>
-              <a:t>3/12/21</a:t>
+              <a:t>3/14/21</a:t>
             </a:fld>
             <a:endParaRPr lang="en-US"/>
           </a:p>
@@ -1296,7 +1738,7 @@
           <a:p>
             <a:fld id="{494076E2-43EB-7D4D-9539-7B25001E7176}" type="datetimeFigureOut">
               <a:rPr lang="en-US" smtClean="0"/>
-              <a:t>3/12/21</a:t>
+              <a:t>3/14/21</a:t>
             </a:fld>
             <a:endParaRPr lang="en-US"/>
           </a:p>
@@ -1655,7 +2097,7 @@
           <a:p>
             <a:fld id="{494076E2-43EB-7D4D-9539-7B25001E7176}" type="datetimeFigureOut">
               <a:rPr lang="en-US" smtClean="0"/>
-              <a:t>3/12/21</a:t>
+              <a:t>3/14/21</a:t>
             </a:fld>
             <a:endParaRPr lang="en-US"/>
           </a:p>
@@ -1796,7 +2238,7 @@
           <a:p>
             <a:fld id="{494076E2-43EB-7D4D-9539-7B25001E7176}" type="datetimeFigureOut">
               <a:rPr lang="en-US" smtClean="0"/>
-              <a:t>3/12/21</a:t>
+              <a:t>3/14/21</a:t>
             </a:fld>
             <a:endParaRPr lang="en-US"/>
           </a:p>
@@ -1891,7 +2333,7 @@
           <a:p>
             <a:fld id="{494076E2-43EB-7D4D-9539-7B25001E7176}" type="datetimeFigureOut">
               <a:rPr lang="en-US" smtClean="0"/>
-              <a:t>3/12/21</a:t>
+              <a:t>3/14/21</a:t>
             </a:fld>
             <a:endParaRPr lang="en-US"/>
           </a:p>
@@ -2248,7 +2690,7 @@
           <a:p>
             <a:fld id="{494076E2-43EB-7D4D-9539-7B25001E7176}" type="datetimeFigureOut">
               <a:rPr lang="en-US" smtClean="0"/>
-              <a:t>3/12/21</a:t>
+              <a:t>3/14/21</a:t>
             </a:fld>
             <a:endParaRPr lang="en-US"/>
           </a:p>
@@ -2605,7 +3047,7 @@
           <a:p>
             <a:fld id="{494076E2-43EB-7D4D-9539-7B25001E7176}" type="datetimeFigureOut">
               <a:rPr lang="en-US" smtClean="0"/>
-              <a:t>3/12/21</a:t>
+              <a:t>3/14/21</a:t>
             </a:fld>
             <a:endParaRPr lang="en-US"/>
           </a:p>
@@ -2847,7 +3289,7 @@
           <a:p>
             <a:fld id="{494076E2-43EB-7D4D-9539-7B25001E7176}" type="datetimeFigureOut">
               <a:rPr lang="en-US" smtClean="0"/>
-              <a:t>3/12/21</a:t>
+              <a:t>3/14/21</a:t>
             </a:fld>
             <a:endParaRPr lang="en-US"/>
           </a:p>
@@ -3501,7 +3943,7 @@
         <p:spPr/>
         <p:txBody>
           <a:bodyPr>
-            <a:normAutofit fontScale="90000"/>
+            <a:normAutofit/>
           </a:bodyPr>
           <a:lstStyle/>
           <a:p>
@@ -3511,7 +3953,11 @@
             </a:r>
             <a:r>
               <a:rPr lang="en-GB" dirty="0"/>
-              <a:t>Assimilate the business scenario and articulate testable hypotheses.</a:t>
+              <a:t>Assimilate the business </a:t>
+            </a:r>
+            <a:r>
+              <a:rPr lang="en-GB" dirty="0" err="1"/>
+              <a:t>scenariO</a:t>
             </a:r>
             <a:br>
               <a:rPr lang="en-GB" dirty="0"/>
@@ -3539,7 +3985,7 @@
         <p:spPr/>
         <p:txBody>
           <a:bodyPr>
-            <a:normAutofit fontScale="70000" lnSpcReduction="20000"/>
+            <a:normAutofit fontScale="77500" lnSpcReduction="20000"/>
           </a:bodyPr>
           <a:lstStyle/>
           <a:p>
@@ -3617,25 +4063,11 @@
             </a:r>
             <a:r>
               <a:rPr lang="en-US" dirty="0" err="1"/>
-              <a:t>stabililse</a:t>
+              <a:t>stabilise</a:t>
             </a:r>
             <a:r>
               <a:rPr lang="en-US" dirty="0"/>
-              <a:t> </a:t>
-            </a:r>
-            <a:r>
-              <a:rPr lang="en-US" dirty="0" err="1"/>
-              <a:t>stagg</a:t>
-            </a:r>
-            <a:r>
-              <a:rPr lang="en-US" dirty="0"/>
-              <a:t> members, and will generate a ‘ripple effect’ drawn from budget projections.</a:t>
-            </a:r>
-          </a:p>
-          <a:p>
-            <a:r>
-              <a:rPr lang="en-US" b="1" dirty="0"/>
-              <a:t>NEXT – TESTABLE HYPOTHESES</a:t>
+              <a:t> counts of staff members, and will generate a ‘ripple effect’ drawn from budget projections.</a:t>
             </a:r>
           </a:p>
         </p:txBody>
@@ -3656,6 +4088,14 @@
 <file path=ppt/slides/slide4.xml><?xml version="1.0" encoding="utf-8"?>
 <p:sld xmlns:a="http://schemas.openxmlformats.org/drawingml/2006/main" xmlns:r="http://schemas.openxmlformats.org/officeDocument/2006/relationships" xmlns:p="http://schemas.openxmlformats.org/presentationml/2006/main">
   <p:cSld>
+    <p:bg>
+      <p:bgPr>
+        <a:solidFill>
+          <a:schemeClr val="bg1"/>
+        </a:solidFill>
+        <a:effectLst/>
+      </p:bgPr>
+    </p:bg>
     <p:spTree>
       <p:nvGrpSpPr>
         <p:cNvPr id="1" name=""/>
@@ -3672,21 +4112,155 @@
       </p:grpSpPr>
       <p:sp>
         <p:nvSpPr>
-          <p:cNvPr id="2" name="Title 1">
+          <p:cNvPr id="17" name="Rectangle 16">
             <a:extLst>
               <a:ext uri="{FF2B5EF4-FFF2-40B4-BE49-F238E27FC236}">
-                <a16:creationId xmlns:a16="http://schemas.microsoft.com/office/drawing/2014/main" id="{5F09CC06-29E7-5C41-BB00-CBE844139868}"/>
+                <a16:creationId xmlns:a16="http://schemas.microsoft.com/office/drawing/2014/main" id="{25F64367-9171-455F-9283-AC21BC55AE65}"/>
+              </a:ext>
+              <a:ext uri="{C183D7F6-B498-43B3-948B-1728B52AA6E4}">
+                <adec:decorative xmlns:adec="http://schemas.microsoft.com/office/drawing/2017/decorative" val="1"/>
               </a:ext>
             </a:extLst>
           </p:cNvPr>
           <p:cNvSpPr>
+            <a:spLocks noGrp="1" noRot="1" noChangeAspect="1" noMove="1" noResize="1" noEditPoints="1" noAdjustHandles="1" noChangeArrowheads="1" noChangeShapeType="1" noTextEdit="1"/>
+          </p:cNvSpPr>
+          <p:nvPr>
+            <p:extLst>
+              <p:ext uri="{386F3935-93C4-4BCD-93E2-E3B085C9AB24}">
+                <p16:designElem xmlns:p16="http://schemas.microsoft.com/office/powerpoint/2015/main" val="1"/>
+              </p:ext>
+            </p:extLst>
+          </p:nvPr>
+        </p:nvSpPr>
+        <p:spPr>
+          <a:xfrm>
+            <a:off x="0" y="0"/>
+            <a:ext cx="12192000" cy="6858000"/>
+          </a:xfrm>
+          <a:prstGeom prst="rect">
+            <a:avLst/>
+          </a:prstGeom>
+          <a:solidFill>
+            <a:schemeClr val="bg1">
+              <a:lumMod val="95000"/>
+            </a:schemeClr>
+          </a:solidFill>
+          <a:ln>
+            <a:noFill/>
+          </a:ln>
+        </p:spPr>
+        <p:style>
+          <a:lnRef idx="2">
+            <a:schemeClr val="accent1">
+              <a:shade val="50000"/>
+            </a:schemeClr>
+          </a:lnRef>
+          <a:fillRef idx="1">
+            <a:schemeClr val="accent1"/>
+          </a:fillRef>
+          <a:effectRef idx="0">
+            <a:schemeClr val="accent1"/>
+          </a:effectRef>
+          <a:fontRef idx="minor">
+            <a:schemeClr val="lt1"/>
+          </a:fontRef>
+        </p:style>
+        <p:txBody>
+          <a:bodyPr rtlCol="0" anchor="ctr"/>
+          <a:lstStyle/>
+          <a:p>
+            <a:pPr algn="ctr"/>
+            <a:endParaRPr lang="en-US"/>
+          </a:p>
+        </p:txBody>
+      </p:sp>
+      <p:sp useBgFill="1">
+        <p:nvSpPr>
+          <p:cNvPr id="19" name="Rectangle 18">
+            <a:extLst>
+              <a:ext uri="{FF2B5EF4-FFF2-40B4-BE49-F238E27FC236}">
+                <a16:creationId xmlns:a16="http://schemas.microsoft.com/office/drawing/2014/main" id="{EC603A95-5798-4F9F-80E4-CF53F302AA42}"/>
+              </a:ext>
+              <a:ext uri="{C183D7F6-B498-43B3-948B-1728B52AA6E4}">
+                <adec:decorative xmlns:adec="http://schemas.microsoft.com/office/drawing/2017/decorative" val="1"/>
+              </a:ext>
+            </a:extLst>
+          </p:cNvPr>
+          <p:cNvSpPr>
+            <a:spLocks noGrp="1" noRot="1" noChangeAspect="1" noMove="1" noResize="1" noEditPoints="1" noAdjustHandles="1" noChangeArrowheads="1" noChangeShapeType="1" noTextEdit="1"/>
+          </p:cNvSpPr>
+          <p:nvPr>
+            <p:extLst>
+              <p:ext uri="{386F3935-93C4-4BCD-93E2-E3B085C9AB24}">
+                <p16:designElem xmlns:p16="http://schemas.microsoft.com/office/powerpoint/2015/main" val="1"/>
+              </p:ext>
+            </p:extLst>
+          </p:nvPr>
+        </p:nvSpPr>
+        <p:spPr>
+          <a:xfrm>
+            <a:off x="1129877" y="1121561"/>
+            <a:ext cx="9930384" cy="4608576"/>
+          </a:xfrm>
+          <a:prstGeom prst="rect">
+            <a:avLst/>
+          </a:prstGeom>
+          <a:ln>
+            <a:noFill/>
+          </a:ln>
+        </p:spPr>
+        <p:style>
+          <a:lnRef idx="2">
+            <a:schemeClr val="accent1">
+              <a:shade val="50000"/>
+            </a:schemeClr>
+          </a:lnRef>
+          <a:fillRef idx="1">
+            <a:schemeClr val="accent1"/>
+          </a:fillRef>
+          <a:effectRef idx="0">
+            <a:schemeClr val="accent1"/>
+          </a:effectRef>
+          <a:fontRef idx="minor">
+            <a:schemeClr val="lt1"/>
+          </a:fontRef>
+        </p:style>
+        <p:txBody>
+          <a:bodyPr rtlCol="0" anchor="ctr"/>
+          <a:lstStyle/>
+          <a:p>
+            <a:pPr algn="ctr"/>
+            <a:endParaRPr lang="en-US"/>
+          </a:p>
+        </p:txBody>
+      </p:sp>
+      <p:sp>
+        <p:nvSpPr>
+          <p:cNvPr id="10" name="Title 9">
+            <a:extLst>
+              <a:ext uri="{FF2B5EF4-FFF2-40B4-BE49-F238E27FC236}">
+                <a16:creationId xmlns:a16="http://schemas.microsoft.com/office/drawing/2014/main" id="{2D0E6BFD-B4BB-6B41-9B2B-AF589B9901CD}"/>
+              </a:ext>
+            </a:extLst>
+          </p:cNvPr>
+          <p:cNvSpPr>
             <a:spLocks noGrp="1"/>
           </p:cNvSpPr>
           <p:nvPr>
             <p:ph type="title"/>
           </p:nvPr>
         </p:nvSpPr>
-        <p:spPr/>
+        <p:spPr>
+          <a:xfrm>
+            <a:off x="1792287" y="1327499"/>
+            <a:ext cx="8624887" cy="927328"/>
+          </a:xfrm>
+          <a:noFill/>
+          <a:ln>
+            <a:noFill/>
+          </a:ln>
+        </p:spPr>
         <p:txBody>
           <a:bodyPr>
             <a:normAutofit fontScale="90000"/>
@@ -3694,45 +4268,817 @@
           <a:lstStyle/>
           <a:p>
             <a:r>
-              <a:rPr lang="en-GB" sz="2200" dirty="0"/>
-              <a:t>2. State the ideal data to address the business opportunity and clarify the rationale for needing specific data.</a:t>
+              <a:rPr lang="en-GB" dirty="0"/>
+              <a:t>1. articulate testable hypotheses.</a:t>
             </a:r>
             <a:br>
               <a:rPr lang="en-GB" dirty="0"/>
             </a:br>
-            <a:endParaRPr lang="en-US" dirty="0"/>
-          </a:p>
-        </p:txBody>
-      </p:sp>
-      <p:sp>
-        <p:nvSpPr>
-          <p:cNvPr id="3" name="Content Placeholder 2">
+            <a:r>
+              <a:rPr lang="en-GB" dirty="0"/>
+              <a:t>2. State the ideal data to address the business opportunity and clarify the rationale for needing specific data.</a:t>
+            </a:r>
+            <a:endParaRPr lang="en-US" dirty="0">
+              <a:solidFill>
+                <a:schemeClr val="tx1">
+                  <a:lumMod val="75000"/>
+                  <a:lumOff val="25000"/>
+                </a:schemeClr>
+              </a:solidFill>
+            </a:endParaRPr>
+          </a:p>
+        </p:txBody>
+      </p:sp>
+      <p:sp>
+        <p:nvSpPr>
+          <p:cNvPr id="21" name="Rectangle 20">
             <a:extLst>
               <a:ext uri="{FF2B5EF4-FFF2-40B4-BE49-F238E27FC236}">
-                <a16:creationId xmlns:a16="http://schemas.microsoft.com/office/drawing/2014/main" id="{4FE7BEA3-B7AB-1143-B2DE-4C09B8E63AFB}"/>
+                <a16:creationId xmlns:a16="http://schemas.microsoft.com/office/drawing/2014/main" id="{884F012D-6CD6-46AF-A834-6B0CA93008D6}"/>
+              </a:ext>
+              <a:ext uri="{C183D7F6-B498-43B3-948B-1728B52AA6E4}">
+                <adec:decorative xmlns:adec="http://schemas.microsoft.com/office/drawing/2017/decorative" val="1"/>
               </a:ext>
             </a:extLst>
           </p:cNvPr>
           <p:cNvSpPr>
-            <a:spLocks noGrp="1"/>
-          </p:cNvSpPr>
+            <a:spLocks noGrp="1" noRot="1" noChangeAspect="1" noMove="1" noResize="1" noEditPoints="1" noAdjustHandles="1" noChangeArrowheads="1" noChangeShapeType="1" noTextEdit="1"/>
+          </p:cNvSpPr>
+          <p:nvPr>
+            <p:extLst>
+              <p:ext uri="{386F3935-93C4-4BCD-93E2-E3B085C9AB24}">
+                <p16:designElem xmlns:p16="http://schemas.microsoft.com/office/powerpoint/2015/main" val="1"/>
+              </p:ext>
+            </p:extLst>
+          </p:nvPr>
+        </p:nvSpPr>
+        <p:spPr>
+          <a:xfrm>
+            <a:off x="965200" y="958898"/>
+            <a:ext cx="10259738" cy="4933902"/>
+          </a:xfrm>
+          <a:prstGeom prst="rect">
+            <a:avLst/>
+          </a:prstGeom>
+          <a:noFill/>
+          <a:ln w="31750" cap="sq">
+            <a:solidFill>
+              <a:srgbClr val="FFFFFF"/>
+            </a:solidFill>
+            <a:miter lim="800000"/>
+          </a:ln>
+        </p:spPr>
+        <p:style>
+          <a:lnRef idx="2">
+            <a:schemeClr val="accent1">
+              <a:shade val="50000"/>
+            </a:schemeClr>
+          </a:lnRef>
+          <a:fillRef idx="1">
+            <a:schemeClr val="accent1"/>
+          </a:fillRef>
+          <a:effectRef idx="0">
+            <a:schemeClr val="accent1"/>
+          </a:effectRef>
+          <a:fontRef idx="minor">
+            <a:schemeClr val="lt1"/>
+          </a:fontRef>
+        </p:style>
+        <p:txBody>
+          <a:bodyPr rtlCol="0" anchor="ctr"/>
+          <a:lstStyle/>
+          <a:p>
+            <a:pPr algn="ctr"/>
+            <a:endParaRPr lang="en-US" dirty="0"/>
+          </a:p>
+        </p:txBody>
+      </p:sp>
+      <p:graphicFrame>
+        <p:nvGraphicFramePr>
+          <p:cNvPr id="14" name="Content Placeholder 3">
+            <a:extLst>
+              <a:ext uri="{FF2B5EF4-FFF2-40B4-BE49-F238E27FC236}">
+                <a16:creationId xmlns:a16="http://schemas.microsoft.com/office/drawing/2014/main" id="{90DAD4B4-5008-C541-9F17-61DB6105D67A}"/>
+              </a:ext>
+            </a:extLst>
+          </p:cNvPr>
+          <p:cNvGraphicFramePr>
+            <a:graphicFrameLocks noGrp="1"/>
+          </p:cNvGraphicFramePr>
           <p:nvPr>
             <p:ph idx="1"/>
-          </p:nvPr>
-        </p:nvSpPr>
-        <p:spPr/>
-        <p:txBody>
-          <a:bodyPr/>
-          <a:lstStyle/>
-          <a:p>
-            <a:endParaRPr lang="en-US"/>
-          </a:p>
-        </p:txBody>
-      </p:sp>
+            <p:extLst>
+              <p:ext uri="{D42A27DB-BD31-4B8C-83A1-F6EECF244321}">
+                <p14:modId xmlns:p14="http://schemas.microsoft.com/office/powerpoint/2010/main" val="3070765457"/>
+              </p:ext>
+            </p:extLst>
+          </p:nvPr>
+        </p:nvGraphicFramePr>
+        <p:xfrm>
+          <a:off x="1225551" y="2605766"/>
+          <a:ext cx="9501188" cy="3261036"/>
+        </p:xfrm>
+        <a:graphic>
+          <a:graphicData uri="http://schemas.openxmlformats.org/drawingml/2006/table">
+            <a:tbl>
+              <a:tblPr firstRow="1" firstCol="1" bandRow="1">
+                <a:tableStyleId>{E929F9F4-4A8F-4326-A1B4-22849713DDAB}</a:tableStyleId>
+              </a:tblPr>
+              <a:tblGrid>
+                <a:gridCol w="1865608">
+                  <a:extLst>
+                    <a:ext uri="{9D8B030D-6E8A-4147-A177-3AD203B41FA5}">
+                      <a16:colId xmlns:a16="http://schemas.microsoft.com/office/drawing/2014/main" val="1122335417"/>
+                    </a:ext>
+                  </a:extLst>
+                </a:gridCol>
+                <a:gridCol w="1851392">
+                  <a:extLst>
+                    <a:ext uri="{9D8B030D-6E8A-4147-A177-3AD203B41FA5}">
+                      <a16:colId xmlns:a16="http://schemas.microsoft.com/office/drawing/2014/main" val="3344235593"/>
+                    </a:ext>
+                  </a:extLst>
+                </a:gridCol>
+                <a:gridCol w="2813946">
+                  <a:extLst>
+                    <a:ext uri="{9D8B030D-6E8A-4147-A177-3AD203B41FA5}">
+                      <a16:colId xmlns:a16="http://schemas.microsoft.com/office/drawing/2014/main" val="1332358591"/>
+                    </a:ext>
+                  </a:extLst>
+                </a:gridCol>
+                <a:gridCol w="2970242">
+                  <a:extLst>
+                    <a:ext uri="{9D8B030D-6E8A-4147-A177-3AD203B41FA5}">
+                      <a16:colId xmlns:a16="http://schemas.microsoft.com/office/drawing/2014/main" val="572803438"/>
+                    </a:ext>
+                  </a:extLst>
+                </a:gridCol>
+              </a:tblGrid>
+              <a:tr h="125890">
+                <a:tc>
+                  <a:txBody>
+                    <a:bodyPr/>
+                    <a:lstStyle/>
+                    <a:p>
+                      <a:r>
+                        <a:rPr lang="en-GB" sz="700">
+                          <a:effectLst/>
+                        </a:rPr>
+                        <a:t>Business Question</a:t>
+                      </a:r>
+                      <a:endParaRPr lang="en-GB" sz="700">
+                        <a:effectLst/>
+                        <a:latin typeface="Calibri" panose="020F0502020204030204" pitchFamily="34" charset="0"/>
+                        <a:ea typeface="Calibri" panose="020F0502020204030204" pitchFamily="34" charset="0"/>
+                        <a:cs typeface="Times New Roman" panose="02020603050405020304" pitchFamily="18" charset="0"/>
+                      </a:endParaRPr>
+                    </a:p>
+                  </a:txBody>
+                  <a:tcPr marL="36718" marR="36718" marT="0" marB="0"/>
+                </a:tc>
+                <a:tc>
+                  <a:txBody>
+                    <a:bodyPr/>
+                    <a:lstStyle/>
+                    <a:p>
+                      <a:r>
+                        <a:rPr lang="en-GB" sz="700">
+                          <a:effectLst/>
+                        </a:rPr>
+                        <a:t>Hypothesis</a:t>
+                      </a:r>
+                      <a:endParaRPr lang="en-GB" sz="700">
+                        <a:effectLst/>
+                        <a:latin typeface="Calibri" panose="020F0502020204030204" pitchFamily="34" charset="0"/>
+                        <a:ea typeface="Calibri" panose="020F0502020204030204" pitchFamily="34" charset="0"/>
+                        <a:cs typeface="Times New Roman" panose="02020603050405020304" pitchFamily="18" charset="0"/>
+                      </a:endParaRPr>
+                    </a:p>
+                  </a:txBody>
+                  <a:tcPr marL="36718" marR="36718" marT="0" marB="0"/>
+                </a:tc>
+                <a:tc>
+                  <a:txBody>
+                    <a:bodyPr/>
+                    <a:lstStyle/>
+                    <a:p>
+                      <a:r>
+                        <a:rPr lang="en-GB" sz="700">
+                          <a:effectLst/>
+                        </a:rPr>
+                        <a:t>Ideal Data needed</a:t>
+                      </a:r>
+                      <a:endParaRPr lang="en-GB" sz="700">
+                        <a:effectLst/>
+                        <a:latin typeface="Calibri" panose="020F0502020204030204" pitchFamily="34" charset="0"/>
+                        <a:ea typeface="Calibri" panose="020F0502020204030204" pitchFamily="34" charset="0"/>
+                        <a:cs typeface="Times New Roman" panose="02020603050405020304" pitchFamily="18" charset="0"/>
+                      </a:endParaRPr>
+                    </a:p>
+                  </a:txBody>
+                  <a:tcPr marL="36718" marR="36718" marT="0" marB="0"/>
+                </a:tc>
+                <a:tc>
+                  <a:txBody>
+                    <a:bodyPr/>
+                    <a:lstStyle/>
+                    <a:p>
+                      <a:r>
+                        <a:rPr lang="en-GB" sz="700">
+                          <a:effectLst/>
+                        </a:rPr>
+                        <a:t>Data Descriptions</a:t>
+                      </a:r>
+                      <a:endParaRPr lang="en-GB" sz="700">
+                        <a:effectLst/>
+                        <a:latin typeface="Calibri" panose="020F0502020204030204" pitchFamily="34" charset="0"/>
+                        <a:ea typeface="Calibri" panose="020F0502020204030204" pitchFamily="34" charset="0"/>
+                        <a:cs typeface="Times New Roman" panose="02020603050405020304" pitchFamily="18" charset="0"/>
+                      </a:endParaRPr>
+                    </a:p>
+                  </a:txBody>
+                  <a:tcPr marL="36718" marR="36718" marT="0" marB="0"/>
+                </a:tc>
+                <a:extLst>
+                  <a:ext uri="{0D108BD9-81ED-4DB2-BD59-A6C34878D82A}">
+                    <a16:rowId xmlns:a16="http://schemas.microsoft.com/office/drawing/2014/main" val="2900595349"/>
+                  </a:ext>
+                </a:extLst>
+              </a:tr>
+              <a:tr h="1567573">
+                <a:tc>
+                  <a:txBody>
+                    <a:bodyPr/>
+                    <a:lstStyle/>
+                    <a:p>
+                      <a:r>
+                        <a:rPr lang="en-GB" sz="600" b="0">
+                          <a:effectLst/>
+                        </a:rPr>
+                        <a:t>Does use of the new model save </a:t>
+                      </a:r>
+                      <a:r>
+                        <a:rPr lang="en-GB" sz="600" b="0" err="1">
+                          <a:effectLst/>
+                        </a:rPr>
+                        <a:t>AAVAiL</a:t>
+                      </a:r>
+                      <a:r>
+                        <a:rPr lang="en-GB" sz="600" b="0">
+                          <a:effectLst/>
+                        </a:rPr>
+                        <a:t> Product Managers time when projecting future revenue?</a:t>
+                      </a:r>
+                      <a:endParaRPr lang="en-GB" sz="600" b="0">
+                        <a:effectLst/>
+                        <a:latin typeface="Calibri" panose="020F0502020204030204" pitchFamily="34" charset="0"/>
+                        <a:ea typeface="Calibri" panose="020F0502020204030204" pitchFamily="34" charset="0"/>
+                        <a:cs typeface="Times New Roman" panose="02020603050405020304" pitchFamily="18" charset="0"/>
+                      </a:endParaRPr>
+                    </a:p>
+                  </a:txBody>
+                  <a:tcPr marL="36718" marR="36718" marT="0" marB="0"/>
+                </a:tc>
+                <a:tc>
+                  <a:txBody>
+                    <a:bodyPr/>
+                    <a:lstStyle/>
+                    <a:p>
+                      <a:r>
+                        <a:rPr lang="en-GB" sz="600" b="0">
+                          <a:effectLst/>
+                        </a:rPr>
+                        <a:t>Use of the new model to generate a revenue projections is faster than use of the existing revenue projections process</a:t>
+                      </a:r>
+                      <a:endParaRPr lang="en-GB" sz="600" b="0">
+                        <a:effectLst/>
+                        <a:latin typeface="Calibri" panose="020F0502020204030204" pitchFamily="34" charset="0"/>
+                        <a:ea typeface="Calibri" panose="020F0502020204030204" pitchFamily="34" charset="0"/>
+                        <a:cs typeface="Times New Roman" panose="02020603050405020304" pitchFamily="18" charset="0"/>
+                      </a:endParaRPr>
+                    </a:p>
+                  </a:txBody>
+                  <a:tcPr marL="36718" marR="36718" marT="0" marB="0"/>
+                </a:tc>
+                <a:tc>
+                  <a:txBody>
+                    <a:bodyPr/>
+                    <a:lstStyle/>
+                    <a:p>
+                      <a:r>
+                        <a:rPr lang="en-GB" sz="600" b="0" dirty="0">
+                          <a:effectLst/>
+                        </a:rPr>
+                        <a:t>2 tables containing the below rows and columns, for pre- new model (existing process) and post-new model</a:t>
+                      </a:r>
+                    </a:p>
+                    <a:p>
+                      <a:endParaRPr lang="en-GB" sz="600" b="0" dirty="0">
+                        <a:effectLst/>
+                      </a:endParaRPr>
+                    </a:p>
+                    <a:p>
+                      <a:r>
+                        <a:rPr lang="en-GB" sz="600" b="0" dirty="0">
+                          <a:effectLst/>
+                        </a:rPr>
+                        <a:t>Rows:</a:t>
+                      </a:r>
+                    </a:p>
+                    <a:p>
+                      <a:r>
+                        <a:rPr lang="en-GB" sz="600" b="0" dirty="0">
+                          <a:effectLst/>
+                        </a:rPr>
+                        <a:t>A single revenue projection made by an </a:t>
+                      </a:r>
+                      <a:r>
+                        <a:rPr lang="en-GB" sz="600" b="0" dirty="0" err="1">
+                          <a:effectLst/>
+                        </a:rPr>
+                        <a:t>AAVAiL</a:t>
+                      </a:r>
+                      <a:r>
+                        <a:rPr lang="en-GB" sz="600" b="0" dirty="0">
+                          <a:effectLst/>
+                        </a:rPr>
+                        <a:t> Product Manager</a:t>
+                      </a:r>
+                    </a:p>
+                    <a:p>
+                      <a:endParaRPr lang="en-GB" sz="600" b="0" dirty="0">
+                        <a:effectLst/>
+                      </a:endParaRPr>
+                    </a:p>
+                    <a:p>
+                      <a:r>
+                        <a:rPr lang="en-GB" sz="600" b="0" dirty="0">
+                          <a:effectLst/>
+                        </a:rPr>
+                        <a:t>Columns:</a:t>
+                      </a:r>
+                    </a:p>
+                    <a:p>
+                      <a:r>
+                        <a:rPr lang="en-GB" sz="600" b="0" dirty="0">
+                          <a:effectLst/>
+                        </a:rPr>
+                        <a:t>Projection id</a:t>
+                      </a:r>
+                    </a:p>
+                    <a:p>
+                      <a:r>
+                        <a:rPr lang="en-GB" sz="600" b="0" dirty="0">
+                          <a:effectLst/>
+                        </a:rPr>
+                        <a:t>Date/Time of projection</a:t>
+                      </a:r>
+                    </a:p>
+                    <a:p>
+                      <a:r>
+                        <a:rPr lang="en-GB" sz="600" b="0" dirty="0">
+                          <a:effectLst/>
+                        </a:rPr>
+                        <a:t>Product Manager ID/Name</a:t>
+                      </a:r>
+                    </a:p>
+                    <a:p>
+                      <a:r>
+                        <a:rPr lang="en-GB" sz="600" b="0" dirty="0">
+                          <a:effectLst/>
+                        </a:rPr>
+                        <a:t>Month of projection</a:t>
+                      </a:r>
+                    </a:p>
+                    <a:p>
+                      <a:r>
+                        <a:rPr lang="en-GB" sz="600" b="0" dirty="0">
+                          <a:effectLst/>
+                        </a:rPr>
+                        <a:t>Country of projection</a:t>
+                      </a:r>
+                    </a:p>
+                    <a:p>
+                      <a:r>
+                        <a:rPr lang="en-GB" sz="600" b="0" dirty="0">
+                          <a:effectLst/>
+                        </a:rPr>
+                        <a:t>Model version</a:t>
+                      </a:r>
+                    </a:p>
+                    <a:p>
+                      <a:r>
+                        <a:rPr lang="en-GB" sz="600" b="0" dirty="0">
+                          <a:effectLst/>
+                        </a:rPr>
+                        <a:t>Model output/revenue projection(s)</a:t>
+                      </a:r>
+                    </a:p>
+                    <a:p>
+                      <a:r>
+                        <a:rPr lang="en-GB" sz="600" b="0" dirty="0">
+                          <a:effectLst/>
+                        </a:rPr>
+                        <a:t>Time to execute projection</a:t>
+                      </a:r>
+                    </a:p>
+                  </a:txBody>
+                  <a:tcPr marL="36718" marR="36718" marT="0" marB="0"/>
+                </a:tc>
+                <a:tc>
+                  <a:txBody>
+                    <a:bodyPr/>
+                    <a:lstStyle/>
+                    <a:p>
+                      <a:r>
+                        <a:rPr lang="en-GB" sz="600" b="0" dirty="0">
+                          <a:effectLst/>
+                        </a:rPr>
+                        <a:t> Projection id – uniquely identifies a projection</a:t>
+                      </a:r>
+                    </a:p>
+                    <a:p>
+                      <a:pPr marL="0" marR="0" lvl="0" indent="0" algn="l" defTabSz="914400" rtl="0" eaLnBrk="1" fontAlgn="auto" latinLnBrk="0" hangingPunct="1">
+                        <a:lnSpc>
+                          <a:spcPct val="100000"/>
+                        </a:lnSpc>
+                        <a:spcBef>
+                          <a:spcPts val="0"/>
+                        </a:spcBef>
+                        <a:spcAft>
+                          <a:spcPts val="0"/>
+                        </a:spcAft>
+                        <a:buClrTx/>
+                        <a:buSzTx/>
+                        <a:buFontTx/>
+                        <a:buNone/>
+                        <a:tabLst/>
+                        <a:defRPr/>
+                      </a:pPr>
+                      <a:r>
+                        <a:rPr lang="en-GB" sz="600" b="0" dirty="0">
+                          <a:effectLst/>
+                        </a:rPr>
+                        <a:t>Date/Time of projection – when the projection was executed</a:t>
+                      </a:r>
+                    </a:p>
+                    <a:p>
+                      <a:pPr marL="0" marR="0" lvl="0" indent="0" algn="l" defTabSz="914400" rtl="0" eaLnBrk="1" fontAlgn="auto" latinLnBrk="0" hangingPunct="1">
+                        <a:lnSpc>
+                          <a:spcPct val="100000"/>
+                        </a:lnSpc>
+                        <a:spcBef>
+                          <a:spcPts val="0"/>
+                        </a:spcBef>
+                        <a:spcAft>
+                          <a:spcPts val="0"/>
+                        </a:spcAft>
+                        <a:buClrTx/>
+                        <a:buSzTx/>
+                        <a:buFontTx/>
+                        <a:buNone/>
+                        <a:tabLst/>
+                        <a:defRPr/>
+                      </a:pPr>
+                      <a:r>
+                        <a:rPr lang="en-GB" sz="600" b="0" dirty="0">
+                          <a:effectLst/>
+                        </a:rPr>
+                        <a:t>Product Manager ID/Name – uniquely identifies a user</a:t>
+                      </a:r>
+                    </a:p>
+                    <a:p>
+                      <a:pPr marL="0" marR="0" lvl="0" indent="0" algn="l" defTabSz="914400" rtl="0" eaLnBrk="1" fontAlgn="auto" latinLnBrk="0" hangingPunct="1">
+                        <a:lnSpc>
+                          <a:spcPct val="100000"/>
+                        </a:lnSpc>
+                        <a:spcBef>
+                          <a:spcPts val="0"/>
+                        </a:spcBef>
+                        <a:spcAft>
+                          <a:spcPts val="0"/>
+                        </a:spcAft>
+                        <a:buClrTx/>
+                        <a:buSzTx/>
+                        <a:buFontTx/>
+                        <a:buNone/>
+                        <a:tabLst/>
+                        <a:defRPr/>
+                      </a:pPr>
+                      <a:r>
+                        <a:rPr lang="en-GB" sz="600" b="0" dirty="0">
+                          <a:effectLst/>
+                        </a:rPr>
+                        <a:t>Month of projection - month which the projection is for</a:t>
+                      </a:r>
+                    </a:p>
+                    <a:p>
+                      <a:r>
+                        <a:rPr lang="en-GB" sz="600" b="0" dirty="0">
+                          <a:effectLst/>
+                        </a:rPr>
+                        <a:t>Country of projection – country which the projection is for</a:t>
+                      </a:r>
+                    </a:p>
+                    <a:p>
+                      <a:r>
+                        <a:rPr lang="en-GB" sz="600" b="0" dirty="0">
+                          <a:effectLst/>
+                        </a:rPr>
+                        <a:t>Model version – version of model for which the projections was derived from</a:t>
+                      </a:r>
+                    </a:p>
+                    <a:p>
+                      <a:r>
+                        <a:rPr lang="en-GB" sz="600" b="0" dirty="0">
+                          <a:effectLst/>
+                        </a:rPr>
+                        <a:t>Model output/revenue projection(s) -  output of the model</a:t>
+                      </a:r>
+                    </a:p>
+                    <a:p>
+                      <a:r>
+                        <a:rPr lang="en-GB" sz="600" b="0" dirty="0">
+                          <a:effectLst/>
+                        </a:rPr>
+                        <a:t>Time to execute projection – How long it took the user to execute the projection</a:t>
+                      </a:r>
+                      <a:endParaRPr lang="en-GB" sz="600" b="0" dirty="0">
+                        <a:effectLst/>
+                        <a:latin typeface="Calibri" panose="020F0502020204030204" pitchFamily="34" charset="0"/>
+                        <a:ea typeface="Calibri" panose="020F0502020204030204" pitchFamily="34" charset="0"/>
+                        <a:cs typeface="Times New Roman" panose="02020603050405020304" pitchFamily="18" charset="0"/>
+                      </a:endParaRPr>
+                    </a:p>
+                  </a:txBody>
+                  <a:tcPr marL="36718" marR="36718" marT="0" marB="0"/>
+                </a:tc>
+                <a:extLst>
+                  <a:ext uri="{0D108BD9-81ED-4DB2-BD59-A6C34878D82A}">
+                    <a16:rowId xmlns:a16="http://schemas.microsoft.com/office/drawing/2014/main" val="579729182"/>
+                  </a:ext>
+                </a:extLst>
+              </a:tr>
+              <a:tr h="1567573">
+                <a:tc>
+                  <a:txBody>
+                    <a:bodyPr/>
+                    <a:lstStyle/>
+                    <a:p>
+                      <a:r>
+                        <a:rPr lang="en-GB" sz="600" b="0">
+                          <a:effectLst/>
+                        </a:rPr>
+                        <a:t>Does the new model enable </a:t>
+                      </a:r>
+                      <a:r>
+                        <a:rPr lang="en-GB" sz="600" b="0" err="1">
+                          <a:effectLst/>
+                        </a:rPr>
+                        <a:t>AAVAiL</a:t>
+                      </a:r>
+                      <a:r>
+                        <a:rPr lang="en-GB" sz="600" b="0">
+                          <a:effectLst/>
+                        </a:rPr>
+                        <a:t> Product Managers to more accurately project revenue?</a:t>
+                      </a:r>
+                      <a:endParaRPr lang="en-GB" sz="600" b="0">
+                        <a:effectLst/>
+                        <a:latin typeface="Calibri" panose="020F0502020204030204" pitchFamily="34" charset="0"/>
+                        <a:ea typeface="Calibri" panose="020F0502020204030204" pitchFamily="34" charset="0"/>
+                        <a:cs typeface="Times New Roman" panose="02020603050405020304" pitchFamily="18" charset="0"/>
+                      </a:endParaRPr>
+                    </a:p>
+                  </a:txBody>
+                  <a:tcPr marL="36718" marR="36718" marT="0" marB="0"/>
+                </a:tc>
+                <a:tc>
+                  <a:txBody>
+                    <a:bodyPr/>
+                    <a:lstStyle/>
+                    <a:p>
+                      <a:r>
+                        <a:rPr lang="en-GB" sz="600" b="0">
+                          <a:effectLst/>
+                        </a:rPr>
+                        <a:t>The new model projects more accurate revenue predictions than the predictions of the existing revenue projections process</a:t>
+                      </a:r>
+                      <a:endParaRPr lang="en-GB" sz="600" b="0">
+                        <a:effectLst/>
+                        <a:latin typeface="Calibri" panose="020F0502020204030204" pitchFamily="34" charset="0"/>
+                        <a:ea typeface="Calibri" panose="020F0502020204030204" pitchFamily="34" charset="0"/>
+                        <a:cs typeface="Times New Roman" panose="02020603050405020304" pitchFamily="18" charset="0"/>
+                      </a:endParaRPr>
+                    </a:p>
+                  </a:txBody>
+                  <a:tcPr marL="36718" marR="36718" marT="0" marB="0"/>
+                </a:tc>
+                <a:tc>
+                  <a:txBody>
+                    <a:bodyPr/>
+                    <a:lstStyle/>
+                    <a:p>
+                      <a:r>
+                        <a:rPr lang="en-GB" sz="600" b="0">
+                          <a:effectLst/>
+                        </a:rPr>
+                        <a:t>2 tables containing the below rows and columns, for pre- new model (existing process) and post-new model</a:t>
+                      </a:r>
+                    </a:p>
+                    <a:p>
+                      <a:endParaRPr lang="en-GB" sz="600" b="0">
+                        <a:effectLst/>
+                      </a:endParaRPr>
+                    </a:p>
+                    <a:p>
+                      <a:r>
+                        <a:rPr lang="en-GB" sz="600" b="0">
+                          <a:effectLst/>
+                        </a:rPr>
+                        <a:t>Rows:</a:t>
+                      </a:r>
+                    </a:p>
+                    <a:p>
+                      <a:r>
+                        <a:rPr lang="en-GB" sz="600" b="0">
+                          <a:effectLst/>
+                        </a:rPr>
+                        <a:t>A single revenue projection made by an </a:t>
+                      </a:r>
+                      <a:r>
+                        <a:rPr lang="en-GB" sz="600" b="0" err="1">
+                          <a:effectLst/>
+                        </a:rPr>
+                        <a:t>AAVAiL</a:t>
+                      </a:r>
+                      <a:r>
+                        <a:rPr lang="en-GB" sz="600" b="0">
+                          <a:effectLst/>
+                        </a:rPr>
+                        <a:t> Product Manager</a:t>
+                      </a:r>
+                    </a:p>
+                    <a:p>
+                      <a:endParaRPr lang="en-GB" sz="600" b="0">
+                        <a:effectLst/>
+                      </a:endParaRPr>
+                    </a:p>
+                    <a:p>
+                      <a:r>
+                        <a:rPr lang="en-GB" sz="600" b="0">
+                          <a:effectLst/>
+                        </a:rPr>
+                        <a:t>Columns:</a:t>
+                      </a:r>
+                    </a:p>
+                    <a:p>
+                      <a:r>
+                        <a:rPr lang="en-GB" sz="600" b="0">
+                          <a:effectLst/>
+                        </a:rPr>
+                        <a:t>Projection id</a:t>
+                      </a:r>
+                    </a:p>
+                    <a:p>
+                      <a:r>
+                        <a:rPr lang="en-GB" sz="600" b="0">
+                          <a:effectLst/>
+                        </a:rPr>
+                        <a:t>Date/time of projection</a:t>
+                      </a:r>
+                    </a:p>
+                    <a:p>
+                      <a:r>
+                        <a:rPr lang="en-GB" sz="600" b="0">
+                          <a:effectLst/>
+                        </a:rPr>
+                        <a:t>Product Manager ID/Name</a:t>
+                      </a:r>
+                    </a:p>
+                    <a:p>
+                      <a:r>
+                        <a:rPr lang="en-GB" sz="600" b="0">
+                          <a:effectLst/>
+                        </a:rPr>
+                        <a:t>Month which the projection is for</a:t>
+                      </a:r>
+                    </a:p>
+                    <a:p>
+                      <a:r>
+                        <a:rPr lang="en-GB" sz="600" b="0">
+                          <a:effectLst/>
+                        </a:rPr>
+                        <a:t>Country for which the projection is for</a:t>
+                      </a:r>
+                    </a:p>
+                    <a:p>
+                      <a:r>
+                        <a:rPr lang="en-GB" sz="600" b="0">
+                          <a:effectLst/>
+                        </a:rPr>
+                        <a:t>Model version</a:t>
+                      </a:r>
+                    </a:p>
+                    <a:p>
+                      <a:r>
+                        <a:rPr lang="en-GB" sz="600" b="0">
+                          <a:effectLst/>
+                        </a:rPr>
+                        <a:t>Model output/revenue projection(s)</a:t>
+                      </a:r>
+                    </a:p>
+                    <a:p>
+                      <a:r>
+                        <a:rPr lang="en-GB" sz="600" b="0">
+                          <a:effectLst/>
+                        </a:rPr>
+                        <a:t>Actual revenue</a:t>
+                      </a:r>
+                    </a:p>
+                    <a:p>
+                      <a:endParaRPr lang="en-GB" sz="600" b="0">
+                        <a:effectLst/>
+                        <a:latin typeface="Calibri" panose="020F0502020204030204" pitchFamily="34" charset="0"/>
+                        <a:ea typeface="Calibri" panose="020F0502020204030204" pitchFamily="34" charset="0"/>
+                        <a:cs typeface="Times New Roman" panose="02020603050405020304" pitchFamily="18" charset="0"/>
+                      </a:endParaRPr>
+                    </a:p>
+                  </a:txBody>
+                  <a:tcPr marL="36718" marR="36718" marT="0" marB="0"/>
+                </a:tc>
+                <a:tc>
+                  <a:txBody>
+                    <a:bodyPr/>
+                    <a:lstStyle/>
+                    <a:p>
+                      <a:r>
+                        <a:rPr lang="en-GB" sz="600" b="0" dirty="0">
+                          <a:effectLst/>
+                        </a:rPr>
+                        <a:t>See above row for existing descriptions</a:t>
+                      </a:r>
+                    </a:p>
+                    <a:p>
+                      <a:endParaRPr lang="en-GB" sz="600" b="0" dirty="0">
+                        <a:effectLst/>
+                      </a:endParaRPr>
+                    </a:p>
+                    <a:p>
+                      <a:endParaRPr lang="en-GB" sz="600" b="0" dirty="0">
+                        <a:effectLst/>
+                      </a:endParaRPr>
+                    </a:p>
+                    <a:p>
+                      <a:pPr marL="0" marR="0" lvl="0" indent="0" algn="l" defTabSz="914400" rtl="0" eaLnBrk="1" fontAlgn="auto" latinLnBrk="0" hangingPunct="1">
+                        <a:lnSpc>
+                          <a:spcPct val="100000"/>
+                        </a:lnSpc>
+                        <a:spcBef>
+                          <a:spcPts val="0"/>
+                        </a:spcBef>
+                        <a:spcAft>
+                          <a:spcPts val="0"/>
+                        </a:spcAft>
+                        <a:buClrTx/>
+                        <a:buSzTx/>
+                        <a:buFontTx/>
+                        <a:buNone/>
+                        <a:tabLst/>
+                        <a:defRPr/>
+                      </a:pPr>
+                      <a:r>
+                        <a:rPr lang="en-GB" sz="600" b="0" dirty="0">
+                          <a:effectLst/>
+                        </a:rPr>
+                        <a:t>Actual revenue – actual revenue for the month and country</a:t>
+                      </a:r>
+                    </a:p>
+                    <a:p>
+                      <a:endParaRPr lang="en-GB" sz="600" b="0" dirty="0">
+                        <a:effectLst/>
+                        <a:latin typeface="Calibri" panose="020F0502020204030204" pitchFamily="34" charset="0"/>
+                        <a:ea typeface="Calibri" panose="020F0502020204030204" pitchFamily="34" charset="0"/>
+                        <a:cs typeface="Times New Roman" panose="02020603050405020304" pitchFamily="18" charset="0"/>
+                      </a:endParaRPr>
+                    </a:p>
+                  </a:txBody>
+                  <a:tcPr marL="36718" marR="36718" marT="0" marB="0"/>
+                </a:tc>
+                <a:extLst>
+                  <a:ext uri="{0D108BD9-81ED-4DB2-BD59-A6C34878D82A}">
+                    <a16:rowId xmlns:a16="http://schemas.microsoft.com/office/drawing/2014/main" val="2406378645"/>
+                  </a:ext>
+                </a:extLst>
+              </a:tr>
+            </a:tbl>
+          </a:graphicData>
+        </a:graphic>
+      </p:graphicFrame>
     </p:spTree>
     <p:extLst>
       <p:ext uri="{BB962C8B-B14F-4D97-AF65-F5344CB8AC3E}">
-        <p14:creationId xmlns:p14="http://schemas.microsoft.com/office/powerpoint/2010/main" val="2197432302"/>
+        <p14:creationId xmlns:p14="http://schemas.microsoft.com/office/powerpoint/2010/main" val="3462086899"/>
       </p:ext>
     </p:extLst>
   </p:cSld>
@@ -4262,4 +5608,299 @@
     </a:ext>
   </a:extLst>
 </a:theme>
+</file>
+
+<file path=ppt/theme/theme2.xml><?xml version="1.0" encoding="utf-8"?>
+<a:theme xmlns:a="http://schemas.openxmlformats.org/drawingml/2006/main" name="Office Theme">
+  <a:themeElements>
+    <a:clrScheme name="Office">
+      <a:dk1>
+        <a:sysClr val="windowText" lastClr="000000"/>
+      </a:dk1>
+      <a:lt1>
+        <a:sysClr val="window" lastClr="FFFFFF"/>
+      </a:lt1>
+      <a:dk2>
+        <a:srgbClr val="44546A"/>
+      </a:dk2>
+      <a:lt2>
+        <a:srgbClr val="E7E6E6"/>
+      </a:lt2>
+      <a:accent1>
+        <a:srgbClr val="4472C4"/>
+      </a:accent1>
+      <a:accent2>
+        <a:srgbClr val="ED7D31"/>
+      </a:accent2>
+      <a:accent3>
+        <a:srgbClr val="A5A5A5"/>
+      </a:accent3>
+      <a:accent4>
+        <a:srgbClr val="FFC000"/>
+      </a:accent4>
+      <a:accent5>
+        <a:srgbClr val="5B9BD5"/>
+      </a:accent5>
+      <a:accent6>
+        <a:srgbClr val="70AD47"/>
+      </a:accent6>
+      <a:hlink>
+        <a:srgbClr val="0563C1"/>
+      </a:hlink>
+      <a:folHlink>
+        <a:srgbClr val="954F72"/>
+      </a:folHlink>
+    </a:clrScheme>
+    <a:fontScheme name="Office">
+      <a:majorFont>
+        <a:latin typeface="Calibri Light" panose="020F0302020204030204"/>
+        <a:ea typeface=""/>
+        <a:cs typeface=""/>
+        <a:font script="Jpan" typeface="游ゴシック Light"/>
+        <a:font script="Hang" typeface="맑은 고딕"/>
+        <a:font script="Hans" typeface="等线 Light"/>
+        <a:font script="Hant" typeface="新細明體"/>
+        <a:font script="Arab" typeface="Times New Roman"/>
+        <a:font script="Hebr" typeface="Times New Roman"/>
+        <a:font script="Thai" typeface="Angsana New"/>
+        <a:font script="Ethi" typeface="Nyala"/>
+        <a:font script="Beng" typeface="Vrinda"/>
+        <a:font script="Gujr" typeface="Shruti"/>
+        <a:font script="Khmr" typeface="MoolBoran"/>
+        <a:font script="Knda" typeface="Tunga"/>
+        <a:font script="Guru" typeface="Raavi"/>
+        <a:font script="Cans" typeface="Euphemia"/>
+        <a:font script="Cher" typeface="Plantagenet Cherokee"/>
+        <a:font script="Yiii" typeface="Microsoft Yi Baiti"/>
+        <a:font script="Tibt" typeface="Microsoft Himalaya"/>
+        <a:font script="Thaa" typeface="MV Boli"/>
+        <a:font script="Deva" typeface="Mangal"/>
+        <a:font script="Telu" typeface="Gautami"/>
+        <a:font script="Taml" typeface="Latha"/>
+        <a:font script="Syrc" typeface="Estrangelo Edessa"/>
+        <a:font script="Orya" typeface="Kalinga"/>
+        <a:font script="Mlym" typeface="Kartika"/>
+        <a:font script="Laoo" typeface="DokChampa"/>
+        <a:font script="Sinh" typeface="Iskoola Pota"/>
+        <a:font script="Mong" typeface="Mongolian Baiti"/>
+        <a:font script="Viet" typeface="Times New Roman"/>
+        <a:font script="Uigh" typeface="Microsoft Uighur"/>
+        <a:font script="Geor" typeface="Sylfaen"/>
+        <a:font script="Armn" typeface="Arial"/>
+        <a:font script="Bugi" typeface="Leelawadee UI"/>
+        <a:font script="Bopo" typeface="Microsoft JhengHei"/>
+        <a:font script="Java" typeface="Javanese Text"/>
+        <a:font script="Lisu" typeface="Segoe UI"/>
+        <a:font script="Mymr" typeface="Myanmar Text"/>
+        <a:font script="Nkoo" typeface="Ebrima"/>
+        <a:font script="Olck" typeface="Nirmala UI"/>
+        <a:font script="Osma" typeface="Ebrima"/>
+        <a:font script="Phag" typeface="Phagspa"/>
+        <a:font script="Syrn" typeface="Estrangelo Edessa"/>
+        <a:font script="Syrj" typeface="Estrangelo Edessa"/>
+        <a:font script="Syre" typeface="Estrangelo Edessa"/>
+        <a:font script="Sora" typeface="Nirmala UI"/>
+        <a:font script="Tale" typeface="Microsoft Tai Le"/>
+        <a:font script="Talu" typeface="Microsoft New Tai Lue"/>
+        <a:font script="Tfng" typeface="Ebrima"/>
+      </a:majorFont>
+      <a:minorFont>
+        <a:latin typeface="Calibri" panose="020F0502020204030204"/>
+        <a:ea typeface=""/>
+        <a:cs typeface=""/>
+        <a:font script="Jpan" typeface="游ゴシック"/>
+        <a:font script="Hang" typeface="맑은 고딕"/>
+        <a:font script="Hans" typeface="等线"/>
+        <a:font script="Hant" typeface="新細明體"/>
+        <a:font script="Arab" typeface="Arial"/>
+        <a:font script="Hebr" typeface="Arial"/>
+        <a:font script="Thai" typeface="Cordia New"/>
+        <a:font script="Ethi" typeface="Nyala"/>
+        <a:font script="Beng" typeface="Vrinda"/>
+        <a:font script="Gujr" typeface="Shruti"/>
+        <a:font script="Khmr" typeface="DaunPenh"/>
+        <a:font script="Knda" typeface="Tunga"/>
+        <a:font script="Guru" typeface="Raavi"/>
+        <a:font script="Cans" typeface="Euphemia"/>
+        <a:font script="Cher" typeface="Plantagenet Cherokee"/>
+        <a:font script="Yiii" typeface="Microsoft Yi Baiti"/>
+        <a:font script="Tibt" typeface="Microsoft Himalaya"/>
+        <a:font script="Thaa" typeface="MV Boli"/>
+        <a:font script="Deva" typeface="Mangal"/>
+        <a:font script="Telu" typeface="Gautami"/>
+        <a:font script="Taml" typeface="Latha"/>
+        <a:font script="Syrc" typeface="Estrangelo Edessa"/>
+        <a:font script="Orya" typeface="Kalinga"/>
+        <a:font script="Mlym" typeface="Kartika"/>
+        <a:font script="Laoo" typeface="DokChampa"/>
+        <a:font script="Sinh" typeface="Iskoola Pota"/>
+        <a:font script="Mong" typeface="Mongolian Baiti"/>
+        <a:font script="Viet" typeface="Arial"/>
+        <a:font script="Uigh" typeface="Microsoft Uighur"/>
+        <a:font script="Geor" typeface="Sylfaen"/>
+        <a:font script="Armn" typeface="Arial"/>
+        <a:font script="Bugi" typeface="Leelawadee UI"/>
+        <a:font script="Bopo" typeface="Microsoft JhengHei"/>
+        <a:font script="Java" typeface="Javanese Text"/>
+        <a:font script="Lisu" typeface="Segoe UI"/>
+        <a:font script="Mymr" typeface="Myanmar Text"/>
+        <a:font script="Nkoo" typeface="Ebrima"/>
+        <a:font script="Olck" typeface="Nirmala UI"/>
+        <a:font script="Osma" typeface="Ebrima"/>
+        <a:font script="Phag" typeface="Phagspa"/>
+        <a:font script="Syrn" typeface="Estrangelo Edessa"/>
+        <a:font script="Syrj" typeface="Estrangelo Edessa"/>
+        <a:font script="Syre" typeface="Estrangelo Edessa"/>
+        <a:font script="Sora" typeface="Nirmala UI"/>
+        <a:font script="Tale" typeface="Microsoft Tai Le"/>
+        <a:font script="Talu" typeface="Microsoft New Tai Lue"/>
+        <a:font script="Tfng" typeface="Ebrima"/>
+      </a:minorFont>
+    </a:fontScheme>
+    <a:fmtScheme name="Office">
+      <a:fillStyleLst>
+        <a:solidFill>
+          <a:schemeClr val="phClr"/>
+        </a:solidFill>
+        <a:gradFill rotWithShape="1">
+          <a:gsLst>
+            <a:gs pos="0">
+              <a:schemeClr val="phClr">
+                <a:lumMod val="110000"/>
+                <a:satMod val="105000"/>
+                <a:tint val="67000"/>
+              </a:schemeClr>
+            </a:gs>
+            <a:gs pos="50000">
+              <a:schemeClr val="phClr">
+                <a:lumMod val="105000"/>
+                <a:satMod val="103000"/>
+                <a:tint val="73000"/>
+              </a:schemeClr>
+            </a:gs>
+            <a:gs pos="100000">
+              <a:schemeClr val="phClr">
+                <a:lumMod val="105000"/>
+                <a:satMod val="109000"/>
+                <a:tint val="81000"/>
+              </a:schemeClr>
+            </a:gs>
+          </a:gsLst>
+          <a:lin ang="5400000" scaled="0"/>
+        </a:gradFill>
+        <a:gradFill rotWithShape="1">
+          <a:gsLst>
+            <a:gs pos="0">
+              <a:schemeClr val="phClr">
+                <a:satMod val="103000"/>
+                <a:lumMod val="102000"/>
+                <a:tint val="94000"/>
+              </a:schemeClr>
+            </a:gs>
+            <a:gs pos="50000">
+              <a:schemeClr val="phClr">
+                <a:satMod val="110000"/>
+                <a:lumMod val="100000"/>
+                <a:shade val="100000"/>
+              </a:schemeClr>
+            </a:gs>
+            <a:gs pos="100000">
+              <a:schemeClr val="phClr">
+                <a:lumMod val="99000"/>
+                <a:satMod val="120000"/>
+                <a:shade val="78000"/>
+              </a:schemeClr>
+            </a:gs>
+          </a:gsLst>
+          <a:lin ang="5400000" scaled="0"/>
+        </a:gradFill>
+      </a:fillStyleLst>
+      <a:lnStyleLst>
+        <a:ln w="6350" cap="flat" cmpd="sng" algn="ctr">
+          <a:solidFill>
+            <a:schemeClr val="phClr"/>
+          </a:solidFill>
+          <a:prstDash val="solid"/>
+          <a:miter lim="800000"/>
+        </a:ln>
+        <a:ln w="12700" cap="flat" cmpd="sng" algn="ctr">
+          <a:solidFill>
+            <a:schemeClr val="phClr"/>
+          </a:solidFill>
+          <a:prstDash val="solid"/>
+          <a:miter lim="800000"/>
+        </a:ln>
+        <a:ln w="19050" cap="flat" cmpd="sng" algn="ctr">
+          <a:solidFill>
+            <a:schemeClr val="phClr"/>
+          </a:solidFill>
+          <a:prstDash val="solid"/>
+          <a:miter lim="800000"/>
+        </a:ln>
+      </a:lnStyleLst>
+      <a:effectStyleLst>
+        <a:effectStyle>
+          <a:effectLst/>
+        </a:effectStyle>
+        <a:effectStyle>
+          <a:effectLst/>
+        </a:effectStyle>
+        <a:effectStyle>
+          <a:effectLst>
+            <a:outerShdw blurRad="57150" dist="19050" dir="5400000" algn="ctr" rotWithShape="0">
+              <a:srgbClr val="000000">
+                <a:alpha val="63000"/>
+              </a:srgbClr>
+            </a:outerShdw>
+          </a:effectLst>
+        </a:effectStyle>
+      </a:effectStyleLst>
+      <a:bgFillStyleLst>
+        <a:solidFill>
+          <a:schemeClr val="phClr"/>
+        </a:solidFill>
+        <a:solidFill>
+          <a:schemeClr val="phClr">
+            <a:tint val="95000"/>
+            <a:satMod val="170000"/>
+          </a:schemeClr>
+        </a:solidFill>
+        <a:gradFill rotWithShape="1">
+          <a:gsLst>
+            <a:gs pos="0">
+              <a:schemeClr val="phClr">
+                <a:tint val="93000"/>
+                <a:satMod val="150000"/>
+                <a:shade val="98000"/>
+                <a:lumMod val="102000"/>
+              </a:schemeClr>
+            </a:gs>
+            <a:gs pos="50000">
+              <a:schemeClr val="phClr">
+                <a:tint val="98000"/>
+                <a:satMod val="130000"/>
+                <a:shade val="90000"/>
+                <a:lumMod val="103000"/>
+              </a:schemeClr>
+            </a:gs>
+            <a:gs pos="100000">
+              <a:schemeClr val="phClr">
+                <a:shade val="63000"/>
+                <a:satMod val="120000"/>
+              </a:schemeClr>
+            </a:gs>
+          </a:gsLst>
+          <a:lin ang="5400000" scaled="0"/>
+        </a:gradFill>
+      </a:bgFillStyleLst>
+    </a:fmtScheme>
+  </a:themeElements>
+  <a:objectDefaults/>
+  <a:extraClrSchemeLst/>
+  <a:extLst>
+    <a:ext uri="{05A4C25C-085E-4340-85A3-A5531E510DB2}">
+      <thm15:themeFamily xmlns:thm15="http://schemas.microsoft.com/office/thememl/2012/main" name="Office Theme" id="{62F939B6-93AF-4DB8-9C6B-D6C7DFDC589F}" vid="{4A3C46E8-61CC-4603-A589-7422A47A8E4A}"/>
+    </a:ext>
+  </a:extLst>
+</a:theme>
 </file>
</xml_diff>

<commit_message>
adding 1st working version of data ingestor script and 1st raw transactions output csv
</commit_message>
<xml_diff>
--- a/Part 1 Data Investigation/AAVAiL Revenue Prediction - Data Investigation Summary.pptx
+++ b/Part 1 Data Investigation/AAVAiL Revenue Prediction - Data Investigation Summary.pptx
@@ -5,16 +5,17 @@
     <p:sldMasterId id="2147483660" r:id="rId1"/>
   </p:sldMasterIdLst>
   <p:notesMasterIdLst>
-    <p:notesMasterId r:id="rId9"/>
+    <p:notesMasterId r:id="rId10"/>
   </p:notesMasterIdLst>
   <p:sldIdLst>
     <p:sldId id="256" r:id="rId2"/>
     <p:sldId id="257" r:id="rId3"/>
     <p:sldId id="258" r:id="rId4"/>
     <p:sldId id="263" r:id="rId5"/>
-    <p:sldId id="260" r:id="rId6"/>
-    <p:sldId id="261" r:id="rId7"/>
-    <p:sldId id="262" r:id="rId8"/>
+    <p:sldId id="259" r:id="rId6"/>
+    <p:sldId id="260" r:id="rId7"/>
+    <p:sldId id="261" r:id="rId8"/>
+    <p:sldId id="262" r:id="rId9"/>
   </p:sldIdLst>
   <p:sldSz cx="12192000" cy="6858000"/>
   <p:notesSz cx="6858000" cy="9144000"/>
@@ -4263,20 +4264,13 @@
         </p:spPr>
         <p:txBody>
           <a:bodyPr>
-            <a:normAutofit fontScale="90000"/>
+            <a:normAutofit/>
           </a:bodyPr>
           <a:lstStyle/>
           <a:p>
             <a:r>
               <a:rPr lang="en-GB" dirty="0"/>
               <a:t>1. articulate testable hypotheses.</a:t>
-            </a:r>
-            <a:br>
-              <a:rPr lang="en-GB" dirty="0"/>
-            </a:br>
-            <a:r>
-              <a:rPr lang="en-GB" dirty="0"/>
-              <a:t>2. State the ideal data to address the business opportunity and clarify the rationale for needing specific data.</a:t>
             </a:r>
             <a:endParaRPr lang="en-US" dirty="0">
               <a:solidFill>
@@ -4369,14 +4363,14 @@
             <p:ph idx="1"/>
             <p:extLst>
               <p:ext uri="{D42A27DB-BD31-4B8C-83A1-F6EECF244321}">
-                <p14:modId xmlns:p14="http://schemas.microsoft.com/office/powerpoint/2010/main" val="3070765457"/>
+                <p14:modId xmlns:p14="http://schemas.microsoft.com/office/powerpoint/2010/main" val="2923225936"/>
               </p:ext>
             </p:extLst>
           </p:nvPr>
         </p:nvGraphicFramePr>
         <p:xfrm>
-          <a:off x="1225551" y="2605766"/>
-          <a:ext cx="9501188" cy="3261036"/>
+          <a:off x="1225551" y="2159000"/>
+          <a:ext cx="9501188" cy="3922657"/>
         </p:xfrm>
         <a:graphic>
           <a:graphicData uri="http://schemas.openxmlformats.org/drawingml/2006/table">
@@ -4414,19 +4408,19 @@
                   </a:extLst>
                 </a:gridCol>
               </a:tblGrid>
-              <a:tr h="125890">
+              <a:tr h="143137">
                 <a:tc>
                   <a:txBody>
                     <a:bodyPr/>
                     <a:lstStyle/>
                     <a:p>
                       <a:r>
-                        <a:rPr lang="en-GB" sz="700">
+                        <a:rPr lang="en-GB" sz="900">
                           <a:effectLst/>
                         </a:rPr>
                         <a:t>Business Question</a:t>
                       </a:r>
-                      <a:endParaRPr lang="en-GB" sz="700">
+                      <a:endParaRPr lang="en-GB" sz="900">
                         <a:effectLst/>
                         <a:latin typeface="Calibri" panose="020F0502020204030204" pitchFamily="34" charset="0"/>
                         <a:ea typeface="Calibri" panose="020F0502020204030204" pitchFamily="34" charset="0"/>
@@ -4442,12 +4436,12 @@
                     <a:lstStyle/>
                     <a:p>
                       <a:r>
-                        <a:rPr lang="en-GB" sz="700">
+                        <a:rPr lang="en-GB" sz="900">
                           <a:effectLst/>
                         </a:rPr>
                         <a:t>Hypothesis</a:t>
                       </a:r>
-                      <a:endParaRPr lang="en-GB" sz="700">
+                      <a:endParaRPr lang="en-GB" sz="900">
                         <a:effectLst/>
                         <a:latin typeface="Calibri" panose="020F0502020204030204" pitchFamily="34" charset="0"/>
                         <a:ea typeface="Calibri" panose="020F0502020204030204" pitchFamily="34" charset="0"/>
@@ -4463,12 +4457,12 @@
                     <a:lstStyle/>
                     <a:p>
                       <a:r>
-                        <a:rPr lang="en-GB" sz="700">
+                        <a:rPr lang="en-GB" sz="900">
                           <a:effectLst/>
                         </a:rPr>
                         <a:t>Ideal Data needed</a:t>
                       </a:r>
-                      <a:endParaRPr lang="en-GB" sz="700">
+                      <a:endParaRPr lang="en-GB" sz="900">
                         <a:effectLst/>
                         <a:latin typeface="Calibri" panose="020F0502020204030204" pitchFamily="34" charset="0"/>
                         <a:ea typeface="Calibri" panose="020F0502020204030204" pitchFamily="34" charset="0"/>
@@ -4484,12 +4478,12 @@
                     <a:lstStyle/>
                     <a:p>
                       <a:r>
-                        <a:rPr lang="en-GB" sz="700">
+                        <a:rPr lang="en-GB" sz="900">
                           <a:effectLst/>
                         </a:rPr>
                         <a:t>Data Descriptions</a:t>
                       </a:r>
-                      <a:endParaRPr lang="en-GB" sz="700">
+                      <a:endParaRPr lang="en-GB" sz="900">
                         <a:effectLst/>
                         <a:latin typeface="Calibri" panose="020F0502020204030204" pitchFamily="34" charset="0"/>
                         <a:ea typeface="Calibri" panose="020F0502020204030204" pitchFamily="34" charset="0"/>
@@ -4505,31 +4499,31 @@
                   </a:ext>
                 </a:extLst>
               </a:tr>
-              <a:tr h="1567573">
+              <a:tr h="1782332">
                 <a:tc>
                   <a:txBody>
                     <a:bodyPr/>
                     <a:lstStyle/>
                     <a:p>
                       <a:r>
-                        <a:rPr lang="en-GB" sz="600" b="0">
+                        <a:rPr lang="en-GB" sz="800" b="0">
                           <a:effectLst/>
                         </a:rPr>
                         <a:t>Does use of the new model save </a:t>
                       </a:r>
                       <a:r>
-                        <a:rPr lang="en-GB" sz="600" b="0" err="1">
+                        <a:rPr lang="en-GB" sz="800" b="0" err="1">
                           <a:effectLst/>
                         </a:rPr>
                         <a:t>AAVAiL</a:t>
                       </a:r>
                       <a:r>
-                        <a:rPr lang="en-GB" sz="600" b="0">
+                        <a:rPr lang="en-GB" sz="800" b="0">
                           <a:effectLst/>
                         </a:rPr>
                         <a:t> Product Managers time when projecting future revenue?</a:t>
                       </a:r>
-                      <a:endParaRPr lang="en-GB" sz="600" b="0">
+                      <a:endParaRPr lang="en-GB" sz="800" b="0">
                         <a:effectLst/>
                         <a:latin typeface="Calibri" panose="020F0502020204030204" pitchFamily="34" charset="0"/>
                         <a:ea typeface="Calibri" panose="020F0502020204030204" pitchFamily="34" charset="0"/>
@@ -4545,12 +4539,12 @@
                     <a:lstStyle/>
                     <a:p>
                       <a:r>
-                        <a:rPr lang="en-GB" sz="600" b="0">
+                        <a:rPr lang="en-GB" sz="800" b="0">
                           <a:effectLst/>
                         </a:rPr>
                         <a:t>Use of the new model to generate a revenue projections is faster than use of the existing revenue projections process</a:t>
                       </a:r>
-                      <a:endParaRPr lang="en-GB" sz="600" b="0">
+                      <a:endParaRPr lang="en-GB" sz="800" b="0">
                         <a:effectLst/>
                         <a:latin typeface="Calibri" panose="020F0502020204030204" pitchFamily="34" charset="0"/>
                         <a:ea typeface="Calibri" panose="020F0502020204030204" pitchFamily="34" charset="0"/>
@@ -4566,20 +4560,20 @@
                     <a:lstStyle/>
                     <a:p>
                       <a:r>
-                        <a:rPr lang="en-GB" sz="600" b="0" dirty="0">
+                        <a:rPr lang="en-GB" sz="800" b="0" dirty="0">
                           <a:effectLst/>
                         </a:rPr>
                         <a:t>2 tables containing the below rows and columns, for pre- new model (existing process) and post-new model</a:t>
                       </a:r>
                     </a:p>
                     <a:p>
-                      <a:endParaRPr lang="en-GB" sz="600" b="0" dirty="0">
+                      <a:endParaRPr lang="en-GB" sz="800" b="0" dirty="0">
                         <a:effectLst/>
                       </a:endParaRPr>
                     </a:p>
                     <a:p>
                       <a:r>
-                        <a:rPr lang="en-GB" sz="600" b="0" dirty="0">
+                        <a:rPr lang="en-GB" sz="800" b="0" dirty="0">
                           <a:effectLst/>
                         </a:rPr>
                         <a:t>Rows:</a:t>
@@ -4587,32 +4581,32 @@
                     </a:p>
                     <a:p>
                       <a:r>
-                        <a:rPr lang="en-GB" sz="600" b="0" dirty="0">
+                        <a:rPr lang="en-GB" sz="800" b="0" dirty="0">
                           <a:effectLst/>
                         </a:rPr>
                         <a:t>A single revenue projection made by an </a:t>
                       </a:r>
                       <a:r>
-                        <a:rPr lang="en-GB" sz="600" b="0" dirty="0" err="1">
+                        <a:rPr lang="en-GB" sz="800" b="0" dirty="0" err="1">
                           <a:effectLst/>
                         </a:rPr>
                         <a:t>AAVAiL</a:t>
                       </a:r>
                       <a:r>
-                        <a:rPr lang="en-GB" sz="600" b="0" dirty="0">
+                        <a:rPr lang="en-GB" sz="800" b="0" dirty="0">
                           <a:effectLst/>
                         </a:rPr>
                         <a:t> Product Manager</a:t>
                       </a:r>
                     </a:p>
                     <a:p>
-                      <a:endParaRPr lang="en-GB" sz="600" b="0" dirty="0">
+                      <a:endParaRPr lang="en-GB" sz="800" b="0" dirty="0">
                         <a:effectLst/>
                       </a:endParaRPr>
                     </a:p>
                     <a:p>
                       <a:r>
-                        <a:rPr lang="en-GB" sz="600" b="0" dirty="0">
+                        <a:rPr lang="en-GB" sz="800" b="0" dirty="0">
                           <a:effectLst/>
                         </a:rPr>
                         <a:t>Columns:</a:t>
@@ -4620,7 +4614,7 @@
                     </a:p>
                     <a:p>
                       <a:r>
-                        <a:rPr lang="en-GB" sz="600" b="0" dirty="0">
+                        <a:rPr lang="en-GB" sz="800" b="0" dirty="0">
                           <a:effectLst/>
                         </a:rPr>
                         <a:t>Projection id</a:t>
@@ -4628,7 +4622,7 @@
                     </a:p>
                     <a:p>
                       <a:r>
-                        <a:rPr lang="en-GB" sz="600" b="0" dirty="0">
+                        <a:rPr lang="en-GB" sz="800" b="0" dirty="0">
                           <a:effectLst/>
                         </a:rPr>
                         <a:t>Date/Time of projection</a:t>
@@ -4636,7 +4630,7 @@
                     </a:p>
                     <a:p>
                       <a:r>
-                        <a:rPr lang="en-GB" sz="600" b="0" dirty="0">
+                        <a:rPr lang="en-GB" sz="800" b="0" dirty="0">
                           <a:effectLst/>
                         </a:rPr>
                         <a:t>Product Manager ID/Name</a:t>
@@ -4644,7 +4638,7 @@
                     </a:p>
                     <a:p>
                       <a:r>
-                        <a:rPr lang="en-GB" sz="600" b="0" dirty="0">
+                        <a:rPr lang="en-GB" sz="800" b="0" dirty="0">
                           <a:effectLst/>
                         </a:rPr>
                         <a:t>Month of projection</a:t>
@@ -4652,7 +4646,7 @@
                     </a:p>
                     <a:p>
                       <a:r>
-                        <a:rPr lang="en-GB" sz="600" b="0" dirty="0">
+                        <a:rPr lang="en-GB" sz="800" b="0" dirty="0">
                           <a:effectLst/>
                         </a:rPr>
                         <a:t>Country of projection</a:t>
@@ -4660,7 +4654,7 @@
                     </a:p>
                     <a:p>
                       <a:r>
-                        <a:rPr lang="en-GB" sz="600" b="0" dirty="0">
+                        <a:rPr lang="en-GB" sz="800" b="0" dirty="0">
                           <a:effectLst/>
                         </a:rPr>
                         <a:t>Model version</a:t>
@@ -4668,7 +4662,7 @@
                     </a:p>
                     <a:p>
                       <a:r>
-                        <a:rPr lang="en-GB" sz="600" b="0" dirty="0">
+                        <a:rPr lang="en-GB" sz="800" b="0" dirty="0">
                           <a:effectLst/>
                         </a:rPr>
                         <a:t>Model output/revenue projection(s)</a:t>
@@ -4676,7 +4670,7 @@
                     </a:p>
                     <a:p>
                       <a:r>
-                        <a:rPr lang="en-GB" sz="600" b="0" dirty="0">
+                        <a:rPr lang="en-GB" sz="800" b="0" dirty="0">
                           <a:effectLst/>
                         </a:rPr>
                         <a:t>Time to execute projection</a:t>
@@ -4691,7 +4685,7 @@
                     <a:lstStyle/>
                     <a:p>
                       <a:r>
-                        <a:rPr lang="en-GB" sz="600" b="0" dirty="0">
+                        <a:rPr lang="en-GB" sz="800" b="0" dirty="0">
                           <a:effectLst/>
                         </a:rPr>
                         <a:t> Projection id – uniquely identifies a projection</a:t>
@@ -4716,7 +4710,7 @@
                         <a:defRPr/>
                       </a:pPr>
                       <a:r>
-                        <a:rPr lang="en-GB" sz="600" b="0" dirty="0">
+                        <a:rPr lang="en-GB" sz="800" b="0" dirty="0">
                           <a:effectLst/>
                         </a:rPr>
                         <a:t>Date/Time of projection – when the projection was executed</a:t>
@@ -4741,7 +4735,7 @@
                         <a:defRPr/>
                       </a:pPr>
                       <a:r>
-                        <a:rPr lang="en-GB" sz="600" b="0" dirty="0">
+                        <a:rPr lang="en-GB" sz="800" b="0" dirty="0">
                           <a:effectLst/>
                         </a:rPr>
                         <a:t>Product Manager ID/Name – uniquely identifies a user</a:t>
@@ -4766,7 +4760,7 @@
                         <a:defRPr/>
                       </a:pPr>
                       <a:r>
-                        <a:rPr lang="en-GB" sz="600" b="0" dirty="0">
+                        <a:rPr lang="en-GB" sz="800" b="0" dirty="0">
                           <a:effectLst/>
                         </a:rPr>
                         <a:t>Month of projection - month which the projection is for</a:t>
@@ -4774,7 +4768,7 @@
                     </a:p>
                     <a:p>
                       <a:r>
-                        <a:rPr lang="en-GB" sz="600" b="0" dirty="0">
+                        <a:rPr lang="en-GB" sz="800" b="0" dirty="0">
                           <a:effectLst/>
                         </a:rPr>
                         <a:t>Country of projection – country which the projection is for</a:t>
@@ -4782,7 +4776,7 @@
                     </a:p>
                     <a:p>
                       <a:r>
-                        <a:rPr lang="en-GB" sz="600" b="0" dirty="0">
+                        <a:rPr lang="en-GB" sz="800" b="0" dirty="0">
                           <a:effectLst/>
                         </a:rPr>
                         <a:t>Model version – version of model for which the projections was derived from</a:t>
@@ -4790,7 +4784,7 @@
                     </a:p>
                     <a:p>
                       <a:r>
-                        <a:rPr lang="en-GB" sz="600" b="0" dirty="0">
+                        <a:rPr lang="en-GB" sz="800" b="0" dirty="0">
                           <a:effectLst/>
                         </a:rPr>
                         <a:t>Model output/revenue projection(s) -  output of the model</a:t>
@@ -4798,12 +4792,12 @@
                     </a:p>
                     <a:p>
                       <a:r>
-                        <a:rPr lang="en-GB" sz="600" b="0" dirty="0">
+                        <a:rPr lang="en-GB" sz="800" b="0" dirty="0">
                           <a:effectLst/>
                         </a:rPr>
                         <a:t>Time to execute projection – How long it took the user to execute the projection</a:t>
                       </a:r>
-                      <a:endParaRPr lang="en-GB" sz="600" b="0" dirty="0">
+                      <a:endParaRPr lang="en-GB" sz="800" b="0" dirty="0">
                         <a:effectLst/>
                         <a:latin typeface="Calibri" panose="020F0502020204030204" pitchFamily="34" charset="0"/>
                         <a:ea typeface="Calibri" panose="020F0502020204030204" pitchFamily="34" charset="0"/>
@@ -4819,31 +4813,31 @@
                   </a:ext>
                 </a:extLst>
               </a:tr>
-              <a:tr h="1567573">
+              <a:tr h="1782332">
                 <a:tc>
                   <a:txBody>
                     <a:bodyPr/>
                     <a:lstStyle/>
                     <a:p>
                       <a:r>
-                        <a:rPr lang="en-GB" sz="600" b="0">
+                        <a:rPr lang="en-GB" sz="800" b="0">
                           <a:effectLst/>
                         </a:rPr>
                         <a:t>Does the new model enable </a:t>
                       </a:r>
                       <a:r>
-                        <a:rPr lang="en-GB" sz="600" b="0" err="1">
+                        <a:rPr lang="en-GB" sz="800" b="0" err="1">
                           <a:effectLst/>
                         </a:rPr>
                         <a:t>AAVAiL</a:t>
                       </a:r>
                       <a:r>
-                        <a:rPr lang="en-GB" sz="600" b="0">
+                        <a:rPr lang="en-GB" sz="800" b="0">
                           <a:effectLst/>
                         </a:rPr>
                         <a:t> Product Managers to more accurately project revenue?</a:t>
                       </a:r>
-                      <a:endParaRPr lang="en-GB" sz="600" b="0">
+                      <a:endParaRPr lang="en-GB" sz="800" b="0">
                         <a:effectLst/>
                         <a:latin typeface="Calibri" panose="020F0502020204030204" pitchFamily="34" charset="0"/>
                         <a:ea typeface="Calibri" panose="020F0502020204030204" pitchFamily="34" charset="0"/>
@@ -4859,12 +4853,12 @@
                     <a:lstStyle/>
                     <a:p>
                       <a:r>
-                        <a:rPr lang="en-GB" sz="600" b="0">
+                        <a:rPr lang="en-GB" sz="800" b="0">
                           <a:effectLst/>
                         </a:rPr>
                         <a:t>The new model projects more accurate revenue predictions than the predictions of the existing revenue projections process</a:t>
                       </a:r>
-                      <a:endParaRPr lang="en-GB" sz="600" b="0">
+                      <a:endParaRPr lang="en-GB" sz="800" b="0">
                         <a:effectLst/>
                         <a:latin typeface="Calibri" panose="020F0502020204030204" pitchFamily="34" charset="0"/>
                         <a:ea typeface="Calibri" panose="020F0502020204030204" pitchFamily="34" charset="0"/>
@@ -4880,20 +4874,20 @@
                     <a:lstStyle/>
                     <a:p>
                       <a:r>
-                        <a:rPr lang="en-GB" sz="600" b="0">
+                        <a:rPr lang="en-GB" sz="800" b="0">
                           <a:effectLst/>
                         </a:rPr>
                         <a:t>2 tables containing the below rows and columns, for pre- new model (existing process) and post-new model</a:t>
                       </a:r>
                     </a:p>
                     <a:p>
-                      <a:endParaRPr lang="en-GB" sz="600" b="0">
+                      <a:endParaRPr lang="en-GB" sz="800" b="0">
                         <a:effectLst/>
                       </a:endParaRPr>
                     </a:p>
                     <a:p>
                       <a:r>
-                        <a:rPr lang="en-GB" sz="600" b="0">
+                        <a:rPr lang="en-GB" sz="800" b="0">
                           <a:effectLst/>
                         </a:rPr>
                         <a:t>Rows:</a:t>
@@ -4901,32 +4895,32 @@
                     </a:p>
                     <a:p>
                       <a:r>
-                        <a:rPr lang="en-GB" sz="600" b="0">
+                        <a:rPr lang="en-GB" sz="800" b="0">
                           <a:effectLst/>
                         </a:rPr>
                         <a:t>A single revenue projection made by an </a:t>
                       </a:r>
                       <a:r>
-                        <a:rPr lang="en-GB" sz="600" b="0" err="1">
+                        <a:rPr lang="en-GB" sz="800" b="0" err="1">
                           <a:effectLst/>
                         </a:rPr>
                         <a:t>AAVAiL</a:t>
                       </a:r>
                       <a:r>
-                        <a:rPr lang="en-GB" sz="600" b="0">
+                        <a:rPr lang="en-GB" sz="800" b="0">
                           <a:effectLst/>
                         </a:rPr>
                         <a:t> Product Manager</a:t>
                       </a:r>
                     </a:p>
                     <a:p>
-                      <a:endParaRPr lang="en-GB" sz="600" b="0">
+                      <a:endParaRPr lang="en-GB" sz="800" b="0">
                         <a:effectLst/>
                       </a:endParaRPr>
                     </a:p>
                     <a:p>
                       <a:r>
-                        <a:rPr lang="en-GB" sz="600" b="0">
+                        <a:rPr lang="en-GB" sz="800" b="0">
                           <a:effectLst/>
                         </a:rPr>
                         <a:t>Columns:</a:t>
@@ -4934,7 +4928,7 @@
                     </a:p>
                     <a:p>
                       <a:r>
-                        <a:rPr lang="en-GB" sz="600" b="0">
+                        <a:rPr lang="en-GB" sz="800" b="0">
                           <a:effectLst/>
                         </a:rPr>
                         <a:t>Projection id</a:t>
@@ -4942,7 +4936,7 @@
                     </a:p>
                     <a:p>
                       <a:r>
-                        <a:rPr lang="en-GB" sz="600" b="0">
+                        <a:rPr lang="en-GB" sz="800" b="0">
                           <a:effectLst/>
                         </a:rPr>
                         <a:t>Date/time of projection</a:t>
@@ -4950,7 +4944,7 @@
                     </a:p>
                     <a:p>
                       <a:r>
-                        <a:rPr lang="en-GB" sz="600" b="0">
+                        <a:rPr lang="en-GB" sz="800" b="0">
                           <a:effectLst/>
                         </a:rPr>
                         <a:t>Product Manager ID/Name</a:t>
@@ -4958,7 +4952,7 @@
                     </a:p>
                     <a:p>
                       <a:r>
-                        <a:rPr lang="en-GB" sz="600" b="0">
+                        <a:rPr lang="en-GB" sz="800" b="0">
                           <a:effectLst/>
                         </a:rPr>
                         <a:t>Month which the projection is for</a:t>
@@ -4966,7 +4960,7 @@
                     </a:p>
                     <a:p>
                       <a:r>
-                        <a:rPr lang="en-GB" sz="600" b="0">
+                        <a:rPr lang="en-GB" sz="800" b="0">
                           <a:effectLst/>
                         </a:rPr>
                         <a:t>Country for which the projection is for</a:t>
@@ -4974,7 +4968,7 @@
                     </a:p>
                     <a:p>
                       <a:r>
-                        <a:rPr lang="en-GB" sz="600" b="0">
+                        <a:rPr lang="en-GB" sz="800" b="0">
                           <a:effectLst/>
                         </a:rPr>
                         <a:t>Model version</a:t>
@@ -4982,7 +4976,7 @@
                     </a:p>
                     <a:p>
                       <a:r>
-                        <a:rPr lang="en-GB" sz="600" b="0">
+                        <a:rPr lang="en-GB" sz="800" b="0">
                           <a:effectLst/>
                         </a:rPr>
                         <a:t>Model output/revenue projection(s)</a:t>
@@ -4990,14 +4984,14 @@
                     </a:p>
                     <a:p>
                       <a:r>
-                        <a:rPr lang="en-GB" sz="600" b="0">
+                        <a:rPr lang="en-GB" sz="800" b="0">
                           <a:effectLst/>
                         </a:rPr>
                         <a:t>Actual revenue</a:t>
                       </a:r>
                     </a:p>
                     <a:p>
-                      <a:endParaRPr lang="en-GB" sz="600" b="0">
+                      <a:endParaRPr lang="en-GB" sz="800" b="0">
                         <a:effectLst/>
                         <a:latin typeface="Calibri" panose="020F0502020204030204" pitchFamily="34" charset="0"/>
                         <a:ea typeface="Calibri" panose="020F0502020204030204" pitchFamily="34" charset="0"/>
@@ -5013,19 +5007,19 @@
                     <a:lstStyle/>
                     <a:p>
                       <a:r>
-                        <a:rPr lang="en-GB" sz="600" b="0" dirty="0">
+                        <a:rPr lang="en-GB" sz="800" b="0" dirty="0">
                           <a:effectLst/>
                         </a:rPr>
                         <a:t>See above row for existing descriptions</a:t>
                       </a:r>
                     </a:p>
                     <a:p>
-                      <a:endParaRPr lang="en-GB" sz="600" b="0" dirty="0">
+                      <a:endParaRPr lang="en-GB" sz="800" b="0" dirty="0">
                         <a:effectLst/>
                       </a:endParaRPr>
                     </a:p>
                     <a:p>
-                      <a:endParaRPr lang="en-GB" sz="600" b="0" dirty="0">
+                      <a:endParaRPr lang="en-GB" sz="800" b="0" dirty="0">
                         <a:effectLst/>
                       </a:endParaRPr>
                     </a:p>
@@ -5048,14 +5042,14 @@
                         <a:defRPr/>
                       </a:pPr>
                       <a:r>
-                        <a:rPr lang="en-GB" sz="600" b="0" dirty="0">
+                        <a:rPr lang="en-GB" sz="800" b="0" dirty="0">
                           <a:effectLst/>
                         </a:rPr>
                         <a:t>Actual revenue – actual revenue for the month and country</a:t>
                       </a:r>
                     </a:p>
                     <a:p>
-                      <a:endParaRPr lang="en-GB" sz="600" b="0" dirty="0">
+                      <a:endParaRPr lang="en-GB" sz="800" b="0" dirty="0">
                         <a:effectLst/>
                         <a:latin typeface="Calibri" panose="020F0502020204030204" pitchFamily="34" charset="0"/>
                         <a:ea typeface="Calibri" panose="020F0502020204030204" pitchFamily="34" charset="0"/>
@@ -5110,7 +5104,7 @@
           <p:cNvPr id="2" name="Title 1">
             <a:extLst>
               <a:ext uri="{FF2B5EF4-FFF2-40B4-BE49-F238E27FC236}">
-                <a16:creationId xmlns:a16="http://schemas.microsoft.com/office/drawing/2014/main" id="{A3362832-6C7C-B746-85ED-5B2B05C84030}"/>
+                <a16:creationId xmlns:a16="http://schemas.microsoft.com/office/drawing/2014/main" id="{5F09CC06-29E7-5C41-BB00-CBE844139868}"/>
               </a:ext>
             </a:extLst>
           </p:cNvPr>
@@ -5124,18 +5118,18 @@
         <p:spPr/>
         <p:txBody>
           <a:bodyPr>
-            <a:noAutofit/>
+            <a:normAutofit fontScale="90000"/>
           </a:bodyPr>
           <a:lstStyle/>
           <a:p>
             <a:r>
-              <a:rPr lang="en-GB" sz="2000" dirty="0"/>
-              <a:t>3. Create a python script to extract relevant data from multiple data sources, automating the process of data ingestion.</a:t>
+              <a:rPr lang="en-GB" sz="2200" dirty="0"/>
+              <a:t>2. State the ideal data to address the business opportunity and clarify the rationale for needing specific data.</a:t>
             </a:r>
             <a:br>
-              <a:rPr lang="en-GB" sz="2000" dirty="0"/>
+              <a:rPr lang="en-GB" dirty="0"/>
             </a:br>
-            <a:endParaRPr lang="en-US" sz="2000" dirty="0"/>
+            <a:endParaRPr lang="en-US" dirty="0"/>
           </a:p>
         </p:txBody>
       </p:sp>
@@ -5144,7 +5138,7 @@
           <p:cNvPr id="3" name="Content Placeholder 2">
             <a:extLst>
               <a:ext uri="{FF2B5EF4-FFF2-40B4-BE49-F238E27FC236}">
-                <a16:creationId xmlns:a16="http://schemas.microsoft.com/office/drawing/2014/main" id="{0DCCB24C-7520-2949-8DAC-DA53413AE5E2}"/>
+                <a16:creationId xmlns:a16="http://schemas.microsoft.com/office/drawing/2014/main" id="{4FE7BEA3-B7AB-1143-B2DE-4C09B8E63AFB}"/>
               </a:ext>
             </a:extLst>
           </p:cNvPr>
@@ -5160,14 +5154,14 @@
           <a:bodyPr/>
           <a:lstStyle/>
           <a:p>
-            <a:endParaRPr lang="en-US"/>
+            <a:endParaRPr lang="en-US" dirty="0"/>
           </a:p>
         </p:txBody>
       </p:sp>
     </p:spTree>
     <p:extLst>
       <p:ext uri="{BB962C8B-B14F-4D97-AF65-F5344CB8AC3E}">
-        <p14:creationId xmlns:p14="http://schemas.microsoft.com/office/powerpoint/2010/main" val="20232293"/>
+        <p14:creationId xmlns:p14="http://schemas.microsoft.com/office/powerpoint/2010/main" val="2197432302"/>
       </p:ext>
     </p:extLst>
   </p:cSld>
@@ -5199,6 +5193,95 @@
           <p:cNvPr id="2" name="Title 1">
             <a:extLst>
               <a:ext uri="{FF2B5EF4-FFF2-40B4-BE49-F238E27FC236}">
+                <a16:creationId xmlns:a16="http://schemas.microsoft.com/office/drawing/2014/main" id="{A3362832-6C7C-B746-85ED-5B2B05C84030}"/>
+              </a:ext>
+            </a:extLst>
+          </p:cNvPr>
+          <p:cNvSpPr>
+            <a:spLocks noGrp="1"/>
+          </p:cNvSpPr>
+          <p:nvPr>
+            <p:ph type="title"/>
+          </p:nvPr>
+        </p:nvSpPr>
+        <p:spPr/>
+        <p:txBody>
+          <a:bodyPr>
+            <a:noAutofit/>
+          </a:bodyPr>
+          <a:lstStyle/>
+          <a:p>
+            <a:r>
+              <a:rPr lang="en-GB" sz="2000" dirty="0"/>
+              <a:t>3. Create a python script to extract relevant data from multiple data sources, automating the process of data ingestion.</a:t>
+            </a:r>
+            <a:br>
+              <a:rPr lang="en-GB" sz="2000" dirty="0"/>
+            </a:br>
+            <a:endParaRPr lang="en-US" sz="2000" dirty="0"/>
+          </a:p>
+        </p:txBody>
+      </p:sp>
+      <p:sp>
+        <p:nvSpPr>
+          <p:cNvPr id="3" name="Content Placeholder 2">
+            <a:extLst>
+              <a:ext uri="{FF2B5EF4-FFF2-40B4-BE49-F238E27FC236}">
+                <a16:creationId xmlns:a16="http://schemas.microsoft.com/office/drawing/2014/main" id="{0DCCB24C-7520-2949-8DAC-DA53413AE5E2}"/>
+              </a:ext>
+            </a:extLst>
+          </p:cNvPr>
+          <p:cNvSpPr>
+            <a:spLocks noGrp="1"/>
+          </p:cNvSpPr>
+          <p:nvPr>
+            <p:ph idx="1"/>
+          </p:nvPr>
+        </p:nvSpPr>
+        <p:spPr/>
+        <p:txBody>
+          <a:bodyPr/>
+          <a:lstStyle/>
+          <a:p>
+            <a:endParaRPr lang="en-US"/>
+          </a:p>
+        </p:txBody>
+      </p:sp>
+    </p:spTree>
+    <p:extLst>
+      <p:ext uri="{BB962C8B-B14F-4D97-AF65-F5344CB8AC3E}">
+        <p14:creationId xmlns:p14="http://schemas.microsoft.com/office/powerpoint/2010/main" val="20232293"/>
+      </p:ext>
+    </p:extLst>
+  </p:cSld>
+  <p:clrMapOvr>
+    <a:masterClrMapping/>
+  </p:clrMapOvr>
+</p:sld>
+</file>
+
+<file path=ppt/slides/slide7.xml><?xml version="1.0" encoding="utf-8"?>
+<p:sld xmlns:a="http://schemas.openxmlformats.org/drawingml/2006/main" xmlns:r="http://schemas.openxmlformats.org/officeDocument/2006/relationships" xmlns:p="http://schemas.openxmlformats.org/presentationml/2006/main">
+  <p:cSld>
+    <p:spTree>
+      <p:nvGrpSpPr>
+        <p:cNvPr id="1" name=""/>
+        <p:cNvGrpSpPr/>
+        <p:nvPr/>
+      </p:nvGrpSpPr>
+      <p:grpSpPr>
+        <a:xfrm>
+          <a:off x="0" y="0"/>
+          <a:ext cx="0" cy="0"/>
+          <a:chOff x="0" y="0"/>
+          <a:chExt cx="0" cy="0"/>
+        </a:xfrm>
+      </p:grpSpPr>
+      <p:sp>
+        <p:nvSpPr>
+          <p:cNvPr id="2" name="Title 1">
+            <a:extLst>
+              <a:ext uri="{FF2B5EF4-FFF2-40B4-BE49-F238E27FC236}">
                 <a16:creationId xmlns:a16="http://schemas.microsoft.com/office/drawing/2014/main" id="{FCA0F290-57A2-FB44-8C1A-729D0387A65D}"/>
               </a:ext>
             </a:extLst>
@@ -5270,7 +5353,7 @@
 </p:sld>
 </file>
 
-<file path=ppt/slides/slide7.xml><?xml version="1.0" encoding="utf-8"?>
+<file path=ppt/slides/slide8.xml><?xml version="1.0" encoding="utf-8"?>
 <p:sld xmlns:a="http://schemas.openxmlformats.org/drawingml/2006/main" xmlns:r="http://schemas.openxmlformats.org/officeDocument/2006/relationships" xmlns:p="http://schemas.openxmlformats.org/presentationml/2006/main">
   <p:cSld>
     <p:spTree>

</xml_diff>

<commit_message>
First folder of gallery for EDA visualisations and outputs
</commit_message>
<xml_diff>
--- a/Part 1 Data Investigation/AAVAiL Revenue Prediction - Data Investigation Summary.pptx
+++ b/Part 1 Data Investigation/AAVAiL Revenue Prediction - Data Investigation Summary.pptx
@@ -5,7 +5,7 @@
     <p:sldMasterId id="2147483660" r:id="rId1"/>
   </p:sldMasterIdLst>
   <p:notesMasterIdLst>
-    <p:notesMasterId r:id="rId10"/>
+    <p:notesMasterId r:id="rId17"/>
   </p:notesMasterIdLst>
   <p:sldIdLst>
     <p:sldId id="256" r:id="rId2"/>
@@ -16,6 +16,13 @@
     <p:sldId id="260" r:id="rId7"/>
     <p:sldId id="261" r:id="rId8"/>
     <p:sldId id="262" r:id="rId9"/>
+    <p:sldId id="264" r:id="rId10"/>
+    <p:sldId id="265" r:id="rId11"/>
+    <p:sldId id="266" r:id="rId12"/>
+    <p:sldId id="267" r:id="rId13"/>
+    <p:sldId id="269" r:id="rId14"/>
+    <p:sldId id="270" r:id="rId15"/>
+    <p:sldId id="271" r:id="rId16"/>
   </p:sldIdLst>
   <p:sldSz cx="12192000" cy="6858000"/>
   <p:notesSz cx="6858000" cy="9144000"/>
@@ -204,7 +211,7 @@
           <a:p>
             <a:fld id="{6B972669-857D-BB4A-A249-2A6DFC7030D3}" type="datetimeFigureOut">
               <a:rPr lang="en-US" smtClean="0"/>
-              <a:t>3/19/21</a:t>
+              <a:t>3/28/21</a:t>
             </a:fld>
             <a:endParaRPr lang="en-US"/>
           </a:p>
@@ -719,7 +726,7 @@
           <a:p>
             <a:fld id="{494076E2-43EB-7D4D-9539-7B25001E7176}" type="datetimeFigureOut">
               <a:rPr lang="en-US" smtClean="0"/>
-              <a:t>3/19/21</a:t>
+              <a:t>3/28/21</a:t>
             </a:fld>
             <a:endParaRPr lang="en-US"/>
           </a:p>
@@ -889,7 +896,7 @@
           <a:p>
             <a:fld id="{494076E2-43EB-7D4D-9539-7B25001E7176}" type="datetimeFigureOut">
               <a:rPr lang="en-US" smtClean="0"/>
-              <a:t>3/19/21</a:t>
+              <a:t>3/28/21</a:t>
             </a:fld>
             <a:endParaRPr lang="en-US"/>
           </a:p>
@@ -1069,7 +1076,7 @@
           <a:p>
             <a:fld id="{494076E2-43EB-7D4D-9539-7B25001E7176}" type="datetimeFigureOut">
               <a:rPr lang="en-US" smtClean="0"/>
-              <a:t>3/19/21</a:t>
+              <a:t>3/28/21</a:t>
             </a:fld>
             <a:endParaRPr lang="en-US"/>
           </a:p>
@@ -1239,7 +1246,7 @@
           <a:p>
             <a:fld id="{494076E2-43EB-7D4D-9539-7B25001E7176}" type="datetimeFigureOut">
               <a:rPr lang="en-US" smtClean="0"/>
-              <a:t>3/19/21</a:t>
+              <a:t>3/28/21</a:t>
             </a:fld>
             <a:endParaRPr lang="en-US"/>
           </a:p>
@@ -1507,7 +1514,7 @@
           <a:p>
             <a:fld id="{494076E2-43EB-7D4D-9539-7B25001E7176}" type="datetimeFigureOut">
               <a:rPr lang="en-US" smtClean="0"/>
-              <a:t>3/19/21</a:t>
+              <a:t>3/28/21</a:t>
             </a:fld>
             <a:endParaRPr lang="en-US"/>
           </a:p>
@@ -1739,7 +1746,7 @@
           <a:p>
             <a:fld id="{494076E2-43EB-7D4D-9539-7B25001E7176}" type="datetimeFigureOut">
               <a:rPr lang="en-US" smtClean="0"/>
-              <a:t>3/19/21</a:t>
+              <a:t>3/28/21</a:t>
             </a:fld>
             <a:endParaRPr lang="en-US"/>
           </a:p>
@@ -2098,7 +2105,7 @@
           <a:p>
             <a:fld id="{494076E2-43EB-7D4D-9539-7B25001E7176}" type="datetimeFigureOut">
               <a:rPr lang="en-US" smtClean="0"/>
-              <a:t>3/19/21</a:t>
+              <a:t>3/28/21</a:t>
             </a:fld>
             <a:endParaRPr lang="en-US"/>
           </a:p>
@@ -2239,7 +2246,7 @@
           <a:p>
             <a:fld id="{494076E2-43EB-7D4D-9539-7B25001E7176}" type="datetimeFigureOut">
               <a:rPr lang="en-US" smtClean="0"/>
-              <a:t>3/19/21</a:t>
+              <a:t>3/28/21</a:t>
             </a:fld>
             <a:endParaRPr lang="en-US"/>
           </a:p>
@@ -2334,7 +2341,7 @@
           <a:p>
             <a:fld id="{494076E2-43EB-7D4D-9539-7B25001E7176}" type="datetimeFigureOut">
               <a:rPr lang="en-US" smtClean="0"/>
-              <a:t>3/19/21</a:t>
+              <a:t>3/28/21</a:t>
             </a:fld>
             <a:endParaRPr lang="en-US"/>
           </a:p>
@@ -2691,7 +2698,7 @@
           <a:p>
             <a:fld id="{494076E2-43EB-7D4D-9539-7B25001E7176}" type="datetimeFigureOut">
               <a:rPr lang="en-US" smtClean="0"/>
-              <a:t>3/19/21</a:t>
+              <a:t>3/28/21</a:t>
             </a:fld>
             <a:endParaRPr lang="en-US"/>
           </a:p>
@@ -3048,7 +3055,7 @@
           <a:p>
             <a:fld id="{494076E2-43EB-7D4D-9539-7B25001E7176}" type="datetimeFigureOut">
               <a:rPr lang="en-US" smtClean="0"/>
-              <a:t>3/19/21</a:t>
+              <a:t>3/28/21</a:t>
             </a:fld>
             <a:endParaRPr lang="en-US"/>
           </a:p>
@@ -3290,7 +3297,7 @@
           <a:p>
             <a:fld id="{494076E2-43EB-7D4D-9539-7B25001E7176}" type="datetimeFigureOut">
               <a:rPr lang="en-US" smtClean="0"/>
-              <a:t>3/19/21</a:t>
+              <a:t>3/28/21</a:t>
             </a:fld>
             <a:endParaRPr lang="en-US"/>
           </a:p>
@@ -3814,6 +3821,1956 @@
     <p:extLst>
       <p:ext uri="{BB962C8B-B14F-4D97-AF65-F5344CB8AC3E}">
         <p14:creationId xmlns:p14="http://schemas.microsoft.com/office/powerpoint/2010/main" val="2347454798"/>
+      </p:ext>
+    </p:extLst>
+  </p:cSld>
+  <p:clrMapOvr>
+    <a:masterClrMapping/>
+  </p:clrMapOvr>
+</p:sld>
+</file>
+
+<file path=ppt/slides/slide10.xml><?xml version="1.0" encoding="utf-8"?>
+<p:sld xmlns:a="http://schemas.openxmlformats.org/drawingml/2006/main" xmlns:r="http://schemas.openxmlformats.org/officeDocument/2006/relationships" xmlns:p="http://schemas.openxmlformats.org/presentationml/2006/main">
+  <p:cSld>
+    <p:bg>
+      <p:bgPr>
+        <a:solidFill>
+          <a:schemeClr val="bg1">
+            <a:lumMod val="95000"/>
+          </a:schemeClr>
+        </a:solidFill>
+        <a:effectLst/>
+      </p:bgPr>
+    </p:bg>
+    <p:spTree>
+      <p:nvGrpSpPr>
+        <p:cNvPr id="1" name=""/>
+        <p:cNvGrpSpPr/>
+        <p:nvPr/>
+      </p:nvGrpSpPr>
+      <p:grpSpPr>
+        <a:xfrm>
+          <a:off x="0" y="0"/>
+          <a:ext cx="0" cy="0"/>
+          <a:chOff x="0" y="0"/>
+          <a:chExt cx="0" cy="0"/>
+        </a:xfrm>
+      </p:grpSpPr>
+      <p:sp>
+        <p:nvSpPr>
+          <p:cNvPr id="2" name="Title 1">
+            <a:extLst>
+              <a:ext uri="{FF2B5EF4-FFF2-40B4-BE49-F238E27FC236}">
+                <a16:creationId xmlns:a16="http://schemas.microsoft.com/office/drawing/2014/main" id="{0DC8F934-EF30-2A4B-8677-2325DAD028EF}"/>
+              </a:ext>
+            </a:extLst>
+          </p:cNvPr>
+          <p:cNvSpPr>
+            <a:spLocks noGrp="1"/>
+          </p:cNvSpPr>
+          <p:nvPr>
+            <p:ph type="title"/>
+          </p:nvPr>
+        </p:nvSpPr>
+        <p:spPr>
+          <a:xfrm>
+            <a:off x="804671" y="964692"/>
+            <a:ext cx="5928637" cy="1188720"/>
+          </a:xfrm>
+        </p:spPr>
+        <p:txBody>
+          <a:bodyPr>
+            <a:normAutofit/>
+          </a:bodyPr>
+          <a:lstStyle/>
+          <a:p>
+            <a:r>
+              <a:rPr lang="en-US" dirty="0"/>
+              <a:t>4.b) </a:t>
+            </a:r>
+            <a:r>
+              <a:rPr lang="en-US" dirty="0" err="1"/>
+              <a:t>groupbys</a:t>
+            </a:r>
+            <a:endParaRPr lang="en-US" dirty="0"/>
+          </a:p>
+        </p:txBody>
+      </p:sp>
+      <p:sp>
+        <p:nvSpPr>
+          <p:cNvPr id="3" name="Content Placeholder 2">
+            <a:extLst>
+              <a:ext uri="{FF2B5EF4-FFF2-40B4-BE49-F238E27FC236}">
+                <a16:creationId xmlns:a16="http://schemas.microsoft.com/office/drawing/2014/main" id="{C62E2F2B-CE4C-804E-B2F7-D240146BD9D6}"/>
+              </a:ext>
+            </a:extLst>
+          </p:cNvPr>
+          <p:cNvSpPr>
+            <a:spLocks noGrp="1"/>
+          </p:cNvSpPr>
+          <p:nvPr>
+            <p:ph idx="1"/>
+          </p:nvPr>
+        </p:nvSpPr>
+        <p:spPr>
+          <a:xfrm>
+            <a:off x="804672" y="2638044"/>
+            <a:ext cx="5925312" cy="4084032"/>
+          </a:xfrm>
+        </p:spPr>
+        <p:txBody>
+          <a:bodyPr>
+            <a:normAutofit/>
+          </a:bodyPr>
+          <a:lstStyle/>
+          <a:p>
+            <a:r>
+              <a:rPr lang="en-US" dirty="0"/>
+              <a:t>The data was grouped by date, year, and month to allow aggregation of price(revenue) over time</a:t>
+            </a:r>
+          </a:p>
+          <a:p>
+            <a:r>
+              <a:rPr lang="en-US" dirty="0"/>
+              <a:t>The </a:t>
+            </a:r>
+            <a:r>
+              <a:rPr lang="en-US" dirty="0" err="1"/>
+              <a:t>groupby</a:t>
+            </a:r>
+            <a:r>
+              <a:rPr lang="en-US" dirty="0"/>
+              <a:t> of date was saved as ‘</a:t>
+            </a:r>
+            <a:r>
+              <a:rPr lang="en-US" i="1" dirty="0" err="1"/>
+              <a:t>transactions_date_index.csv</a:t>
+            </a:r>
+            <a:r>
+              <a:rPr lang="en-US" i="1" dirty="0"/>
+              <a:t>’</a:t>
+            </a:r>
+          </a:p>
+          <a:p>
+            <a:r>
+              <a:rPr lang="en-US" dirty="0"/>
+              <a:t>Total revenue company wide (all countries) was visualized per year and month</a:t>
+            </a:r>
+          </a:p>
+          <a:p>
+            <a:r>
+              <a:rPr lang="en-US" dirty="0">
+                <a:solidFill>
+                  <a:srgbClr val="00B0F0"/>
+                </a:solidFill>
+              </a:rPr>
+              <a:t>Takeaways:</a:t>
+            </a:r>
+          </a:p>
+          <a:p>
+            <a:pPr lvl="1"/>
+            <a:r>
+              <a:rPr lang="en-US" dirty="0">
+                <a:solidFill>
+                  <a:srgbClr val="00B0F0"/>
+                </a:solidFill>
+              </a:rPr>
+              <a:t>Most of the revenue came in 2018. The least revenue came in 2017, but expected as only 2 months in 2017</a:t>
+            </a:r>
+          </a:p>
+          <a:p>
+            <a:pPr lvl="1"/>
+            <a:r>
+              <a:rPr lang="en-US" dirty="0">
+                <a:solidFill>
+                  <a:srgbClr val="00B0F0"/>
+                </a:solidFill>
+              </a:rPr>
+              <a:t>Revenue peaked in the run up towards Christmas in 2018</a:t>
+            </a:r>
+          </a:p>
+          <a:p>
+            <a:pPr lvl="1"/>
+            <a:r>
+              <a:rPr lang="en-US" dirty="0">
+                <a:solidFill>
+                  <a:srgbClr val="00B0F0"/>
+                </a:solidFill>
+              </a:rPr>
+              <a:t>Excluding Nov-17, Oct-18, Nov-18 and Dec-18 , monthly revenue for </a:t>
+            </a:r>
+            <a:r>
+              <a:rPr lang="en-US" dirty="0" err="1">
+                <a:solidFill>
+                  <a:srgbClr val="00B0F0"/>
+                </a:solidFill>
+              </a:rPr>
+              <a:t>AAVAiL</a:t>
+            </a:r>
+            <a:r>
+              <a:rPr lang="en-US" dirty="0">
+                <a:solidFill>
+                  <a:srgbClr val="00B0F0"/>
+                </a:solidFill>
+              </a:rPr>
+              <a:t> fluctuates between 100,000 and 275,000</a:t>
+            </a:r>
+          </a:p>
+          <a:p>
+            <a:pPr lvl="1"/>
+            <a:endParaRPr lang="en-US" dirty="0"/>
+          </a:p>
+        </p:txBody>
+      </p:sp>
+      <p:sp>
+        <p:nvSpPr>
+          <p:cNvPr id="34" name="Rectangle 33">
+            <a:extLst>
+              <a:ext uri="{FF2B5EF4-FFF2-40B4-BE49-F238E27FC236}">
+                <a16:creationId xmlns:a16="http://schemas.microsoft.com/office/drawing/2014/main" id="{E3BC0364-4B58-4841-A227-00A6A59E02C6}"/>
+              </a:ext>
+              <a:ext uri="{C183D7F6-B498-43B3-948B-1728B52AA6E4}">
+                <adec:decorative xmlns:adec="http://schemas.microsoft.com/office/drawing/2017/decorative" val="1"/>
+              </a:ext>
+            </a:extLst>
+          </p:cNvPr>
+          <p:cNvSpPr>
+            <a:spLocks noGrp="1" noRot="1" noChangeAspect="1" noMove="1" noResize="1" noEditPoints="1" noAdjustHandles="1" noChangeArrowheads="1" noChangeShapeType="1" noTextEdit="1"/>
+          </p:cNvSpPr>
+          <p:nvPr>
+            <p:extLst>
+              <p:ext uri="{386F3935-93C4-4BCD-93E2-E3B085C9AB24}">
+                <p16:designElem xmlns:p16="http://schemas.microsoft.com/office/powerpoint/2015/main" val="1"/>
+              </p:ext>
+            </p:extLst>
+          </p:nvPr>
+        </p:nvSpPr>
+        <p:spPr>
+          <a:xfrm>
+            <a:off x="7534656" y="-2"/>
+            <a:ext cx="4657344" cy="6858002"/>
+          </a:xfrm>
+          <a:prstGeom prst="rect">
+            <a:avLst/>
+          </a:prstGeom>
+          <a:solidFill>
+            <a:schemeClr val="accent2"/>
+          </a:solidFill>
+          <a:ln>
+            <a:noFill/>
+          </a:ln>
+        </p:spPr>
+        <p:style>
+          <a:lnRef idx="2">
+            <a:schemeClr val="accent1">
+              <a:shade val="50000"/>
+            </a:schemeClr>
+          </a:lnRef>
+          <a:fillRef idx="1">
+            <a:schemeClr val="accent1"/>
+          </a:fillRef>
+          <a:effectRef idx="0">
+            <a:schemeClr val="accent1"/>
+          </a:effectRef>
+          <a:fontRef idx="minor">
+            <a:schemeClr val="lt1"/>
+          </a:fontRef>
+        </p:style>
+        <p:txBody>
+          <a:bodyPr rtlCol="0" anchor="ctr"/>
+          <a:lstStyle/>
+          <a:p>
+            <a:pPr algn="ctr"/>
+            <a:endParaRPr lang="en-US"/>
+          </a:p>
+        </p:txBody>
+      </p:sp>
+      <p:sp>
+        <p:nvSpPr>
+          <p:cNvPr id="36" name="Rectangle 35">
+            <a:extLst>
+              <a:ext uri="{FF2B5EF4-FFF2-40B4-BE49-F238E27FC236}">
+                <a16:creationId xmlns:a16="http://schemas.microsoft.com/office/drawing/2014/main" id="{A029A1F4-D02D-48E4-9331-6870B23B4FAF}"/>
+              </a:ext>
+              <a:ext uri="{C183D7F6-B498-43B3-948B-1728B52AA6E4}">
+                <adec:decorative xmlns:adec="http://schemas.microsoft.com/office/drawing/2017/decorative" val="1"/>
+              </a:ext>
+            </a:extLst>
+          </p:cNvPr>
+          <p:cNvSpPr>
+            <a:spLocks noGrp="1" noRot="1" noChangeAspect="1" noMove="1" noResize="1" noEditPoints="1" noAdjustHandles="1" noChangeArrowheads="1" noChangeShapeType="1" noTextEdit="1"/>
+          </p:cNvSpPr>
+          <p:nvPr>
+            <p:extLst>
+              <p:ext uri="{386F3935-93C4-4BCD-93E2-E3B085C9AB24}">
+                <p16:designElem xmlns:p16="http://schemas.microsoft.com/office/powerpoint/2015/main" val="1"/>
+              </p:ext>
+            </p:extLst>
+          </p:nvPr>
+        </p:nvSpPr>
+        <p:spPr>
+          <a:xfrm>
+            <a:off x="8020813" y="479893"/>
+            <a:ext cx="3685031" cy="5458969"/>
+          </a:xfrm>
+          <a:prstGeom prst="rect">
+            <a:avLst/>
+          </a:prstGeom>
+          <a:noFill/>
+          <a:ln w="31750" cap="sq">
+            <a:solidFill>
+              <a:srgbClr val="FFFFFF"/>
+            </a:solidFill>
+            <a:miter lim="800000"/>
+          </a:ln>
+        </p:spPr>
+        <p:style>
+          <a:lnRef idx="2">
+            <a:schemeClr val="accent1">
+              <a:shade val="50000"/>
+            </a:schemeClr>
+          </a:lnRef>
+          <a:fillRef idx="1">
+            <a:schemeClr val="accent1"/>
+          </a:fillRef>
+          <a:effectRef idx="0">
+            <a:schemeClr val="accent1"/>
+          </a:effectRef>
+          <a:fontRef idx="minor">
+            <a:schemeClr val="lt1"/>
+          </a:fontRef>
+        </p:style>
+        <p:txBody>
+          <a:bodyPr rtlCol="0" anchor="ctr"/>
+          <a:lstStyle/>
+          <a:p>
+            <a:pPr algn="ctr"/>
+            <a:endParaRPr lang="en-US" dirty="0"/>
+          </a:p>
+        </p:txBody>
+      </p:sp>
+      <p:sp>
+        <p:nvSpPr>
+          <p:cNvPr id="38" name="Rectangle 37">
+            <a:extLst>
+              <a:ext uri="{FF2B5EF4-FFF2-40B4-BE49-F238E27FC236}">
+                <a16:creationId xmlns:a16="http://schemas.microsoft.com/office/drawing/2014/main" id="{D06A8CF3-711E-4C63-9DD5-53A2696C0D6F}"/>
+              </a:ext>
+              <a:ext uri="{C183D7F6-B498-43B3-948B-1728B52AA6E4}">
+                <adec:decorative xmlns:adec="http://schemas.microsoft.com/office/drawing/2017/decorative" val="1"/>
+              </a:ext>
+            </a:extLst>
+          </p:cNvPr>
+          <p:cNvSpPr>
+            <a:spLocks noGrp="1" noRot="1" noChangeAspect="1" noMove="1" noResize="1" noEditPoints="1" noAdjustHandles="1" noChangeArrowheads="1" noChangeShapeType="1" noTextEdit="1"/>
+          </p:cNvSpPr>
+          <p:nvPr>
+            <p:extLst>
+              <p:ext uri="{386F3935-93C4-4BCD-93E2-E3B085C9AB24}">
+                <p16:designElem xmlns:p16="http://schemas.microsoft.com/office/powerpoint/2015/main" val="1"/>
+              </p:ext>
+            </p:extLst>
+          </p:nvPr>
+        </p:nvSpPr>
+        <p:spPr>
+          <a:xfrm>
+            <a:off x="8186411" y="644485"/>
+            <a:ext cx="3353835" cy="5129784"/>
+          </a:xfrm>
+          <a:prstGeom prst="rect">
+            <a:avLst/>
+          </a:prstGeom>
+          <a:solidFill>
+            <a:srgbClr val="FFFFFF"/>
+          </a:solidFill>
+          <a:ln>
+            <a:noFill/>
+          </a:ln>
+        </p:spPr>
+        <p:style>
+          <a:lnRef idx="2">
+            <a:schemeClr val="accent1">
+              <a:shade val="50000"/>
+            </a:schemeClr>
+          </a:lnRef>
+          <a:fillRef idx="1">
+            <a:schemeClr val="accent1"/>
+          </a:fillRef>
+          <a:effectRef idx="0">
+            <a:schemeClr val="accent1"/>
+          </a:effectRef>
+          <a:fontRef idx="minor">
+            <a:schemeClr val="lt1"/>
+          </a:fontRef>
+        </p:style>
+        <p:txBody>
+          <a:bodyPr rtlCol="0" anchor="ctr"/>
+          <a:lstStyle/>
+          <a:p>
+            <a:pPr algn="ctr"/>
+            <a:endParaRPr lang="en-US"/>
+          </a:p>
+        </p:txBody>
+      </p:sp>
+      <p:pic>
+        <p:nvPicPr>
+          <p:cNvPr id="7" name="Picture 6" descr="Chart&#10;&#10;Description automatically generated">
+            <a:extLst>
+              <a:ext uri="{FF2B5EF4-FFF2-40B4-BE49-F238E27FC236}">
+                <a16:creationId xmlns:a16="http://schemas.microsoft.com/office/drawing/2014/main" id="{5BF41F1F-27A4-C349-9CAD-65E3990C8161}"/>
+              </a:ext>
+            </a:extLst>
+          </p:cNvPr>
+          <p:cNvPicPr>
+            <a:picLocks noChangeAspect="1"/>
+          </p:cNvPicPr>
+          <p:nvPr/>
+        </p:nvPicPr>
+        <p:blipFill rotWithShape="1">
+          <a:blip r:embed="rId2"/>
+          <a:srcRect l="1823" r="3" b="3"/>
+          <a:stretch/>
+        </p:blipFill>
+        <p:spPr>
+          <a:xfrm>
+            <a:off x="8340435" y="822036"/>
+            <a:ext cx="3026664" cy="2348100"/>
+          </a:xfrm>
+          <a:prstGeom prst="rect">
+            <a:avLst/>
+          </a:prstGeom>
+        </p:spPr>
+      </p:pic>
+      <p:pic>
+        <p:nvPicPr>
+          <p:cNvPr id="5" name="Picture 4" descr="Chart, bar chart&#10;&#10;Description automatically generated">
+            <a:extLst>
+              <a:ext uri="{FF2B5EF4-FFF2-40B4-BE49-F238E27FC236}">
+                <a16:creationId xmlns:a16="http://schemas.microsoft.com/office/drawing/2014/main" id="{EF5B9977-BE54-8D4E-B162-42DDA1AD1202}"/>
+              </a:ext>
+            </a:extLst>
+          </p:cNvPr>
+          <p:cNvPicPr>
+            <a:picLocks noChangeAspect="1"/>
+          </p:cNvPicPr>
+          <p:nvPr/>
+        </p:nvPicPr>
+        <p:blipFill rotWithShape="1">
+          <a:blip r:embed="rId3"/>
+          <a:srcRect r="13021" b="-5"/>
+          <a:stretch/>
+        </p:blipFill>
+        <p:spPr>
+          <a:xfrm>
+            <a:off x="8340435" y="3255097"/>
+            <a:ext cx="3026664" cy="2348100"/>
+          </a:xfrm>
+          <a:prstGeom prst="rect">
+            <a:avLst/>
+          </a:prstGeom>
+        </p:spPr>
+      </p:pic>
+    </p:spTree>
+    <p:extLst>
+      <p:ext uri="{BB962C8B-B14F-4D97-AF65-F5344CB8AC3E}">
+        <p14:creationId xmlns:p14="http://schemas.microsoft.com/office/powerpoint/2010/main" val="2891126201"/>
+      </p:ext>
+    </p:extLst>
+  </p:cSld>
+  <p:clrMapOvr>
+    <a:masterClrMapping/>
+  </p:clrMapOvr>
+</p:sld>
+</file>
+
+<file path=ppt/slides/slide11.xml><?xml version="1.0" encoding="utf-8"?>
+<p:sld xmlns:a="http://schemas.openxmlformats.org/drawingml/2006/main" xmlns:r="http://schemas.openxmlformats.org/officeDocument/2006/relationships" xmlns:p="http://schemas.openxmlformats.org/presentationml/2006/main">
+  <p:cSld>
+    <p:bg>
+      <p:bgPr>
+        <a:solidFill>
+          <a:schemeClr val="bg1">
+            <a:lumMod val="95000"/>
+          </a:schemeClr>
+        </a:solidFill>
+        <a:effectLst/>
+      </p:bgPr>
+    </p:bg>
+    <p:spTree>
+      <p:nvGrpSpPr>
+        <p:cNvPr id="1" name=""/>
+        <p:cNvGrpSpPr/>
+        <p:nvPr/>
+      </p:nvGrpSpPr>
+      <p:grpSpPr>
+        <a:xfrm>
+          <a:off x="0" y="0"/>
+          <a:ext cx="0" cy="0"/>
+          <a:chOff x="0" y="0"/>
+          <a:chExt cx="0" cy="0"/>
+        </a:xfrm>
+      </p:grpSpPr>
+      <p:sp useBgFill="1">
+        <p:nvSpPr>
+          <p:cNvPr id="24" name="Rectangle 23">
+            <a:extLst>
+              <a:ext uri="{FF2B5EF4-FFF2-40B4-BE49-F238E27FC236}">
+                <a16:creationId xmlns:a16="http://schemas.microsoft.com/office/drawing/2014/main" id="{1660E788-AFA9-4A1B-9991-6AA74632A15B}"/>
+              </a:ext>
+              <a:ext uri="{C183D7F6-B498-43B3-948B-1728B52AA6E4}">
+                <adec:decorative xmlns:adec="http://schemas.microsoft.com/office/drawing/2017/decorative" val="1"/>
+              </a:ext>
+            </a:extLst>
+          </p:cNvPr>
+          <p:cNvSpPr>
+            <a:spLocks noGrp="1" noRot="1" noChangeAspect="1" noMove="1" noResize="1" noEditPoints="1" noAdjustHandles="1" noChangeArrowheads="1" noChangeShapeType="1" noTextEdit="1"/>
+          </p:cNvSpPr>
+          <p:nvPr>
+            <p:extLst>
+              <p:ext uri="{386F3935-93C4-4BCD-93E2-E3B085C9AB24}">
+                <p16:designElem xmlns:p16="http://schemas.microsoft.com/office/powerpoint/2015/main" val="1"/>
+              </p:ext>
+            </p:extLst>
+          </p:nvPr>
+        </p:nvSpPr>
+        <p:spPr>
+          <a:xfrm>
+            <a:off x="0" y="0"/>
+            <a:ext cx="12191999" cy="6858000"/>
+          </a:xfrm>
+          <a:prstGeom prst="rect">
+            <a:avLst/>
+          </a:prstGeom>
+          <a:ln>
+            <a:noFill/>
+          </a:ln>
+        </p:spPr>
+        <p:style>
+          <a:lnRef idx="2">
+            <a:schemeClr val="accent1">
+              <a:shade val="50000"/>
+            </a:schemeClr>
+          </a:lnRef>
+          <a:fillRef idx="1">
+            <a:schemeClr val="accent1"/>
+          </a:fillRef>
+          <a:effectRef idx="0">
+            <a:schemeClr val="accent1"/>
+          </a:effectRef>
+          <a:fontRef idx="minor">
+            <a:schemeClr val="lt1"/>
+          </a:fontRef>
+        </p:style>
+        <p:txBody>
+          <a:bodyPr rtlCol="0" anchor="ctr"/>
+          <a:lstStyle/>
+          <a:p>
+            <a:pPr algn="ctr"/>
+            <a:endParaRPr lang="en-US"/>
+          </a:p>
+        </p:txBody>
+      </p:sp>
+      <p:sp>
+        <p:nvSpPr>
+          <p:cNvPr id="26" name="Rectangle 25">
+            <a:extLst>
+              <a:ext uri="{FF2B5EF4-FFF2-40B4-BE49-F238E27FC236}">
+                <a16:creationId xmlns:a16="http://schemas.microsoft.com/office/drawing/2014/main" id="{867D4867-5BA7-4462-B2F6-A23F4A622AA7}"/>
+              </a:ext>
+              <a:ext uri="{C183D7F6-B498-43B3-948B-1728B52AA6E4}">
+                <adec:decorative xmlns:adec="http://schemas.microsoft.com/office/drawing/2017/decorative" val="1"/>
+              </a:ext>
+            </a:extLst>
+          </p:cNvPr>
+          <p:cNvSpPr>
+            <a:spLocks noGrp="1" noRot="1" noChangeAspect="1" noMove="1" noResize="1" noEditPoints="1" noAdjustHandles="1" noChangeArrowheads="1" noChangeShapeType="1" noTextEdit="1"/>
+          </p:cNvSpPr>
+          <p:nvPr>
+            <p:extLst>
+              <p:ext uri="{386F3935-93C4-4BCD-93E2-E3B085C9AB24}">
+                <p16:designElem xmlns:p16="http://schemas.microsoft.com/office/powerpoint/2015/main" val="1"/>
+              </p:ext>
+            </p:extLst>
+          </p:nvPr>
+        </p:nvSpPr>
+        <p:spPr>
+          <a:xfrm>
+            <a:off x="0" y="0"/>
+            <a:ext cx="4654296" cy="6858000"/>
+          </a:xfrm>
+          <a:prstGeom prst="rect">
+            <a:avLst/>
+          </a:prstGeom>
+          <a:solidFill>
+            <a:schemeClr val="tx2"/>
+          </a:solidFill>
+          <a:ln>
+            <a:noFill/>
+          </a:ln>
+        </p:spPr>
+        <p:style>
+          <a:lnRef idx="0">
+            <a:scrgbClr r="0" g="0" b="0"/>
+          </a:lnRef>
+          <a:fillRef idx="0">
+            <a:scrgbClr r="0" g="0" b="0"/>
+          </a:fillRef>
+          <a:effectRef idx="0">
+            <a:scrgbClr r="0" g="0" b="0"/>
+          </a:effectRef>
+          <a:fontRef idx="minor">
+            <a:schemeClr val="lt1"/>
+          </a:fontRef>
+        </p:style>
+        <p:txBody>
+          <a:bodyPr rtlCol="0" anchor="ctr"/>
+          <a:lstStyle/>
+          <a:p>
+            <a:pPr algn="ctr"/>
+            <a:endParaRPr lang="en-US"/>
+          </a:p>
+        </p:txBody>
+      </p:sp>
+      <p:sp>
+        <p:nvSpPr>
+          <p:cNvPr id="2" name="Title 1">
+            <a:extLst>
+              <a:ext uri="{FF2B5EF4-FFF2-40B4-BE49-F238E27FC236}">
+                <a16:creationId xmlns:a16="http://schemas.microsoft.com/office/drawing/2014/main" id="{0CEF4DF6-13E0-2347-A9BD-0E0A8E155D43}"/>
+              </a:ext>
+            </a:extLst>
+          </p:cNvPr>
+          <p:cNvSpPr>
+            <a:spLocks noGrp="1"/>
+          </p:cNvSpPr>
+          <p:nvPr>
+            <p:ph type="title"/>
+          </p:nvPr>
+        </p:nvSpPr>
+        <p:spPr>
+          <a:xfrm>
+            <a:off x="643467" y="643467"/>
+            <a:ext cx="3363974" cy="1728044"/>
+          </a:xfrm>
+          <a:noFill/>
+          <a:ln>
+            <a:solidFill>
+              <a:schemeClr val="bg1"/>
+            </a:solidFill>
+          </a:ln>
+        </p:spPr>
+        <p:txBody>
+          <a:bodyPr wrap="square">
+            <a:normAutofit/>
+          </a:bodyPr>
+          <a:lstStyle/>
+          <a:p>
+            <a:r>
+              <a:rPr lang="en-US">
+                <a:solidFill>
+                  <a:schemeClr val="bg1"/>
+                </a:solidFill>
+              </a:rPr>
+              <a:t>4.b) groupbys cont.</a:t>
+            </a:r>
+          </a:p>
+        </p:txBody>
+      </p:sp>
+      <p:sp>
+        <p:nvSpPr>
+          <p:cNvPr id="3" name="Content Placeholder 2">
+            <a:extLst>
+              <a:ext uri="{FF2B5EF4-FFF2-40B4-BE49-F238E27FC236}">
+                <a16:creationId xmlns:a16="http://schemas.microsoft.com/office/drawing/2014/main" id="{A0FF83F6-BAE3-AC46-A470-4434E8925B31}"/>
+              </a:ext>
+            </a:extLst>
+          </p:cNvPr>
+          <p:cNvSpPr>
+            <a:spLocks noGrp="1"/>
+          </p:cNvSpPr>
+          <p:nvPr>
+            <p:ph idx="1"/>
+          </p:nvPr>
+        </p:nvSpPr>
+        <p:spPr>
+          <a:xfrm>
+            <a:off x="643468" y="2638044"/>
+            <a:ext cx="3363974" cy="4105656"/>
+          </a:xfrm>
+        </p:spPr>
+        <p:txBody>
+          <a:bodyPr>
+            <a:normAutofit fontScale="92500"/>
+          </a:bodyPr>
+          <a:lstStyle/>
+          <a:p>
+            <a:pPr>
+              <a:lnSpc>
+                <a:spcPct val="90000"/>
+              </a:lnSpc>
+            </a:pPr>
+            <a:r>
+              <a:rPr lang="en-US" sz="1000" dirty="0">
+                <a:solidFill>
+                  <a:schemeClr val="bg1"/>
+                </a:solidFill>
+              </a:rPr>
+              <a:t>Data was also grouped by country, to find the top 10 revenue countries as specified in the business opportunity</a:t>
+            </a:r>
+          </a:p>
+          <a:p>
+            <a:pPr>
+              <a:lnSpc>
+                <a:spcPct val="90000"/>
+              </a:lnSpc>
+            </a:pPr>
+            <a:r>
+              <a:rPr lang="en-US" sz="1000" dirty="0">
+                <a:solidFill>
+                  <a:schemeClr val="bg1"/>
+                </a:solidFill>
+              </a:rPr>
+              <a:t>Total revenue per country was calculated and ordered to produce this list of top 10 countries:</a:t>
+            </a:r>
+          </a:p>
+          <a:p>
+            <a:pPr>
+              <a:lnSpc>
+                <a:spcPct val="90000"/>
+              </a:lnSpc>
+            </a:pPr>
+            <a:r>
+              <a:rPr lang="en-GB" sz="1000" dirty="0">
+                <a:solidFill>
+                  <a:schemeClr val="bg1"/>
+                </a:solidFill>
+              </a:rPr>
+              <a:t>United Kingdom 3521513.51</a:t>
+            </a:r>
+          </a:p>
+          <a:p>
+            <a:pPr>
+              <a:lnSpc>
+                <a:spcPct val="90000"/>
+              </a:lnSpc>
+            </a:pPr>
+            <a:r>
+              <a:rPr lang="en-GB" sz="1000" dirty="0">
+                <a:solidFill>
+                  <a:schemeClr val="bg1"/>
+                </a:solidFill>
+              </a:rPr>
+              <a:t>EIRE 107069.21</a:t>
+            </a:r>
+          </a:p>
+          <a:p>
+            <a:pPr>
+              <a:lnSpc>
+                <a:spcPct val="90000"/>
+              </a:lnSpc>
+            </a:pPr>
+            <a:r>
+              <a:rPr lang="en-GB" sz="1000" dirty="0">
+                <a:solidFill>
+                  <a:schemeClr val="bg1"/>
+                </a:solidFill>
+              </a:rPr>
+              <a:t>Germany 49271.82</a:t>
+            </a:r>
+          </a:p>
+          <a:p>
+            <a:pPr>
+              <a:lnSpc>
+                <a:spcPct val="90000"/>
+              </a:lnSpc>
+            </a:pPr>
+            <a:r>
+              <a:rPr lang="en-GB" sz="1000" dirty="0">
+                <a:solidFill>
+                  <a:schemeClr val="bg1"/>
+                </a:solidFill>
+              </a:rPr>
+              <a:t>France 40565.14</a:t>
+            </a:r>
+          </a:p>
+          <a:p>
+            <a:pPr>
+              <a:lnSpc>
+                <a:spcPct val="90000"/>
+              </a:lnSpc>
+            </a:pPr>
+            <a:r>
+              <a:rPr lang="en-GB" sz="1000" dirty="0">
+                <a:solidFill>
+                  <a:schemeClr val="bg1"/>
+                </a:solidFill>
+              </a:rPr>
+              <a:t>Norway 38494.75</a:t>
+            </a:r>
+          </a:p>
+          <a:p>
+            <a:pPr>
+              <a:lnSpc>
+                <a:spcPct val="90000"/>
+              </a:lnSpc>
+            </a:pPr>
+            <a:r>
+              <a:rPr lang="en-GB" sz="1000" dirty="0">
+                <a:solidFill>
+                  <a:schemeClr val="bg1"/>
+                </a:solidFill>
+              </a:rPr>
+              <a:t>Spain 16040.99</a:t>
+            </a:r>
+          </a:p>
+          <a:p>
+            <a:pPr>
+              <a:lnSpc>
+                <a:spcPct val="90000"/>
+              </a:lnSpc>
+            </a:pPr>
+            <a:r>
+              <a:rPr lang="en-GB" sz="1000" dirty="0">
+                <a:solidFill>
+                  <a:schemeClr val="bg1"/>
+                </a:solidFill>
+              </a:rPr>
+              <a:t>Hong Kong 14452.57</a:t>
+            </a:r>
+          </a:p>
+          <a:p>
+            <a:pPr>
+              <a:lnSpc>
+                <a:spcPct val="90000"/>
+              </a:lnSpc>
+            </a:pPr>
+            <a:r>
+              <a:rPr lang="en-GB" sz="1000" dirty="0">
+                <a:solidFill>
+                  <a:schemeClr val="bg1"/>
+                </a:solidFill>
+              </a:rPr>
+              <a:t>Portugal 13528.6</a:t>
+            </a:r>
+          </a:p>
+          <a:p>
+            <a:pPr>
+              <a:lnSpc>
+                <a:spcPct val="90000"/>
+              </a:lnSpc>
+            </a:pPr>
+            <a:r>
+              <a:rPr lang="en-GB" sz="1000" dirty="0">
+                <a:solidFill>
+                  <a:schemeClr val="bg1"/>
+                </a:solidFill>
+              </a:rPr>
+              <a:t> Singapore 13175.92</a:t>
+            </a:r>
+          </a:p>
+          <a:p>
+            <a:pPr>
+              <a:lnSpc>
+                <a:spcPct val="90000"/>
+              </a:lnSpc>
+            </a:pPr>
+            <a:r>
+              <a:rPr lang="en-GB" sz="1000" dirty="0">
+                <a:solidFill>
+                  <a:schemeClr val="bg1"/>
+                </a:solidFill>
+              </a:rPr>
+              <a:t>Netherlands 12322.80</a:t>
+            </a:r>
+          </a:p>
+          <a:p>
+            <a:pPr>
+              <a:lnSpc>
+                <a:spcPct val="90000"/>
+              </a:lnSpc>
+            </a:pPr>
+            <a:r>
+              <a:rPr lang="en-GB" sz="1000" dirty="0">
+                <a:solidFill>
+                  <a:schemeClr val="bg1"/>
+                </a:solidFill>
+              </a:rPr>
+              <a:t>Revenue per country was visualised twice, excluding UK the second time</a:t>
+            </a:r>
+          </a:p>
+          <a:p>
+            <a:pPr>
+              <a:lnSpc>
+                <a:spcPct val="90000"/>
+              </a:lnSpc>
+            </a:pPr>
+            <a:r>
+              <a:rPr lang="en-GB" sz="1000" dirty="0">
+                <a:solidFill>
+                  <a:srgbClr val="00B0F0"/>
+                </a:solidFill>
+              </a:rPr>
+              <a:t>Takeaway: UK has 32 times the total revenue than second highest Ireland (“EIRE”). Ireland has roughly double revenue of third place country Germany</a:t>
+            </a:r>
+            <a:endParaRPr lang="en-US" sz="1000" dirty="0">
+              <a:solidFill>
+                <a:srgbClr val="00B0F0"/>
+              </a:solidFill>
+            </a:endParaRPr>
+          </a:p>
+        </p:txBody>
+      </p:sp>
+      <p:pic>
+        <p:nvPicPr>
+          <p:cNvPr id="5" name="Picture 4" descr="A picture containing icon&#10;&#10;Description automatically generated">
+            <a:extLst>
+              <a:ext uri="{FF2B5EF4-FFF2-40B4-BE49-F238E27FC236}">
+                <a16:creationId xmlns:a16="http://schemas.microsoft.com/office/drawing/2014/main" id="{7D0D7957-B49D-D440-82BE-B86C73F6BE5F}"/>
+              </a:ext>
+            </a:extLst>
+          </p:cNvPr>
+          <p:cNvPicPr>
+            <a:picLocks noChangeAspect="1"/>
+          </p:cNvPicPr>
+          <p:nvPr/>
+        </p:nvPicPr>
+        <p:blipFill rotWithShape="1">
+          <a:blip r:embed="rId2"/>
+          <a:srcRect r="49211"/>
+          <a:stretch/>
+        </p:blipFill>
+        <p:spPr>
+          <a:xfrm>
+            <a:off x="4869038" y="200025"/>
+            <a:ext cx="7206900" cy="3121750"/>
+          </a:xfrm>
+          <a:prstGeom prst="rect">
+            <a:avLst/>
+          </a:prstGeom>
+        </p:spPr>
+      </p:pic>
+      <p:pic>
+        <p:nvPicPr>
+          <p:cNvPr id="18" name="Picture 17" descr="A picture containing icon&#10;&#10;Description automatically generated">
+            <a:extLst>
+              <a:ext uri="{FF2B5EF4-FFF2-40B4-BE49-F238E27FC236}">
+                <a16:creationId xmlns:a16="http://schemas.microsoft.com/office/drawing/2014/main" id="{47859D11-1CCA-BF46-A317-5CE3CD4B2D2A}"/>
+              </a:ext>
+            </a:extLst>
+          </p:cNvPr>
+          <p:cNvPicPr>
+            <a:picLocks noChangeAspect="1"/>
+          </p:cNvPicPr>
+          <p:nvPr/>
+        </p:nvPicPr>
+        <p:blipFill rotWithShape="1">
+          <a:blip r:embed="rId2"/>
+          <a:srcRect l="50789"/>
+          <a:stretch/>
+        </p:blipFill>
+        <p:spPr>
+          <a:xfrm>
+            <a:off x="4869038" y="3521800"/>
+            <a:ext cx="7206904" cy="3221900"/>
+          </a:xfrm>
+          <a:prstGeom prst="rect">
+            <a:avLst/>
+          </a:prstGeom>
+        </p:spPr>
+      </p:pic>
+    </p:spTree>
+    <p:extLst>
+      <p:ext uri="{BB962C8B-B14F-4D97-AF65-F5344CB8AC3E}">
+        <p14:creationId xmlns:p14="http://schemas.microsoft.com/office/powerpoint/2010/main" val="3970431000"/>
+      </p:ext>
+    </p:extLst>
+  </p:cSld>
+  <p:clrMapOvr>
+    <a:masterClrMapping/>
+  </p:clrMapOvr>
+</p:sld>
+</file>
+
+<file path=ppt/slides/slide12.xml><?xml version="1.0" encoding="utf-8"?>
+<p:sld xmlns:a="http://schemas.openxmlformats.org/drawingml/2006/main" xmlns:r="http://schemas.openxmlformats.org/officeDocument/2006/relationships" xmlns:p="http://schemas.openxmlformats.org/presentationml/2006/main">
+  <p:cSld>
+    <p:bg>
+      <p:bgPr>
+        <a:solidFill>
+          <a:schemeClr val="bg1">
+            <a:lumMod val="95000"/>
+          </a:schemeClr>
+        </a:solidFill>
+        <a:effectLst/>
+      </p:bgPr>
+    </p:bg>
+    <p:spTree>
+      <p:nvGrpSpPr>
+        <p:cNvPr id="1" name=""/>
+        <p:cNvGrpSpPr/>
+        <p:nvPr/>
+      </p:nvGrpSpPr>
+      <p:grpSpPr>
+        <a:xfrm>
+          <a:off x="0" y="0"/>
+          <a:ext cx="0" cy="0"/>
+          <a:chOff x="0" y="0"/>
+          <a:chExt cx="0" cy="0"/>
+        </a:xfrm>
+      </p:grpSpPr>
+      <p:sp>
+        <p:nvSpPr>
+          <p:cNvPr id="2" name="Title 1">
+            <a:extLst>
+              <a:ext uri="{FF2B5EF4-FFF2-40B4-BE49-F238E27FC236}">
+                <a16:creationId xmlns:a16="http://schemas.microsoft.com/office/drawing/2014/main" id="{576C6892-5781-9B44-89C4-15592A554296}"/>
+              </a:ext>
+            </a:extLst>
+          </p:cNvPr>
+          <p:cNvSpPr>
+            <a:spLocks noGrp="1"/>
+          </p:cNvSpPr>
+          <p:nvPr>
+            <p:ph type="title"/>
+          </p:nvPr>
+        </p:nvSpPr>
+        <p:spPr>
+          <a:xfrm>
+            <a:off x="804672" y="964692"/>
+            <a:ext cx="3066937" cy="1188720"/>
+          </a:xfrm>
+        </p:spPr>
+        <p:txBody>
+          <a:bodyPr>
+            <a:normAutofit/>
+          </a:bodyPr>
+          <a:lstStyle/>
+          <a:p>
+            <a:r>
+              <a:rPr lang="en-US" sz="2600"/>
+              <a:t>4.b) </a:t>
+            </a:r>
+            <a:r>
+              <a:rPr lang="en-US" sz="2600" err="1"/>
+              <a:t>groupbys</a:t>
+            </a:r>
+            <a:r>
+              <a:rPr lang="en-US" sz="2600"/>
+              <a:t> cont.</a:t>
+            </a:r>
+          </a:p>
+        </p:txBody>
+      </p:sp>
+      <p:sp>
+        <p:nvSpPr>
+          <p:cNvPr id="3" name="Content Placeholder 2">
+            <a:extLst>
+              <a:ext uri="{FF2B5EF4-FFF2-40B4-BE49-F238E27FC236}">
+                <a16:creationId xmlns:a16="http://schemas.microsoft.com/office/drawing/2014/main" id="{9C6FE584-3FD0-B348-A608-012DBC7AF36A}"/>
+              </a:ext>
+            </a:extLst>
+          </p:cNvPr>
+          <p:cNvSpPr>
+            <a:spLocks noGrp="1"/>
+          </p:cNvSpPr>
+          <p:nvPr>
+            <p:ph idx="1"/>
+          </p:nvPr>
+        </p:nvSpPr>
+        <p:spPr>
+          <a:xfrm>
+            <a:off x="803244" y="2638044"/>
+            <a:ext cx="3063765" cy="3263206"/>
+          </a:xfrm>
+        </p:spPr>
+        <p:txBody>
+          <a:bodyPr>
+            <a:normAutofit/>
+          </a:bodyPr>
+          <a:lstStyle/>
+          <a:p>
+            <a:r>
+              <a:rPr lang="en-US" dirty="0"/>
+              <a:t>Data for these top 10 countries was grouped by country again, and indexed on month, to provide the monthly revenue totals per country.</a:t>
+            </a:r>
+          </a:p>
+          <a:p>
+            <a:r>
+              <a:rPr lang="en-US" dirty="0"/>
+              <a:t>This was saved as </a:t>
+            </a:r>
+            <a:r>
+              <a:rPr lang="en-US" i="1" dirty="0"/>
+              <a:t>‘monthly_revenue_totals_per_top10_country.csv’</a:t>
+            </a:r>
+          </a:p>
+          <a:p>
+            <a:endParaRPr lang="en-US" dirty="0"/>
+          </a:p>
+        </p:txBody>
+      </p:sp>
+      <p:sp>
+        <p:nvSpPr>
+          <p:cNvPr id="10" name="Rectangle 9">
+            <a:extLst>
+              <a:ext uri="{FF2B5EF4-FFF2-40B4-BE49-F238E27FC236}">
+                <a16:creationId xmlns:a16="http://schemas.microsoft.com/office/drawing/2014/main" id="{6515FC82-3453-4CBE-8895-4CCFF339529E}"/>
+              </a:ext>
+              <a:ext uri="{C183D7F6-B498-43B3-948B-1728B52AA6E4}">
+                <adec:decorative xmlns:adec="http://schemas.microsoft.com/office/drawing/2017/decorative" val="1"/>
+              </a:ext>
+            </a:extLst>
+          </p:cNvPr>
+          <p:cNvSpPr>
+            <a:spLocks noGrp="1" noRot="1" noChangeAspect="1" noMove="1" noResize="1" noEditPoints="1" noAdjustHandles="1" noChangeArrowheads="1" noChangeShapeType="1" noTextEdit="1"/>
+          </p:cNvSpPr>
+          <p:nvPr>
+            <p:extLst>
+              <p:ext uri="{386F3935-93C4-4BCD-93E2-E3B085C9AB24}">
+                <p16:designElem xmlns:p16="http://schemas.microsoft.com/office/powerpoint/2015/main" val="1"/>
+              </p:ext>
+            </p:extLst>
+          </p:nvPr>
+        </p:nvSpPr>
+        <p:spPr>
+          <a:xfrm>
+            <a:off x="4494182" y="964692"/>
+            <a:ext cx="6885432" cy="4936558"/>
+          </a:xfrm>
+          <a:prstGeom prst="rect">
+            <a:avLst/>
+          </a:prstGeom>
+          <a:noFill/>
+          <a:ln w="31750" cap="sq">
+            <a:solidFill>
+              <a:srgbClr val="FFFFFF"/>
+            </a:solidFill>
+            <a:miter lim="800000"/>
+          </a:ln>
+        </p:spPr>
+        <p:style>
+          <a:lnRef idx="2">
+            <a:schemeClr val="accent1">
+              <a:shade val="50000"/>
+            </a:schemeClr>
+          </a:lnRef>
+          <a:fillRef idx="1">
+            <a:schemeClr val="accent1"/>
+          </a:fillRef>
+          <a:effectRef idx="0">
+            <a:schemeClr val="accent1"/>
+          </a:effectRef>
+          <a:fontRef idx="minor">
+            <a:schemeClr val="lt1"/>
+          </a:fontRef>
+        </p:style>
+        <p:txBody>
+          <a:bodyPr rtlCol="0" anchor="ctr"/>
+          <a:lstStyle/>
+          <a:p>
+            <a:pPr algn="ctr"/>
+            <a:endParaRPr lang="en-US" dirty="0"/>
+          </a:p>
+        </p:txBody>
+      </p:sp>
+      <p:sp>
+        <p:nvSpPr>
+          <p:cNvPr id="12" name="Rectangle 11">
+            <a:extLst>
+              <a:ext uri="{FF2B5EF4-FFF2-40B4-BE49-F238E27FC236}">
+                <a16:creationId xmlns:a16="http://schemas.microsoft.com/office/drawing/2014/main" id="{C5FD847B-65C0-4027-8DFC-70CB424514F8}"/>
+              </a:ext>
+              <a:ext uri="{C183D7F6-B498-43B3-948B-1728B52AA6E4}">
+                <adec:decorative xmlns:adec="http://schemas.microsoft.com/office/drawing/2017/decorative" val="1"/>
+              </a:ext>
+            </a:extLst>
+          </p:cNvPr>
+          <p:cNvSpPr>
+            <a:spLocks noGrp="1" noRot="1" noChangeAspect="1" noMove="1" noResize="1" noEditPoints="1" noAdjustHandles="1" noChangeArrowheads="1" noChangeShapeType="1" noTextEdit="1"/>
+          </p:cNvSpPr>
+          <p:nvPr>
+            <p:extLst>
+              <p:ext uri="{386F3935-93C4-4BCD-93E2-E3B085C9AB24}">
+                <p16:designElem xmlns:p16="http://schemas.microsoft.com/office/powerpoint/2015/main" val="1"/>
+              </p:ext>
+            </p:extLst>
+          </p:nvPr>
+        </p:nvSpPr>
+        <p:spPr>
+          <a:xfrm>
+            <a:off x="4657802" y="1128683"/>
+            <a:ext cx="6558192" cy="4608576"/>
+          </a:xfrm>
+          <a:prstGeom prst="rect">
+            <a:avLst/>
+          </a:prstGeom>
+          <a:solidFill>
+            <a:srgbClr val="FFFFFF"/>
+          </a:solidFill>
+          <a:ln>
+            <a:noFill/>
+          </a:ln>
+        </p:spPr>
+        <p:style>
+          <a:lnRef idx="2">
+            <a:schemeClr val="accent1">
+              <a:shade val="50000"/>
+            </a:schemeClr>
+          </a:lnRef>
+          <a:fillRef idx="1">
+            <a:schemeClr val="accent1"/>
+          </a:fillRef>
+          <a:effectRef idx="0">
+            <a:schemeClr val="accent1"/>
+          </a:effectRef>
+          <a:fontRef idx="minor">
+            <a:schemeClr val="lt1"/>
+          </a:fontRef>
+        </p:style>
+        <p:txBody>
+          <a:bodyPr rtlCol="0" anchor="ctr"/>
+          <a:lstStyle/>
+          <a:p>
+            <a:pPr algn="ctr"/>
+            <a:endParaRPr lang="en-US"/>
+          </a:p>
+        </p:txBody>
+      </p:sp>
+      <p:pic>
+        <p:nvPicPr>
+          <p:cNvPr id="5" name="Picture 4" descr="Table&#10;&#10;Description automatically generated">
+            <a:extLst>
+              <a:ext uri="{FF2B5EF4-FFF2-40B4-BE49-F238E27FC236}">
+                <a16:creationId xmlns:a16="http://schemas.microsoft.com/office/drawing/2014/main" id="{C7AAB5C0-214E-E041-880D-03FBA45275BD}"/>
+              </a:ext>
+            </a:extLst>
+          </p:cNvPr>
+          <p:cNvPicPr>
+            <a:picLocks noChangeAspect="1"/>
+          </p:cNvPicPr>
+          <p:nvPr/>
+        </p:nvPicPr>
+        <p:blipFill>
+          <a:blip r:embed="rId2"/>
+          <a:stretch>
+            <a:fillRect/>
+          </a:stretch>
+        </p:blipFill>
+        <p:spPr>
+          <a:xfrm>
+            <a:off x="5270610" y="1293275"/>
+            <a:ext cx="5332576" cy="4279392"/>
+          </a:xfrm>
+          <a:prstGeom prst="rect">
+            <a:avLst/>
+          </a:prstGeom>
+        </p:spPr>
+      </p:pic>
+    </p:spTree>
+    <p:extLst>
+      <p:ext uri="{BB962C8B-B14F-4D97-AF65-F5344CB8AC3E}">
+        <p14:creationId xmlns:p14="http://schemas.microsoft.com/office/powerpoint/2010/main" val="2906211559"/>
+      </p:ext>
+    </p:extLst>
+  </p:cSld>
+  <p:clrMapOvr>
+    <a:masterClrMapping/>
+  </p:clrMapOvr>
+</p:sld>
+</file>
+
+<file path=ppt/slides/slide13.xml><?xml version="1.0" encoding="utf-8"?>
+<p:sld xmlns:a="http://schemas.openxmlformats.org/drawingml/2006/main" xmlns:r="http://schemas.openxmlformats.org/officeDocument/2006/relationships" xmlns:p="http://schemas.openxmlformats.org/presentationml/2006/main">
+  <p:cSld>
+    <p:bg>
+      <p:bgPr>
+        <a:solidFill>
+          <a:schemeClr val="bg1"/>
+        </a:solidFill>
+        <a:effectLst/>
+      </p:bgPr>
+    </p:bg>
+    <p:spTree>
+      <p:nvGrpSpPr>
+        <p:cNvPr id="1" name=""/>
+        <p:cNvGrpSpPr/>
+        <p:nvPr/>
+      </p:nvGrpSpPr>
+      <p:grpSpPr>
+        <a:xfrm>
+          <a:off x="0" y="0"/>
+          <a:ext cx="0" cy="0"/>
+          <a:chOff x="0" y="0"/>
+          <a:chExt cx="0" cy="0"/>
+        </a:xfrm>
+      </p:grpSpPr>
+      <p:sp useBgFill="1">
+        <p:nvSpPr>
+          <p:cNvPr id="10" name="Rectangle 9">
+            <a:extLst>
+              <a:ext uri="{FF2B5EF4-FFF2-40B4-BE49-F238E27FC236}">
+                <a16:creationId xmlns:a16="http://schemas.microsoft.com/office/drawing/2014/main" id="{EC7FF834-B204-4967-8D47-8BB36EAF0EF5}"/>
+              </a:ext>
+              <a:ext uri="{C183D7F6-B498-43B3-948B-1728B52AA6E4}">
+                <adec:decorative xmlns:adec="http://schemas.microsoft.com/office/drawing/2017/decorative" val="1"/>
+              </a:ext>
+            </a:extLst>
+          </p:cNvPr>
+          <p:cNvSpPr>
+            <a:spLocks noGrp="1" noRot="1" noChangeAspect="1" noMove="1" noResize="1" noEditPoints="1" noAdjustHandles="1" noChangeArrowheads="1" noChangeShapeType="1" noTextEdit="1"/>
+          </p:cNvSpPr>
+          <p:nvPr>
+            <p:extLst>
+              <p:ext uri="{386F3935-93C4-4BCD-93E2-E3B085C9AB24}">
+                <p16:designElem xmlns:p16="http://schemas.microsoft.com/office/powerpoint/2015/main" val="1"/>
+              </p:ext>
+            </p:extLst>
+          </p:nvPr>
+        </p:nvSpPr>
+        <p:spPr>
+          <a:xfrm>
+            <a:off x="0" y="-2"/>
+            <a:ext cx="12192000" cy="6858002"/>
+          </a:xfrm>
+          <a:prstGeom prst="rect">
+            <a:avLst/>
+          </a:prstGeom>
+          <a:ln>
+            <a:noFill/>
+          </a:ln>
+        </p:spPr>
+        <p:style>
+          <a:lnRef idx="2">
+            <a:schemeClr val="accent1">
+              <a:shade val="50000"/>
+            </a:schemeClr>
+          </a:lnRef>
+          <a:fillRef idx="1">
+            <a:schemeClr val="accent1"/>
+          </a:fillRef>
+          <a:effectRef idx="0">
+            <a:schemeClr val="accent1"/>
+          </a:effectRef>
+          <a:fontRef idx="minor">
+            <a:schemeClr val="lt1"/>
+          </a:fontRef>
+        </p:style>
+        <p:txBody>
+          <a:bodyPr rtlCol="0" anchor="ctr"/>
+          <a:lstStyle/>
+          <a:p>
+            <a:pPr algn="ctr"/>
+            <a:endParaRPr lang="en-US"/>
+          </a:p>
+        </p:txBody>
+      </p:sp>
+      <p:sp>
+        <p:nvSpPr>
+          <p:cNvPr id="12" name="Rectangle 11">
+            <a:extLst>
+              <a:ext uri="{FF2B5EF4-FFF2-40B4-BE49-F238E27FC236}">
+                <a16:creationId xmlns:a16="http://schemas.microsoft.com/office/drawing/2014/main" id="{F780A22D-61EA-43E3-BD94-3E39CF902160}"/>
+              </a:ext>
+              <a:ext uri="{C183D7F6-B498-43B3-948B-1728B52AA6E4}">
+                <adec:decorative xmlns:adec="http://schemas.microsoft.com/office/drawing/2017/decorative" val="1"/>
+              </a:ext>
+            </a:extLst>
+          </p:cNvPr>
+          <p:cNvSpPr>
+            <a:spLocks noGrp="1" noRot="1" noChangeAspect="1" noMove="1" noResize="1" noEditPoints="1" noAdjustHandles="1" noChangeArrowheads="1" noChangeShapeType="1" noTextEdit="1"/>
+          </p:cNvSpPr>
+          <p:nvPr>
+            <p:extLst>
+              <p:ext uri="{386F3935-93C4-4BCD-93E2-E3B085C9AB24}">
+                <p16:designElem xmlns:p16="http://schemas.microsoft.com/office/powerpoint/2015/main" val="1"/>
+              </p:ext>
+            </p:extLst>
+          </p:nvPr>
+        </p:nvSpPr>
+        <p:spPr>
+          <a:xfrm>
+            <a:off x="0" y="4918509"/>
+            <a:ext cx="12192000" cy="1939491"/>
+          </a:xfrm>
+          <a:prstGeom prst="rect">
+            <a:avLst/>
+          </a:prstGeom>
+          <a:solidFill>
+            <a:schemeClr val="accent2"/>
+          </a:solidFill>
+          <a:ln>
+            <a:noFill/>
+          </a:ln>
+        </p:spPr>
+        <p:style>
+          <a:lnRef idx="2">
+            <a:schemeClr val="accent1">
+              <a:shade val="50000"/>
+            </a:schemeClr>
+          </a:lnRef>
+          <a:fillRef idx="1">
+            <a:schemeClr val="accent1"/>
+          </a:fillRef>
+          <a:effectRef idx="0">
+            <a:schemeClr val="accent1"/>
+          </a:effectRef>
+          <a:fontRef idx="minor">
+            <a:schemeClr val="lt1"/>
+          </a:fontRef>
+        </p:style>
+        <p:txBody>
+          <a:bodyPr rtlCol="0" anchor="ctr"/>
+          <a:lstStyle/>
+          <a:p>
+            <a:pPr algn="ctr"/>
+            <a:endParaRPr lang="en-US"/>
+          </a:p>
+        </p:txBody>
+      </p:sp>
+      <p:sp>
+        <p:nvSpPr>
+          <p:cNvPr id="2" name="Title 1">
+            <a:extLst>
+              <a:ext uri="{FF2B5EF4-FFF2-40B4-BE49-F238E27FC236}">
+                <a16:creationId xmlns:a16="http://schemas.microsoft.com/office/drawing/2014/main" id="{F90C33B1-E1A1-6042-B0B7-90D937D74879}"/>
+              </a:ext>
+            </a:extLst>
+          </p:cNvPr>
+          <p:cNvSpPr>
+            <a:spLocks noGrp="1"/>
+          </p:cNvSpPr>
+          <p:nvPr>
+            <p:ph type="title"/>
+          </p:nvPr>
+        </p:nvSpPr>
+        <p:spPr>
+          <a:xfrm>
+            <a:off x="1600200" y="4269282"/>
+            <a:ext cx="8991600" cy="1264762"/>
+          </a:xfrm>
+        </p:spPr>
+        <p:txBody>
+          <a:bodyPr vert="horz" lIns="274320" tIns="182880" rIns="274320" bIns="182880" rtlCol="0" anchor="ctr" anchorCtr="1">
+            <a:normAutofit/>
+          </a:bodyPr>
+          <a:lstStyle/>
+          <a:p>
+            <a:r>
+              <a:rPr lang="en-US" sz="3200" dirty="0"/>
+              <a:t>4.c) top 10 countries revenue per month </a:t>
+            </a:r>
+            <a:r>
+              <a:rPr lang="en-US" sz="3200" dirty="0" err="1"/>
+              <a:t>visualised</a:t>
+            </a:r>
+            <a:endParaRPr lang="en-US" sz="3200" dirty="0"/>
+          </a:p>
+        </p:txBody>
+      </p:sp>
+      <p:pic>
+        <p:nvPicPr>
+          <p:cNvPr id="5" name="Content Placeholder 4" descr="A picture containing graphical user interface&#10;&#10;Description automatically generated">
+            <a:extLst>
+              <a:ext uri="{FF2B5EF4-FFF2-40B4-BE49-F238E27FC236}">
+                <a16:creationId xmlns:a16="http://schemas.microsoft.com/office/drawing/2014/main" id="{1A04AB9D-7DF3-1D41-A7A1-3EAC4EE888DA}"/>
+              </a:ext>
+            </a:extLst>
+          </p:cNvPr>
+          <p:cNvPicPr>
+            <a:picLocks noGrp="1" noChangeAspect="1"/>
+          </p:cNvPicPr>
+          <p:nvPr>
+            <p:ph idx="1"/>
+          </p:nvPr>
+        </p:nvPicPr>
+        <p:blipFill>
+          <a:blip r:embed="rId2"/>
+          <a:stretch>
+            <a:fillRect/>
+          </a:stretch>
+        </p:blipFill>
+        <p:spPr>
+          <a:xfrm>
+            <a:off x="106988" y="442913"/>
+            <a:ext cx="11671893" cy="3472387"/>
+          </a:xfrm>
+          <a:prstGeom prst="rect">
+            <a:avLst/>
+          </a:prstGeom>
+        </p:spPr>
+      </p:pic>
+      <p:sp>
+        <p:nvSpPr>
+          <p:cNvPr id="6" name="TextBox 5">
+            <a:extLst>
+              <a:ext uri="{FF2B5EF4-FFF2-40B4-BE49-F238E27FC236}">
+                <a16:creationId xmlns:a16="http://schemas.microsoft.com/office/drawing/2014/main" id="{C49D5BC5-DE4F-1441-BCE0-800C2886439F}"/>
+              </a:ext>
+            </a:extLst>
+          </p:cNvPr>
+          <p:cNvSpPr txBox="1"/>
+          <p:nvPr/>
+        </p:nvSpPr>
+        <p:spPr>
+          <a:xfrm>
+            <a:off x="106988" y="5700713"/>
+            <a:ext cx="12085012" cy="1384995"/>
+          </a:xfrm>
+          <a:prstGeom prst="rect">
+            <a:avLst/>
+          </a:prstGeom>
+          <a:noFill/>
+        </p:spPr>
+        <p:txBody>
+          <a:bodyPr wrap="square" rtlCol="0">
+            <a:spAutoFit/>
+          </a:bodyPr>
+          <a:lstStyle/>
+          <a:p>
+            <a:r>
+              <a:rPr lang="en-US" sz="1400" dirty="0">
+                <a:solidFill>
+                  <a:schemeClr val="bg1"/>
+                </a:solidFill>
+              </a:rPr>
+              <a:t>This table was used to visualize revenues per top 10 countries over time as a time series/line graph.</a:t>
+            </a:r>
+          </a:p>
+          <a:p>
+            <a:r>
+              <a:rPr lang="en-US" sz="1400" dirty="0">
+                <a:solidFill>
+                  <a:srgbClr val="FFFF00"/>
+                </a:solidFill>
+              </a:rPr>
+              <a:t>Takeaways: Revenue for the UK peaks yearly around Christmas, and is between 100k and 250k outside of Christmas . This clearly shows month on month, the UK is the biggest market for </a:t>
+            </a:r>
+            <a:r>
+              <a:rPr lang="en-US" sz="1400" dirty="0" err="1">
+                <a:solidFill>
+                  <a:srgbClr val="FFFF00"/>
+                </a:solidFill>
+              </a:rPr>
+              <a:t>AAVAiL</a:t>
+            </a:r>
+            <a:r>
+              <a:rPr lang="en-US" sz="1400" dirty="0">
+                <a:solidFill>
+                  <a:srgbClr val="FFFF00"/>
+                </a:solidFill>
+              </a:rPr>
+              <a:t>. </a:t>
+            </a:r>
+          </a:p>
+          <a:p>
+            <a:r>
+              <a:rPr lang="en-US" sz="1400" dirty="0">
+                <a:solidFill>
+                  <a:srgbClr val="FFFF00"/>
+                </a:solidFill>
+              </a:rPr>
+              <a:t>Ireland’s revenue also peaks in December in 2017 &amp; 2018. There are further spikes in March 2019 and June 2019, but outside of these peaks, stays below 5k / month.</a:t>
+            </a:r>
+          </a:p>
+          <a:p>
+            <a:r>
+              <a:rPr lang="en-US" sz="1400" dirty="0">
+                <a:solidFill>
+                  <a:srgbClr val="FFFF00"/>
+                </a:solidFill>
+              </a:rPr>
+              <a:t>Revenue for the other 8 countries doesn’t vary much and generally, stays below 5k a month.</a:t>
+            </a:r>
+          </a:p>
+          <a:p>
+            <a:endParaRPr lang="en-US" sz="1400" dirty="0">
+              <a:solidFill>
+                <a:schemeClr val="bg1"/>
+              </a:solidFill>
+            </a:endParaRPr>
+          </a:p>
+        </p:txBody>
+      </p:sp>
+    </p:spTree>
+    <p:extLst>
+      <p:ext uri="{BB962C8B-B14F-4D97-AF65-F5344CB8AC3E}">
+        <p14:creationId xmlns:p14="http://schemas.microsoft.com/office/powerpoint/2010/main" val="2516270612"/>
+      </p:ext>
+    </p:extLst>
+  </p:cSld>
+  <p:clrMapOvr>
+    <a:masterClrMapping/>
+  </p:clrMapOvr>
+</p:sld>
+</file>
+
+<file path=ppt/slides/slide14.xml><?xml version="1.0" encoding="utf-8"?>
+<p:sld xmlns:a="http://schemas.openxmlformats.org/drawingml/2006/main" xmlns:r="http://schemas.openxmlformats.org/officeDocument/2006/relationships" xmlns:p="http://schemas.openxmlformats.org/presentationml/2006/main">
+  <p:cSld>
+    <p:bg>
+      <p:bgPr>
+        <a:solidFill>
+          <a:schemeClr val="bg1"/>
+        </a:solidFill>
+        <a:effectLst/>
+      </p:bgPr>
+    </p:bg>
+    <p:spTree>
+      <p:nvGrpSpPr>
+        <p:cNvPr id="1" name=""/>
+        <p:cNvGrpSpPr/>
+        <p:nvPr/>
+      </p:nvGrpSpPr>
+      <p:grpSpPr>
+        <a:xfrm>
+          <a:off x="0" y="0"/>
+          <a:ext cx="0" cy="0"/>
+          <a:chOff x="0" y="0"/>
+          <a:chExt cx="0" cy="0"/>
+        </a:xfrm>
+      </p:grpSpPr>
+      <p:sp useBgFill="1">
+        <p:nvSpPr>
+          <p:cNvPr id="10" name="Rectangle 9">
+            <a:extLst>
+              <a:ext uri="{FF2B5EF4-FFF2-40B4-BE49-F238E27FC236}">
+                <a16:creationId xmlns:a16="http://schemas.microsoft.com/office/drawing/2014/main" id="{EC7FF834-B204-4967-8D47-8BB36EAF0EF5}"/>
+              </a:ext>
+              <a:ext uri="{C183D7F6-B498-43B3-948B-1728B52AA6E4}">
+                <adec:decorative xmlns:adec="http://schemas.microsoft.com/office/drawing/2017/decorative" val="1"/>
+              </a:ext>
+            </a:extLst>
+          </p:cNvPr>
+          <p:cNvSpPr>
+            <a:spLocks noGrp="1" noRot="1" noChangeAspect="1" noMove="1" noResize="1" noEditPoints="1" noAdjustHandles="1" noChangeArrowheads="1" noChangeShapeType="1" noTextEdit="1"/>
+          </p:cNvSpPr>
+          <p:nvPr>
+            <p:extLst>
+              <p:ext uri="{386F3935-93C4-4BCD-93E2-E3B085C9AB24}">
+                <p16:designElem xmlns:p16="http://schemas.microsoft.com/office/powerpoint/2015/main" val="1"/>
+              </p:ext>
+            </p:extLst>
+          </p:nvPr>
+        </p:nvSpPr>
+        <p:spPr>
+          <a:xfrm>
+            <a:off x="0" y="-2"/>
+            <a:ext cx="12192000" cy="6858002"/>
+          </a:xfrm>
+          <a:prstGeom prst="rect">
+            <a:avLst/>
+          </a:prstGeom>
+          <a:ln>
+            <a:noFill/>
+          </a:ln>
+        </p:spPr>
+        <p:style>
+          <a:lnRef idx="2">
+            <a:schemeClr val="accent1">
+              <a:shade val="50000"/>
+            </a:schemeClr>
+          </a:lnRef>
+          <a:fillRef idx="1">
+            <a:schemeClr val="accent1"/>
+          </a:fillRef>
+          <a:effectRef idx="0">
+            <a:schemeClr val="accent1"/>
+          </a:effectRef>
+          <a:fontRef idx="minor">
+            <a:schemeClr val="lt1"/>
+          </a:fontRef>
+        </p:style>
+        <p:txBody>
+          <a:bodyPr rtlCol="0" anchor="ctr"/>
+          <a:lstStyle/>
+          <a:p>
+            <a:pPr algn="ctr"/>
+            <a:endParaRPr lang="en-US"/>
+          </a:p>
+        </p:txBody>
+      </p:sp>
+      <p:sp>
+        <p:nvSpPr>
+          <p:cNvPr id="12" name="Rectangle 11">
+            <a:extLst>
+              <a:ext uri="{FF2B5EF4-FFF2-40B4-BE49-F238E27FC236}">
+                <a16:creationId xmlns:a16="http://schemas.microsoft.com/office/drawing/2014/main" id="{F780A22D-61EA-43E3-BD94-3E39CF902160}"/>
+              </a:ext>
+              <a:ext uri="{C183D7F6-B498-43B3-948B-1728B52AA6E4}">
+                <adec:decorative xmlns:adec="http://schemas.microsoft.com/office/drawing/2017/decorative" val="1"/>
+              </a:ext>
+            </a:extLst>
+          </p:cNvPr>
+          <p:cNvSpPr>
+            <a:spLocks noGrp="1" noRot="1" noChangeAspect="1" noMove="1" noResize="1" noEditPoints="1" noAdjustHandles="1" noChangeArrowheads="1" noChangeShapeType="1" noTextEdit="1"/>
+          </p:cNvSpPr>
+          <p:nvPr>
+            <p:extLst>
+              <p:ext uri="{386F3935-93C4-4BCD-93E2-E3B085C9AB24}">
+                <p16:designElem xmlns:p16="http://schemas.microsoft.com/office/powerpoint/2015/main" val="1"/>
+              </p:ext>
+            </p:extLst>
+          </p:nvPr>
+        </p:nvSpPr>
+        <p:spPr>
+          <a:xfrm>
+            <a:off x="0" y="4918509"/>
+            <a:ext cx="12192000" cy="1939491"/>
+          </a:xfrm>
+          <a:prstGeom prst="rect">
+            <a:avLst/>
+          </a:prstGeom>
+          <a:solidFill>
+            <a:schemeClr val="accent2"/>
+          </a:solidFill>
+          <a:ln>
+            <a:noFill/>
+          </a:ln>
+        </p:spPr>
+        <p:style>
+          <a:lnRef idx="2">
+            <a:schemeClr val="accent1">
+              <a:shade val="50000"/>
+            </a:schemeClr>
+          </a:lnRef>
+          <a:fillRef idx="1">
+            <a:schemeClr val="accent1"/>
+          </a:fillRef>
+          <a:effectRef idx="0">
+            <a:schemeClr val="accent1"/>
+          </a:effectRef>
+          <a:fontRef idx="minor">
+            <a:schemeClr val="lt1"/>
+          </a:fontRef>
+        </p:style>
+        <p:txBody>
+          <a:bodyPr rtlCol="0" anchor="ctr"/>
+          <a:lstStyle/>
+          <a:p>
+            <a:pPr algn="ctr"/>
+            <a:endParaRPr lang="en-US"/>
+          </a:p>
+        </p:txBody>
+      </p:sp>
+      <p:sp>
+        <p:nvSpPr>
+          <p:cNvPr id="2" name="Title 1">
+            <a:extLst>
+              <a:ext uri="{FF2B5EF4-FFF2-40B4-BE49-F238E27FC236}">
+                <a16:creationId xmlns:a16="http://schemas.microsoft.com/office/drawing/2014/main" id="{F90C33B1-E1A1-6042-B0B7-90D937D74879}"/>
+              </a:ext>
+            </a:extLst>
+          </p:cNvPr>
+          <p:cNvSpPr>
+            <a:spLocks noGrp="1"/>
+          </p:cNvSpPr>
+          <p:nvPr>
+            <p:ph type="title"/>
+          </p:nvPr>
+        </p:nvSpPr>
+        <p:spPr>
+          <a:xfrm>
+            <a:off x="1600200" y="4269282"/>
+            <a:ext cx="8991600" cy="1264762"/>
+          </a:xfrm>
+        </p:spPr>
+        <p:txBody>
+          <a:bodyPr vert="horz" lIns="274320" tIns="182880" rIns="274320" bIns="182880" rtlCol="0" anchor="ctr" anchorCtr="1">
+            <a:normAutofit/>
+          </a:bodyPr>
+          <a:lstStyle/>
+          <a:p>
+            <a:r>
+              <a:rPr lang="en-US" sz="3200" dirty="0"/>
+              <a:t>4.c) top 10 countries revenue per month visualized cont.</a:t>
+            </a:r>
+          </a:p>
+        </p:txBody>
+      </p:sp>
+      <p:sp>
+        <p:nvSpPr>
+          <p:cNvPr id="6" name="TextBox 5">
+            <a:extLst>
+              <a:ext uri="{FF2B5EF4-FFF2-40B4-BE49-F238E27FC236}">
+                <a16:creationId xmlns:a16="http://schemas.microsoft.com/office/drawing/2014/main" id="{C49D5BC5-DE4F-1441-BCE0-800C2886439F}"/>
+              </a:ext>
+            </a:extLst>
+          </p:cNvPr>
+          <p:cNvSpPr txBox="1"/>
+          <p:nvPr/>
+        </p:nvSpPr>
+        <p:spPr>
+          <a:xfrm>
+            <a:off x="106988" y="5700713"/>
+            <a:ext cx="12085012" cy="738664"/>
+          </a:xfrm>
+          <a:prstGeom prst="rect">
+            <a:avLst/>
+          </a:prstGeom>
+          <a:noFill/>
+        </p:spPr>
+        <p:txBody>
+          <a:bodyPr wrap="square" rtlCol="0">
+            <a:spAutoFit/>
+          </a:bodyPr>
+          <a:lstStyle/>
+          <a:p>
+            <a:r>
+              <a:rPr lang="en-US" sz="1400" dirty="0">
+                <a:solidFill>
+                  <a:schemeClr val="bg1"/>
+                </a:solidFill>
+              </a:rPr>
+              <a:t>This table was also used to visualize revenues per top 10 countries over time as a stacked horizontal bar chart,</a:t>
+            </a:r>
+          </a:p>
+          <a:p>
+            <a:r>
+              <a:rPr lang="en-US" sz="1400" dirty="0">
+                <a:solidFill>
+                  <a:srgbClr val="FFFF00"/>
+                </a:solidFill>
+              </a:rPr>
+              <a:t>Takeaways: This graph shows what we learn from the previous slide, with the addition that Norway had 30k worth of transactions in March 2018.</a:t>
+            </a:r>
+          </a:p>
+          <a:p>
+            <a:r>
+              <a:rPr lang="en-US" sz="1400" dirty="0">
+                <a:solidFill>
+                  <a:srgbClr val="FFFF00"/>
+                </a:solidFill>
+              </a:rPr>
+              <a:t>The other notable points are Singapore’s large share of the company revenue in April 2019, and Portugal in May 2019.</a:t>
+            </a:r>
+          </a:p>
+        </p:txBody>
+      </p:sp>
+      <p:pic>
+        <p:nvPicPr>
+          <p:cNvPr id="8" name="Content Placeholder 7" descr="A picture containing text, screenshot, writing implement&#10;&#10;Description automatically generated">
+            <a:extLst>
+              <a:ext uri="{FF2B5EF4-FFF2-40B4-BE49-F238E27FC236}">
+                <a16:creationId xmlns:a16="http://schemas.microsoft.com/office/drawing/2014/main" id="{89F96C9A-0131-6F45-BA9A-321550A51D6D}"/>
+              </a:ext>
+            </a:extLst>
+          </p:cNvPr>
+          <p:cNvPicPr>
+            <a:picLocks noGrp="1" noChangeAspect="1"/>
+          </p:cNvPicPr>
+          <p:nvPr>
+            <p:ph idx="1"/>
+          </p:nvPr>
+        </p:nvPicPr>
+        <p:blipFill>
+          <a:blip r:embed="rId2"/>
+          <a:stretch>
+            <a:fillRect/>
+          </a:stretch>
+        </p:blipFill>
+        <p:spPr>
+          <a:xfrm>
+            <a:off x="106988" y="403737"/>
+            <a:ext cx="11869165" cy="3531515"/>
+          </a:xfrm>
+        </p:spPr>
+      </p:pic>
+    </p:spTree>
+    <p:extLst>
+      <p:ext uri="{BB962C8B-B14F-4D97-AF65-F5344CB8AC3E}">
+        <p14:creationId xmlns:p14="http://schemas.microsoft.com/office/powerpoint/2010/main" val="228200634"/>
+      </p:ext>
+    </p:extLst>
+  </p:cSld>
+  <p:clrMapOvr>
+    <a:masterClrMapping/>
+  </p:clrMapOvr>
+</p:sld>
+</file>
+
+<file path=ppt/slides/slide15.xml><?xml version="1.0" encoding="utf-8"?>
+<p:sld xmlns:a="http://schemas.openxmlformats.org/drawingml/2006/main" xmlns:r="http://schemas.openxmlformats.org/officeDocument/2006/relationships" xmlns:p="http://schemas.openxmlformats.org/presentationml/2006/main">
+  <p:cSld>
+    <p:spTree>
+      <p:nvGrpSpPr>
+        <p:cNvPr id="1" name=""/>
+        <p:cNvGrpSpPr/>
+        <p:nvPr/>
+      </p:nvGrpSpPr>
+      <p:grpSpPr>
+        <a:xfrm>
+          <a:off x="0" y="0"/>
+          <a:ext cx="0" cy="0"/>
+          <a:chOff x="0" y="0"/>
+          <a:chExt cx="0" cy="0"/>
+        </a:xfrm>
+      </p:grpSpPr>
+      <p:sp>
+        <p:nvSpPr>
+          <p:cNvPr id="2" name="Title 1">
+            <a:extLst>
+              <a:ext uri="{FF2B5EF4-FFF2-40B4-BE49-F238E27FC236}">
+                <a16:creationId xmlns:a16="http://schemas.microsoft.com/office/drawing/2014/main" id="{FFC0F8EE-7ACD-0342-BD26-1C29FB771CBB}"/>
+              </a:ext>
+            </a:extLst>
+          </p:cNvPr>
+          <p:cNvSpPr>
+            <a:spLocks noGrp="1"/>
+          </p:cNvSpPr>
+          <p:nvPr>
+            <p:ph type="title"/>
+          </p:nvPr>
+        </p:nvSpPr>
+        <p:spPr/>
+        <p:txBody>
+          <a:bodyPr/>
+          <a:lstStyle/>
+          <a:p>
+            <a:r>
+              <a:rPr lang="en-US" dirty="0"/>
+              <a:t>4.d) distributions of price and </a:t>
+            </a:r>
+            <a:r>
+              <a:rPr lang="en-US" dirty="0" err="1"/>
+              <a:t>times_viewed</a:t>
+            </a:r>
+            <a:endParaRPr lang="en-US" dirty="0"/>
+          </a:p>
+        </p:txBody>
+      </p:sp>
+      <p:sp>
+        <p:nvSpPr>
+          <p:cNvPr id="3" name="Content Placeholder 2">
+            <a:extLst>
+              <a:ext uri="{FF2B5EF4-FFF2-40B4-BE49-F238E27FC236}">
+                <a16:creationId xmlns:a16="http://schemas.microsoft.com/office/drawing/2014/main" id="{4D68E0E9-66A5-2941-AB59-49052C6E5296}"/>
+              </a:ext>
+            </a:extLst>
+          </p:cNvPr>
+          <p:cNvSpPr>
+            <a:spLocks noGrp="1"/>
+          </p:cNvSpPr>
+          <p:nvPr>
+            <p:ph idx="1"/>
+          </p:nvPr>
+        </p:nvSpPr>
+        <p:spPr/>
+        <p:txBody>
+          <a:bodyPr/>
+          <a:lstStyle/>
+          <a:p>
+            <a:r>
+              <a:rPr lang="en-US" dirty="0"/>
+              <a:t>Histograms were plotted for the numeric variables to view their distributions across the</a:t>
+            </a:r>
+          </a:p>
+        </p:txBody>
+      </p:sp>
+    </p:spTree>
+    <p:extLst>
+      <p:ext uri="{BB962C8B-B14F-4D97-AF65-F5344CB8AC3E}">
+        <p14:creationId xmlns:p14="http://schemas.microsoft.com/office/powerpoint/2010/main" val="2662769110"/>
       </p:ext>
     </p:extLst>
   </p:cSld>
@@ -5253,15 +7210,7 @@
             </a:r>
             <a:r>
               <a:rPr lang="en-US" dirty="0"/>
-              <a:t> </a:t>
-            </a:r>
-            <a:r>
-              <a:rPr lang="en-US" dirty="0" err="1"/>
-              <a:t>repositotry</a:t>
-            </a:r>
-            <a:r>
-              <a:rPr lang="en-US" dirty="0"/>
-              <a:t> for data-</a:t>
+              <a:t> repository for data-</a:t>
             </a:r>
             <a:r>
               <a:rPr lang="en-US" dirty="0" err="1"/>
@@ -5466,7 +7415,13 @@
           <a:p>
             <a:r>
               <a:rPr lang="en-US" dirty="0"/>
-              <a:t>See ‘EDA’ </a:t>
+              <a:t>In GitHub:</a:t>
+            </a:r>
+          </a:p>
+          <a:p>
+            <a:r>
+              <a:rPr lang="en-US" dirty="0"/>
+              <a:t>See the ‘EDA’ </a:t>
             </a:r>
             <a:r>
               <a:rPr lang="en-US" dirty="0" err="1"/>
@@ -5474,14 +7429,19 @@
             </a:r>
             <a:r>
               <a:rPr lang="en-US" dirty="0"/>
-              <a:t> Notebook in GitHub</a:t>
+              <a:t> Notebook</a:t>
             </a:r>
           </a:p>
           <a:p>
             <a:r>
               <a:rPr lang="en-US" dirty="0"/>
-              <a:t>Key takeaways:</a:t>
-            </a:r>
+              <a:t>See the ‘EDA-gallery’ folder for </a:t>
+            </a:r>
+            <a:r>
+              <a:rPr lang="en-US" dirty="0" err="1"/>
+              <a:t>visualisations</a:t>
+            </a:r>
+            <a:endParaRPr lang="en-US" dirty="0"/>
           </a:p>
         </p:txBody>
       </p:sp>
@@ -5536,7 +7496,10 @@
           <a:bodyPr/>
           <a:lstStyle/>
           <a:p>
-            <a:endParaRPr lang="en-US"/>
+            <a:r>
+              <a:rPr lang="en-US" dirty="0"/>
+              <a:t>4.a) – column manipulations</a:t>
+            </a:r>
           </a:p>
         </p:txBody>
       </p:sp>
@@ -5556,12 +7519,94 @@
             <p:ph idx="1"/>
           </p:nvPr>
         </p:nvSpPr>
-        <p:spPr/>
-        <p:txBody>
-          <a:bodyPr/>
-          <a:lstStyle/>
-          <a:p>
-            <a:endParaRPr lang="en-US"/>
+        <p:spPr>
+          <a:xfrm>
+            <a:off x="2231136" y="2638044"/>
+            <a:ext cx="7729728" cy="4042674"/>
+          </a:xfrm>
+        </p:spPr>
+        <p:txBody>
+          <a:bodyPr>
+            <a:normAutofit fontScale="92500" lnSpcReduction="10000"/>
+          </a:bodyPr>
+          <a:lstStyle/>
+          <a:p>
+            <a:r>
+              <a:rPr lang="en-US" dirty="0"/>
+              <a:t>The following EDA was done following data ingestion and aggregation of the monthly .json files provided into a single </a:t>
+            </a:r>
+            <a:r>
+              <a:rPr lang="en-US" i="1" dirty="0" err="1"/>
+              <a:t>transactions.csv</a:t>
+            </a:r>
+            <a:r>
+              <a:rPr lang="en-US" i="1" dirty="0"/>
+              <a:t> </a:t>
+            </a:r>
+            <a:r>
+              <a:rPr lang="en-US" dirty="0"/>
+              <a:t>file.</a:t>
+            </a:r>
+          </a:p>
+          <a:p>
+            <a:r>
+              <a:rPr lang="en-US" dirty="0"/>
+              <a:t>Some of the data types initially created by pandas package were not optimal for further analysis, so the following data type and column manipulations were applied:</a:t>
+            </a:r>
+          </a:p>
+          <a:p>
+            <a:r>
+              <a:rPr lang="en-US" dirty="0"/>
+              <a:t>Country: object to category</a:t>
+            </a:r>
+          </a:p>
+          <a:p>
+            <a:r>
+              <a:rPr lang="en-US" dirty="0" err="1"/>
+              <a:t>Stream_id</a:t>
+            </a:r>
+            <a:r>
+              <a:rPr lang="en-US" dirty="0"/>
+              <a:t>: object to category</a:t>
+            </a:r>
+          </a:p>
+          <a:p>
+            <a:r>
+              <a:rPr lang="en-US" dirty="0" err="1"/>
+              <a:t>Customer_id</a:t>
+            </a:r>
+            <a:r>
+              <a:rPr lang="en-US" dirty="0"/>
+              <a:t>: float to category</a:t>
+            </a:r>
+          </a:p>
+          <a:p>
+            <a:r>
+              <a:rPr lang="en-US" dirty="0"/>
+              <a:t>Invoice: object to category</a:t>
+            </a:r>
+          </a:p>
+          <a:p>
+            <a:r>
+              <a:rPr lang="en-US" dirty="0" err="1"/>
+              <a:t>Unamed</a:t>
+            </a:r>
+            <a:r>
+              <a:rPr lang="en-US" dirty="0"/>
+              <a:t>: 0: dropped/deleted as this was not useful</a:t>
+            </a:r>
+          </a:p>
+          <a:p>
+            <a:r>
+              <a:rPr lang="en-US" b="1" dirty="0"/>
+              <a:t>Date: a new column derived from day, year, and month</a:t>
+            </a:r>
+          </a:p>
+          <a:p>
+            <a:r>
+              <a:rPr lang="en-US" b="1" dirty="0"/>
+              <a:t>Year-month: a new column derived from year, and month to help with monthly aggregation of the target column price</a:t>
+            </a:r>
           </a:p>
         </p:txBody>
       </p:sp>
@@ -5569,6 +7614,204 @@
     <p:extLst>
       <p:ext uri="{BB962C8B-B14F-4D97-AF65-F5344CB8AC3E}">
         <p14:creationId xmlns:p14="http://schemas.microsoft.com/office/powerpoint/2010/main" val="3553155479"/>
+      </p:ext>
+    </p:extLst>
+  </p:cSld>
+  <p:clrMapOvr>
+    <a:masterClrMapping/>
+  </p:clrMapOvr>
+</p:sld>
+</file>
+
+<file path=ppt/slides/slide9.xml><?xml version="1.0" encoding="utf-8"?>
+<p:sld xmlns:a="http://schemas.openxmlformats.org/drawingml/2006/main" xmlns:r="http://schemas.openxmlformats.org/officeDocument/2006/relationships" xmlns:p="http://schemas.openxmlformats.org/presentationml/2006/main">
+  <p:cSld>
+    <p:bg>
+      <p:bgPr>
+        <a:solidFill>
+          <a:schemeClr val="accent2"/>
+        </a:solidFill>
+        <a:effectLst/>
+      </p:bgPr>
+    </p:bg>
+    <p:spTree>
+      <p:nvGrpSpPr>
+        <p:cNvPr id="1" name=""/>
+        <p:cNvGrpSpPr/>
+        <p:nvPr/>
+      </p:nvGrpSpPr>
+      <p:grpSpPr>
+        <a:xfrm>
+          <a:off x="0" y="0"/>
+          <a:ext cx="0" cy="0"/>
+          <a:chOff x="0" y="0"/>
+          <a:chExt cx="0" cy="0"/>
+        </a:xfrm>
+      </p:grpSpPr>
+      <p:sp>
+        <p:nvSpPr>
+          <p:cNvPr id="2" name="Title 1">
+            <a:extLst>
+              <a:ext uri="{FF2B5EF4-FFF2-40B4-BE49-F238E27FC236}">
+                <a16:creationId xmlns:a16="http://schemas.microsoft.com/office/drawing/2014/main" id="{0318644D-9CDC-C542-B1C2-3DC5349E84D4}"/>
+              </a:ext>
+            </a:extLst>
+          </p:cNvPr>
+          <p:cNvSpPr>
+            <a:spLocks noGrp="1"/>
+          </p:cNvSpPr>
+          <p:nvPr>
+            <p:ph type="title"/>
+          </p:nvPr>
+        </p:nvSpPr>
+        <p:spPr>
+          <a:xfrm>
+            <a:off x="804672" y="2386744"/>
+            <a:ext cx="4486656" cy="1645920"/>
+          </a:xfrm>
+        </p:spPr>
+        <p:txBody>
+          <a:bodyPr vert="horz" lIns="274320" tIns="182880" rIns="274320" bIns="182880" rtlCol="0" anchor="ctr" anchorCtr="1">
+            <a:normAutofit/>
+          </a:bodyPr>
+          <a:lstStyle/>
+          <a:p>
+            <a:r>
+              <a:rPr lang="en-US" sz="3200" dirty="0"/>
+              <a:t>4.a) pre vs post manipulation</a:t>
+            </a:r>
+          </a:p>
+        </p:txBody>
+      </p:sp>
+      <p:sp>
+        <p:nvSpPr>
+          <p:cNvPr id="12" name="Rectangle 11">
+            <a:extLst>
+              <a:ext uri="{FF2B5EF4-FFF2-40B4-BE49-F238E27FC236}">
+                <a16:creationId xmlns:a16="http://schemas.microsoft.com/office/drawing/2014/main" id="{2F0F143B-3981-4FC2-BB15-0C5867633489}"/>
+              </a:ext>
+              <a:ext uri="{C183D7F6-B498-43B3-948B-1728B52AA6E4}">
+                <adec:decorative xmlns:adec="http://schemas.microsoft.com/office/drawing/2017/decorative" val="1"/>
+              </a:ext>
+            </a:extLst>
+          </p:cNvPr>
+          <p:cNvSpPr>
+            <a:spLocks noGrp="1" noRot="1" noChangeAspect="1" noMove="1" noResize="1" noEditPoints="1" noAdjustHandles="1" noChangeArrowheads="1" noChangeShapeType="1" noTextEdit="1"/>
+          </p:cNvSpPr>
+          <p:nvPr>
+            <p:extLst>
+              <p:ext uri="{386F3935-93C4-4BCD-93E2-E3B085C9AB24}">
+                <p16:designElem xmlns:p16="http://schemas.microsoft.com/office/powerpoint/2015/main" val="1"/>
+              </p:ext>
+            </p:extLst>
+          </p:nvPr>
+        </p:nvSpPr>
+        <p:spPr>
+          <a:xfrm>
+            <a:off x="6096000" y="0"/>
+            <a:ext cx="6095999" cy="6858000"/>
+          </a:xfrm>
+          <a:prstGeom prst="rect">
+            <a:avLst/>
+          </a:prstGeom>
+          <a:solidFill>
+            <a:srgbClr val="FFFFFF"/>
+          </a:solidFill>
+          <a:ln>
+            <a:noFill/>
+          </a:ln>
+        </p:spPr>
+        <p:style>
+          <a:lnRef idx="2">
+            <a:schemeClr val="accent1">
+              <a:shade val="50000"/>
+            </a:schemeClr>
+          </a:lnRef>
+          <a:fillRef idx="1">
+            <a:schemeClr val="accent1"/>
+          </a:fillRef>
+          <a:effectRef idx="0">
+            <a:schemeClr val="accent1"/>
+          </a:effectRef>
+          <a:fontRef idx="minor">
+            <a:schemeClr val="lt1"/>
+          </a:fontRef>
+        </p:style>
+        <p:txBody>
+          <a:bodyPr rtlCol="0" anchor="ctr"/>
+          <a:lstStyle/>
+          <a:p>
+            <a:pPr algn="ctr"/>
+            <a:endParaRPr lang="en-US"/>
+          </a:p>
+        </p:txBody>
+      </p:sp>
+      <p:pic>
+        <p:nvPicPr>
+          <p:cNvPr id="5" name="Content Placeholder 4" descr="Table&#10;&#10;Description automatically generated">
+            <a:extLst>
+              <a:ext uri="{FF2B5EF4-FFF2-40B4-BE49-F238E27FC236}">
+                <a16:creationId xmlns:a16="http://schemas.microsoft.com/office/drawing/2014/main" id="{5FBE4BCB-2827-FD4B-9754-8A093C43B37B}"/>
+              </a:ext>
+            </a:extLst>
+          </p:cNvPr>
+          <p:cNvPicPr>
+            <a:picLocks noGrp="1" noChangeAspect="1"/>
+          </p:cNvPicPr>
+          <p:nvPr>
+            <p:ph idx="1"/>
+          </p:nvPr>
+        </p:nvPicPr>
+        <p:blipFill>
+          <a:blip r:embed="rId2"/>
+          <a:stretch>
+            <a:fillRect/>
+          </a:stretch>
+        </p:blipFill>
+        <p:spPr>
+          <a:xfrm>
+            <a:off x="6115951" y="807463"/>
+            <a:ext cx="6016316" cy="1579281"/>
+          </a:xfrm>
+          <a:prstGeom prst="rect">
+            <a:avLst/>
+          </a:prstGeom>
+        </p:spPr>
+      </p:pic>
+      <p:pic>
+        <p:nvPicPr>
+          <p:cNvPr id="7" name="Picture 6" descr="Table&#10;&#10;Description automatically generated">
+            <a:extLst>
+              <a:ext uri="{FF2B5EF4-FFF2-40B4-BE49-F238E27FC236}">
+                <a16:creationId xmlns:a16="http://schemas.microsoft.com/office/drawing/2014/main" id="{DA3CFA61-68FB-F042-940F-9E41C2CE81A2}"/>
+              </a:ext>
+            </a:extLst>
+          </p:cNvPr>
+          <p:cNvPicPr>
+            <a:picLocks noChangeAspect="1"/>
+          </p:cNvPicPr>
+          <p:nvPr/>
+        </p:nvPicPr>
+        <p:blipFill>
+          <a:blip r:embed="rId3"/>
+          <a:stretch>
+            <a:fillRect/>
+          </a:stretch>
+        </p:blipFill>
+        <p:spPr>
+          <a:xfrm>
+            <a:off x="6141714" y="4080830"/>
+            <a:ext cx="5963269" cy="1386459"/>
+          </a:xfrm>
+          <a:prstGeom prst="rect">
+            <a:avLst/>
+          </a:prstGeom>
+        </p:spPr>
+      </p:pic>
+    </p:spTree>
+    <p:extLst>
+      <p:ext uri="{BB962C8B-B14F-4D97-AF65-F5344CB8AC3E}">
+        <p14:creationId xmlns:p14="http://schemas.microsoft.com/office/powerpoint/2010/main" val="3494915297"/>
       </p:ext>
     </p:extLst>
   </p:cSld>

</xml_diff>